<commit_message>
add debug in presentaion
</commit_message>
<xml_diff>
--- a/крайняя/Федотов_ПИН-41_Презентация.pptx
+++ b/крайняя/Федотов_ПИН-41_Презентация.pptx
@@ -13,7 +13,8 @@
     <p:sldId id="261" r:id="rId7"/>
     <p:sldId id="262" r:id="rId8"/>
     <p:sldId id="266" r:id="rId9"/>
-    <p:sldId id="264" r:id="rId10"/>
+    <p:sldId id="267" r:id="rId10"/>
+    <p:sldId id="264" r:id="rId11"/>
   </p:sldIdLst>
   <p:sldSz cx="9144000" cy="6858000" type="screen4x3"/>
   <p:notesSz cx="6797675" cy="9926638"/>
@@ -317,7 +318,7 @@
             <a:fld id="{D3F45E69-51FF-4017-B855-FA6AEE2AB1D5}" type="datetimeFigureOut">
               <a:rPr lang="ru-RU" smtClean="0"/>
               <a:pPr/>
-              <a:t>29.04.2021</a:t>
+              <a:t>26.05.2021</a:t>
             </a:fld>
             <a:endParaRPr lang="ru-RU"/>
           </a:p>
@@ -482,7 +483,7 @@
             <a:fld id="{D3F45E69-51FF-4017-B855-FA6AEE2AB1D5}" type="datetimeFigureOut">
               <a:rPr lang="ru-RU" smtClean="0"/>
               <a:pPr/>
-              <a:t>29.04.2021</a:t>
+              <a:t>26.05.2021</a:t>
             </a:fld>
             <a:endParaRPr lang="ru-RU"/>
           </a:p>
@@ -657,7 +658,7 @@
             <a:fld id="{D3F45E69-51FF-4017-B855-FA6AEE2AB1D5}" type="datetimeFigureOut">
               <a:rPr lang="ru-RU" smtClean="0"/>
               <a:pPr/>
-              <a:t>29.04.2021</a:t>
+              <a:t>26.05.2021</a:t>
             </a:fld>
             <a:endParaRPr lang="ru-RU"/>
           </a:p>
@@ -822,7 +823,7 @@
             <a:fld id="{D3F45E69-51FF-4017-B855-FA6AEE2AB1D5}" type="datetimeFigureOut">
               <a:rPr lang="ru-RU" smtClean="0"/>
               <a:pPr/>
-              <a:t>29.04.2021</a:t>
+              <a:t>26.05.2021</a:t>
             </a:fld>
             <a:endParaRPr lang="ru-RU"/>
           </a:p>
@@ -1064,7 +1065,7 @@
             <a:fld id="{D3F45E69-51FF-4017-B855-FA6AEE2AB1D5}" type="datetimeFigureOut">
               <a:rPr lang="ru-RU" smtClean="0"/>
               <a:pPr/>
-              <a:t>29.04.2021</a:t>
+              <a:t>26.05.2021</a:t>
             </a:fld>
             <a:endParaRPr lang="ru-RU"/>
           </a:p>
@@ -1346,7 +1347,7 @@
             <a:fld id="{D3F45E69-51FF-4017-B855-FA6AEE2AB1D5}" type="datetimeFigureOut">
               <a:rPr lang="ru-RU" smtClean="0"/>
               <a:pPr/>
-              <a:t>29.04.2021</a:t>
+              <a:t>26.05.2021</a:t>
             </a:fld>
             <a:endParaRPr lang="ru-RU"/>
           </a:p>
@@ -1762,7 +1763,7 @@
             <a:fld id="{D3F45E69-51FF-4017-B855-FA6AEE2AB1D5}" type="datetimeFigureOut">
               <a:rPr lang="ru-RU" smtClean="0"/>
               <a:pPr/>
-              <a:t>29.04.2021</a:t>
+              <a:t>26.05.2021</a:t>
             </a:fld>
             <a:endParaRPr lang="ru-RU"/>
           </a:p>
@@ -1876,7 +1877,7 @@
             <a:fld id="{D3F45E69-51FF-4017-B855-FA6AEE2AB1D5}" type="datetimeFigureOut">
               <a:rPr lang="ru-RU" smtClean="0"/>
               <a:pPr/>
-              <a:t>29.04.2021</a:t>
+              <a:t>26.05.2021</a:t>
             </a:fld>
             <a:endParaRPr lang="ru-RU"/>
           </a:p>
@@ -1968,7 +1969,7 @@
             <a:fld id="{D3F45E69-51FF-4017-B855-FA6AEE2AB1D5}" type="datetimeFigureOut">
               <a:rPr lang="ru-RU" smtClean="0"/>
               <a:pPr/>
-              <a:t>29.04.2021</a:t>
+              <a:t>26.05.2021</a:t>
             </a:fld>
             <a:endParaRPr lang="ru-RU"/>
           </a:p>
@@ -2240,7 +2241,7 @@
             <a:fld id="{D3F45E69-51FF-4017-B855-FA6AEE2AB1D5}" type="datetimeFigureOut">
               <a:rPr lang="ru-RU" smtClean="0"/>
               <a:pPr/>
-              <a:t>29.04.2021</a:t>
+              <a:t>26.05.2021</a:t>
             </a:fld>
             <a:endParaRPr lang="ru-RU"/>
           </a:p>
@@ -2489,7 +2490,7 @@
             <a:fld id="{D3F45E69-51FF-4017-B855-FA6AEE2AB1D5}" type="datetimeFigureOut">
               <a:rPr lang="ru-RU" smtClean="0"/>
               <a:pPr/>
-              <a:t>29.04.2021</a:t>
+              <a:t>26.05.2021</a:t>
             </a:fld>
             <a:endParaRPr lang="ru-RU"/>
           </a:p>
@@ -2697,7 +2698,7 @@
             <a:fld id="{D3F45E69-51FF-4017-B855-FA6AEE2AB1D5}" type="datetimeFigureOut">
               <a:rPr lang="ru-RU" smtClean="0"/>
               <a:pPr/>
-              <a:t>29.04.2021</a:t>
+              <a:t>26.05.2021</a:t>
             </a:fld>
             <a:endParaRPr lang="ru-RU"/>
           </a:p>
@@ -4215,6 +4216,1063 @@
 </p:sld>
 </file>
 
+<file path=ppt/slides/slide10.xml><?xml version="1.0" encoding="utf-8"?>
+<p:sld xmlns:a="http://schemas.openxmlformats.org/drawingml/2006/main" xmlns:r="http://schemas.openxmlformats.org/officeDocument/2006/relationships" xmlns:p="http://schemas.openxmlformats.org/presentationml/2006/main">
+  <p:cSld>
+    <p:spTree>
+      <p:nvGrpSpPr>
+        <p:cNvPr id="1" name=""/>
+        <p:cNvGrpSpPr/>
+        <p:nvPr/>
+      </p:nvGrpSpPr>
+      <p:grpSpPr>
+        <a:xfrm>
+          <a:off x="0" y="0"/>
+          <a:ext cx="0" cy="0"/>
+          <a:chOff x="0" y="0"/>
+          <a:chExt cx="0" cy="0"/>
+        </a:xfrm>
+      </p:grpSpPr>
+      <p:sp>
+        <p:nvSpPr>
+          <p:cNvPr id="4" name="Rectangle 23"/>
+          <p:cNvSpPr>
+            <a:spLocks noChangeArrowheads="1"/>
+          </p:cNvSpPr>
+          <p:nvPr/>
+        </p:nvSpPr>
+        <p:spPr bwMode="auto">
+          <a:xfrm>
+            <a:off x="250825" y="260350"/>
+            <a:ext cx="8642350" cy="427038"/>
+          </a:xfrm>
+          <a:prstGeom prst="rect">
+            <a:avLst/>
+          </a:prstGeom>
+          <a:noFill/>
+          <a:ln w="9525">
+            <a:noFill/>
+            <a:miter lim="800000"/>
+            <a:headEnd/>
+            <a:tailEnd/>
+          </a:ln>
+        </p:spPr>
+        <p:txBody>
+          <a:bodyPr>
+            <a:spAutoFit/>
+          </a:bodyPr>
+          <a:lstStyle/>
+          <a:p>
+            <a:pPr algn="ctr"/>
+            <a:r>
+              <a:rPr lang="ru-RU" sz="2200" b="1" dirty="0"/>
+              <a:t>Результаты работы</a:t>
+            </a:r>
+          </a:p>
+        </p:txBody>
+      </p:sp>
+      <p:sp>
+        <p:nvSpPr>
+          <p:cNvPr id="5" name="Line 137"/>
+          <p:cNvSpPr>
+            <a:spLocks noChangeShapeType="1"/>
+          </p:cNvSpPr>
+          <p:nvPr/>
+        </p:nvSpPr>
+        <p:spPr bwMode="auto">
+          <a:xfrm>
+            <a:off x="193675" y="188913"/>
+            <a:ext cx="0" cy="6480175"/>
+          </a:xfrm>
+          <a:prstGeom prst="line">
+            <a:avLst/>
+          </a:prstGeom>
+          <a:noFill/>
+          <a:ln w="12700" cap="sq">
+            <a:solidFill>
+              <a:schemeClr val="tx1"/>
+            </a:solidFill>
+            <a:round/>
+            <a:headEnd/>
+            <a:tailEnd/>
+          </a:ln>
+        </p:spPr>
+        <p:txBody>
+          <a:bodyPr/>
+          <a:lstStyle/>
+          <a:p>
+            <a:endParaRPr lang="ru-RU"/>
+          </a:p>
+        </p:txBody>
+      </p:sp>
+      <p:sp>
+        <p:nvSpPr>
+          <p:cNvPr id="6" name="Line 138"/>
+          <p:cNvSpPr>
+            <a:spLocks noChangeShapeType="1"/>
+          </p:cNvSpPr>
+          <p:nvPr/>
+        </p:nvSpPr>
+        <p:spPr bwMode="auto">
+          <a:xfrm>
+            <a:off x="8978900" y="188913"/>
+            <a:ext cx="0" cy="6480175"/>
+          </a:xfrm>
+          <a:prstGeom prst="line">
+            <a:avLst/>
+          </a:prstGeom>
+          <a:noFill/>
+          <a:ln w="12700" cap="sq">
+            <a:solidFill>
+              <a:schemeClr val="tx1"/>
+            </a:solidFill>
+            <a:round/>
+            <a:headEnd/>
+            <a:tailEnd/>
+          </a:ln>
+        </p:spPr>
+        <p:txBody>
+          <a:bodyPr/>
+          <a:lstStyle/>
+          <a:p>
+            <a:endParaRPr lang="ru-RU"/>
+          </a:p>
+        </p:txBody>
+      </p:sp>
+      <p:graphicFrame>
+        <p:nvGraphicFramePr>
+          <p:cNvPr id="7" name="Group 10"/>
+          <p:cNvGraphicFramePr>
+            <a:graphicFrameLocks noGrp="1"/>
+          </p:cNvGraphicFramePr>
+          <p:nvPr>
+            <p:extLst>
+              <p:ext uri="{D42A27DB-BD31-4B8C-83A1-F6EECF244321}">
+                <p14:modId xmlns:p14="http://schemas.microsoft.com/office/powerpoint/2010/main" val="1946067037"/>
+              </p:ext>
+            </p:extLst>
+          </p:nvPr>
+        </p:nvGraphicFramePr>
+        <p:xfrm>
+          <a:off x="6156325" y="6093297"/>
+          <a:ext cx="2822575" cy="574194"/>
+        </p:xfrm>
+        <a:graphic>
+          <a:graphicData uri="http://schemas.openxmlformats.org/drawingml/2006/table">
+            <a:tbl>
+              <a:tblPr/>
+              <a:tblGrid>
+                <a:gridCol w="792163">
+                  <a:extLst>
+                    <a:ext uri="{9D8B030D-6E8A-4147-A177-3AD203B41FA5}">
+                      <a16:colId xmlns:a16="http://schemas.microsoft.com/office/drawing/2014/main" val="20000"/>
+                    </a:ext>
+                  </a:extLst>
+                </a:gridCol>
+                <a:gridCol w="1008062">
+                  <a:extLst>
+                    <a:ext uri="{9D8B030D-6E8A-4147-A177-3AD203B41FA5}">
+                      <a16:colId xmlns:a16="http://schemas.microsoft.com/office/drawing/2014/main" val="20001"/>
+                    </a:ext>
+                  </a:extLst>
+                </a:gridCol>
+                <a:gridCol w="649288">
+                  <a:extLst>
+                    <a:ext uri="{9D8B030D-6E8A-4147-A177-3AD203B41FA5}">
+                      <a16:colId xmlns:a16="http://schemas.microsoft.com/office/drawing/2014/main" val="20002"/>
+                    </a:ext>
+                  </a:extLst>
+                </a:gridCol>
+                <a:gridCol w="373062">
+                  <a:extLst>
+                    <a:ext uri="{9D8B030D-6E8A-4147-A177-3AD203B41FA5}">
+                      <a16:colId xmlns:a16="http://schemas.microsoft.com/office/drawing/2014/main" val="20003"/>
+                    </a:ext>
+                  </a:extLst>
+                </a:gridCol>
+              </a:tblGrid>
+              <a:tr h="367824">
+                <a:tc>
+                  <a:txBody>
+                    <a:bodyPr/>
+                    <a:lstStyle/>
+                    <a:p>
+                      <a:pPr marL="0" marR="0" lvl="0" indent="0" algn="l" defTabSz="914400" rtl="0" eaLnBrk="1" fontAlgn="base" latinLnBrk="0" hangingPunct="1">
+                        <a:lnSpc>
+                          <a:spcPct val="100000"/>
+                        </a:lnSpc>
+                        <a:spcBef>
+                          <a:spcPct val="0"/>
+                        </a:spcBef>
+                        <a:spcAft>
+                          <a:spcPct val="0"/>
+                        </a:spcAft>
+                        <a:buClrTx/>
+                        <a:buSzTx/>
+                        <a:buFontTx/>
+                        <a:buNone/>
+                        <a:tabLst/>
+                      </a:pPr>
+                      <a:r>
+                        <a:rPr kumimoji="0" lang="ru-RU" sz="1000" b="0" i="0" u="none" strike="noStrike" cap="none" normalizeH="0" baseline="0" dirty="0">
+                          <a:ln>
+                            <a:noFill/>
+                          </a:ln>
+                          <a:solidFill>
+                            <a:schemeClr val="tx1"/>
+                          </a:solidFill>
+                          <a:effectLst/>
+                          <a:latin typeface="Times New Roman" pitchFamily="18" charset="0"/>
+                          <a:cs typeface="Times New Roman" pitchFamily="18" charset="0"/>
+                        </a:rPr>
+                        <a:t>Разработал</a:t>
+                      </a:r>
+                      <a:endParaRPr kumimoji="0" lang="ru-RU" sz="1000" b="0" i="0" u="none" strike="noStrike" cap="none" normalizeH="0" baseline="0" dirty="0">
+                        <a:ln>
+                          <a:noFill/>
+                        </a:ln>
+                        <a:solidFill>
+                          <a:schemeClr val="tx1"/>
+                        </a:solidFill>
+                        <a:effectLst/>
+                        <a:latin typeface="Arial" charset="0"/>
+                      </a:endParaRPr>
+                    </a:p>
+                  </a:txBody>
+                  <a:tcPr marL="71962" marR="71962" marT="17991" marB="35979" horzOverflow="overflow">
+                    <a:lnL w="12700" cap="flat" cmpd="sng" algn="ctr">
+                      <a:solidFill>
+                        <a:srgbClr val="000000"/>
+                      </a:solidFill>
+                      <a:prstDash val="solid"/>
+                      <a:round/>
+                      <a:headEnd type="none" w="med" len="med"/>
+                      <a:tailEnd type="none" w="med" len="med"/>
+                    </a:lnL>
+                    <a:lnR w="12700" cap="flat" cmpd="sng" algn="ctr">
+                      <a:solidFill>
+                        <a:srgbClr val="000000"/>
+                      </a:solidFill>
+                      <a:prstDash val="solid"/>
+                      <a:round/>
+                      <a:headEnd type="none" w="med" len="med"/>
+                      <a:tailEnd type="none" w="med" len="med"/>
+                    </a:lnR>
+                    <a:lnT w="12700" cap="flat" cmpd="sng" algn="ctr">
+                      <a:solidFill>
+                        <a:srgbClr val="000000"/>
+                      </a:solidFill>
+                      <a:prstDash val="solid"/>
+                      <a:round/>
+                      <a:headEnd type="none" w="med" len="med"/>
+                      <a:tailEnd type="none" w="med" len="med"/>
+                    </a:lnT>
+                    <a:lnB w="12700" cap="flat" cmpd="sng" algn="ctr">
+                      <a:solidFill>
+                        <a:srgbClr val="000000"/>
+                      </a:solidFill>
+                      <a:prstDash val="solid"/>
+                      <a:round/>
+                      <a:headEnd type="none" w="med" len="med"/>
+                      <a:tailEnd type="none" w="med" len="med"/>
+                    </a:lnB>
+                    <a:lnTlToBr>
+                      <a:noFill/>
+                    </a:lnTlToBr>
+                    <a:lnBlToTr>
+                      <a:noFill/>
+                    </a:lnBlToTr>
+                    <a:noFill/>
+                  </a:tcPr>
+                </a:tc>
+                <a:tc>
+                  <a:txBody>
+                    <a:bodyPr/>
+                    <a:lstStyle/>
+                    <a:p>
+                      <a:pPr marL="0" marR="0" lvl="0" indent="0" algn="l" defTabSz="914400" rtl="0" eaLnBrk="1" fontAlgn="base" latinLnBrk="0" hangingPunct="1">
+                        <a:lnSpc>
+                          <a:spcPct val="100000"/>
+                        </a:lnSpc>
+                        <a:spcBef>
+                          <a:spcPct val="0"/>
+                        </a:spcBef>
+                        <a:spcAft>
+                          <a:spcPct val="0"/>
+                        </a:spcAft>
+                        <a:buClrTx/>
+                        <a:buSzTx/>
+                        <a:buFontTx/>
+                        <a:buNone/>
+                        <a:tabLst/>
+                      </a:pPr>
+                      <a:r>
+                        <a:rPr kumimoji="0" lang="ru-RU" sz="1000" b="0" i="0" u="none" strike="noStrike" cap="none" normalizeH="0" baseline="0" dirty="0">
+                          <a:ln>
+                            <a:noFill/>
+                          </a:ln>
+                          <a:solidFill>
+                            <a:schemeClr val="tx1"/>
+                          </a:solidFill>
+                          <a:effectLst/>
+                          <a:latin typeface="Times New Roman" pitchFamily="18" charset="0"/>
+                          <a:cs typeface="Times New Roman" pitchFamily="18" charset="0"/>
+                        </a:rPr>
+                        <a:t>Федотов А. А</a:t>
+                      </a:r>
+                    </a:p>
+                  </a:txBody>
+                  <a:tcPr marL="71962" marR="71962" marT="17991" marB="35979" horzOverflow="overflow">
+                    <a:lnL w="12700" cap="flat" cmpd="sng" algn="ctr">
+                      <a:solidFill>
+                        <a:srgbClr val="000000"/>
+                      </a:solidFill>
+                      <a:prstDash val="solid"/>
+                      <a:round/>
+                      <a:headEnd type="none" w="med" len="med"/>
+                      <a:tailEnd type="none" w="med" len="med"/>
+                    </a:lnL>
+                    <a:lnR w="12700" cap="flat" cmpd="sng" algn="ctr">
+                      <a:solidFill>
+                        <a:srgbClr val="000000"/>
+                      </a:solidFill>
+                      <a:prstDash val="solid"/>
+                      <a:round/>
+                      <a:headEnd type="none" w="med" len="med"/>
+                      <a:tailEnd type="none" w="med" len="med"/>
+                    </a:lnR>
+                    <a:lnT w="12700" cap="flat" cmpd="sng" algn="ctr">
+                      <a:solidFill>
+                        <a:srgbClr val="000000"/>
+                      </a:solidFill>
+                      <a:prstDash val="solid"/>
+                      <a:round/>
+                      <a:headEnd type="none" w="med" len="med"/>
+                      <a:tailEnd type="none" w="med" len="med"/>
+                    </a:lnT>
+                    <a:lnB w="12700" cap="flat" cmpd="sng" algn="ctr">
+                      <a:solidFill>
+                        <a:srgbClr val="000000"/>
+                      </a:solidFill>
+                      <a:prstDash val="solid"/>
+                      <a:round/>
+                      <a:headEnd type="none" w="med" len="med"/>
+                      <a:tailEnd type="none" w="med" len="med"/>
+                    </a:lnB>
+                    <a:lnTlToBr>
+                      <a:noFill/>
+                    </a:lnTlToBr>
+                    <a:lnBlToTr>
+                      <a:noFill/>
+                    </a:lnBlToTr>
+                    <a:noFill/>
+                  </a:tcPr>
+                </a:tc>
+                <a:tc>
+                  <a:txBody>
+                    <a:bodyPr/>
+                    <a:lstStyle/>
+                    <a:p>
+                      <a:pPr marL="0" marR="0" lvl="0" indent="0" algn="l" defTabSz="914400" rtl="0" eaLnBrk="1" fontAlgn="base" latinLnBrk="0" hangingPunct="1">
+                        <a:lnSpc>
+                          <a:spcPct val="100000"/>
+                        </a:lnSpc>
+                        <a:spcBef>
+                          <a:spcPct val="20000"/>
+                        </a:spcBef>
+                        <a:spcAft>
+                          <a:spcPct val="0"/>
+                        </a:spcAft>
+                        <a:buClrTx/>
+                        <a:buSzTx/>
+                        <a:buFontTx/>
+                        <a:buNone/>
+                        <a:tabLst/>
+                      </a:pPr>
+                      <a:endParaRPr kumimoji="0" lang="ru-RU" sz="1000" b="0" i="0" u="none" strike="noStrike" cap="none" normalizeH="0" baseline="0">
+                        <a:ln>
+                          <a:noFill/>
+                        </a:ln>
+                        <a:solidFill>
+                          <a:schemeClr val="tx1"/>
+                        </a:solidFill>
+                        <a:effectLst/>
+                        <a:latin typeface="Arial" charset="0"/>
+                      </a:endParaRPr>
+                    </a:p>
+                  </a:txBody>
+                  <a:tcPr marL="71962" marR="71962" marT="17991" marB="35979" horzOverflow="overflow">
+                    <a:lnL w="12700" cap="flat" cmpd="sng" algn="ctr">
+                      <a:solidFill>
+                        <a:srgbClr val="000000"/>
+                      </a:solidFill>
+                      <a:prstDash val="solid"/>
+                      <a:round/>
+                      <a:headEnd type="none" w="med" len="med"/>
+                      <a:tailEnd type="none" w="med" len="med"/>
+                    </a:lnL>
+                    <a:lnR w="12700" cap="flat" cmpd="sng" algn="ctr">
+                      <a:solidFill>
+                        <a:srgbClr val="000000"/>
+                      </a:solidFill>
+                      <a:prstDash val="solid"/>
+                      <a:round/>
+                      <a:headEnd type="none" w="med" len="med"/>
+                      <a:tailEnd type="none" w="med" len="med"/>
+                    </a:lnR>
+                    <a:lnT w="12700" cap="flat" cmpd="sng" algn="ctr">
+                      <a:solidFill>
+                        <a:srgbClr val="000000"/>
+                      </a:solidFill>
+                      <a:prstDash val="solid"/>
+                      <a:round/>
+                      <a:headEnd type="none" w="med" len="med"/>
+                      <a:tailEnd type="none" w="med" len="med"/>
+                    </a:lnT>
+                    <a:lnB w="12700" cap="flat" cmpd="sng" algn="ctr">
+                      <a:solidFill>
+                        <a:srgbClr val="000000"/>
+                      </a:solidFill>
+                      <a:prstDash val="solid"/>
+                      <a:round/>
+                      <a:headEnd type="none" w="med" len="med"/>
+                      <a:tailEnd type="none" w="med" len="med"/>
+                    </a:lnB>
+                    <a:lnTlToBr>
+                      <a:noFill/>
+                    </a:lnTlToBr>
+                    <a:lnBlToTr>
+                      <a:noFill/>
+                    </a:lnBlToTr>
+                    <a:noFill/>
+                  </a:tcPr>
+                </a:tc>
+                <a:tc>
+                  <a:txBody>
+                    <a:bodyPr/>
+                    <a:lstStyle/>
+                    <a:p>
+                      <a:pPr marL="0" marR="0" lvl="0" indent="0" algn="l" defTabSz="914400" rtl="0" eaLnBrk="1" fontAlgn="base" latinLnBrk="0" hangingPunct="1">
+                        <a:lnSpc>
+                          <a:spcPct val="100000"/>
+                        </a:lnSpc>
+                        <a:spcBef>
+                          <a:spcPct val="20000"/>
+                        </a:spcBef>
+                        <a:spcAft>
+                          <a:spcPct val="0"/>
+                        </a:spcAft>
+                        <a:buClrTx/>
+                        <a:buSzTx/>
+                        <a:buFontTx/>
+                        <a:buNone/>
+                        <a:tabLst/>
+                      </a:pPr>
+                      <a:r>
+                        <a:rPr kumimoji="0" lang="ru-RU" sz="1000" b="0" i="0" u="none" strike="noStrike" cap="none" normalizeH="0" baseline="0" dirty="0">
+                          <a:ln>
+                            <a:noFill/>
+                          </a:ln>
+                          <a:solidFill>
+                            <a:schemeClr val="tx1"/>
+                          </a:solidFill>
+                          <a:effectLst/>
+                          <a:latin typeface="Times New Roman" pitchFamily="18" charset="0"/>
+                        </a:rPr>
+                        <a:t>9</a:t>
+                      </a:r>
+                    </a:p>
+                  </a:txBody>
+                  <a:tcPr marL="71962" marR="71962" marT="17991" marB="35979" horzOverflow="overflow">
+                    <a:lnL w="12700" cap="flat" cmpd="sng" algn="ctr">
+                      <a:solidFill>
+                        <a:srgbClr val="000000"/>
+                      </a:solidFill>
+                      <a:prstDash val="solid"/>
+                      <a:round/>
+                      <a:headEnd type="none" w="med" len="med"/>
+                      <a:tailEnd type="none" w="med" len="med"/>
+                    </a:lnL>
+                    <a:lnR w="12700" cap="flat" cmpd="sng" algn="ctr">
+                      <a:solidFill>
+                        <a:srgbClr val="000000"/>
+                      </a:solidFill>
+                      <a:prstDash val="solid"/>
+                      <a:round/>
+                      <a:headEnd type="none" w="med" len="med"/>
+                      <a:tailEnd type="none" w="med" len="med"/>
+                    </a:lnR>
+                    <a:lnT w="12700" cap="flat" cmpd="sng" algn="ctr">
+                      <a:solidFill>
+                        <a:srgbClr val="000000"/>
+                      </a:solidFill>
+                      <a:prstDash val="solid"/>
+                      <a:round/>
+                      <a:headEnd type="none" w="med" len="med"/>
+                      <a:tailEnd type="none" w="med" len="med"/>
+                    </a:lnT>
+                    <a:lnB w="12700" cap="flat" cmpd="sng" algn="ctr">
+                      <a:solidFill>
+                        <a:srgbClr val="000000"/>
+                      </a:solidFill>
+                      <a:prstDash val="solid"/>
+                      <a:round/>
+                      <a:headEnd type="none" w="med" len="med"/>
+                      <a:tailEnd type="none" w="med" len="med"/>
+                    </a:lnB>
+                    <a:lnTlToBr>
+                      <a:noFill/>
+                    </a:lnTlToBr>
+                    <a:lnBlToTr>
+                      <a:noFill/>
+                    </a:lnBlToTr>
+                    <a:noFill/>
+                  </a:tcPr>
+                </a:tc>
+                <a:extLst>
+                  <a:ext uri="{0D108BD9-81ED-4DB2-BD59-A6C34878D82A}">
+                    <a16:rowId xmlns:a16="http://schemas.microsoft.com/office/drawing/2014/main" val="10000"/>
+                  </a:ext>
+                </a:extLst>
+              </a:tr>
+              <a:tr h="0">
+                <a:tc>
+                  <a:txBody>
+                    <a:bodyPr/>
+                    <a:lstStyle/>
+                    <a:p>
+                      <a:pPr marL="0" marR="0" lvl="0" indent="0" algn="l" defTabSz="914400" rtl="0" eaLnBrk="1" fontAlgn="base" latinLnBrk="0" hangingPunct="1">
+                        <a:lnSpc>
+                          <a:spcPct val="100000"/>
+                        </a:lnSpc>
+                        <a:spcBef>
+                          <a:spcPct val="0"/>
+                        </a:spcBef>
+                        <a:spcAft>
+                          <a:spcPct val="0"/>
+                        </a:spcAft>
+                        <a:buClrTx/>
+                        <a:buSzTx/>
+                        <a:buFontTx/>
+                        <a:buNone/>
+                        <a:tabLst/>
+                      </a:pPr>
+                      <a:r>
+                        <a:rPr kumimoji="0" lang="ru-RU" sz="1000" b="0" i="0" u="none" strike="noStrike" cap="none" normalizeH="0" baseline="0">
+                          <a:ln>
+                            <a:noFill/>
+                          </a:ln>
+                          <a:solidFill>
+                            <a:schemeClr val="tx1"/>
+                          </a:solidFill>
+                          <a:effectLst/>
+                          <a:latin typeface="Times New Roman" pitchFamily="18" charset="0"/>
+                          <a:cs typeface="Times New Roman" pitchFamily="18" charset="0"/>
+                        </a:rPr>
+                        <a:t>Утвердил</a:t>
+                      </a:r>
+                      <a:endParaRPr kumimoji="0" lang="ru-RU" sz="1000" b="0" i="0" u="none" strike="noStrike" cap="none" normalizeH="0" baseline="0">
+                        <a:ln>
+                          <a:noFill/>
+                        </a:ln>
+                        <a:solidFill>
+                          <a:schemeClr val="tx1"/>
+                        </a:solidFill>
+                        <a:effectLst/>
+                        <a:latin typeface="Arial" charset="0"/>
+                      </a:endParaRPr>
+                    </a:p>
+                  </a:txBody>
+                  <a:tcPr marL="71962" marR="71962" marT="17991" marB="35979" horzOverflow="overflow">
+                    <a:lnL w="12700" cap="flat" cmpd="sng" algn="ctr">
+                      <a:solidFill>
+                        <a:srgbClr val="000000"/>
+                      </a:solidFill>
+                      <a:prstDash val="solid"/>
+                      <a:round/>
+                      <a:headEnd type="none" w="med" len="med"/>
+                      <a:tailEnd type="none" w="med" len="med"/>
+                    </a:lnL>
+                    <a:lnR w="12700" cap="flat" cmpd="sng" algn="ctr">
+                      <a:solidFill>
+                        <a:srgbClr val="000000"/>
+                      </a:solidFill>
+                      <a:prstDash val="solid"/>
+                      <a:round/>
+                      <a:headEnd type="none" w="med" len="med"/>
+                      <a:tailEnd type="none" w="med" len="med"/>
+                    </a:lnR>
+                    <a:lnT w="12700" cap="flat" cmpd="sng" algn="ctr">
+                      <a:solidFill>
+                        <a:srgbClr val="000000"/>
+                      </a:solidFill>
+                      <a:prstDash val="solid"/>
+                      <a:round/>
+                      <a:headEnd type="none" w="med" len="med"/>
+                      <a:tailEnd type="none" w="med" len="med"/>
+                    </a:lnT>
+                    <a:lnB w="12700" cap="flat" cmpd="sng" algn="ctr">
+                      <a:solidFill>
+                        <a:srgbClr val="000000"/>
+                      </a:solidFill>
+                      <a:prstDash val="solid"/>
+                      <a:round/>
+                      <a:headEnd type="none" w="med" len="med"/>
+                      <a:tailEnd type="none" w="med" len="med"/>
+                    </a:lnB>
+                    <a:lnTlToBr>
+                      <a:noFill/>
+                    </a:lnTlToBr>
+                    <a:lnBlToTr>
+                      <a:noFill/>
+                    </a:lnBlToTr>
+                    <a:noFill/>
+                  </a:tcPr>
+                </a:tc>
+                <a:tc>
+                  <a:txBody>
+                    <a:bodyPr/>
+                    <a:lstStyle/>
+                    <a:p>
+                      <a:pPr marL="0" marR="0" lvl="0" indent="0" algn="l" defTabSz="914400" rtl="0" eaLnBrk="1" fontAlgn="base" latinLnBrk="0" hangingPunct="1">
+                        <a:lnSpc>
+                          <a:spcPct val="100000"/>
+                        </a:lnSpc>
+                        <a:spcBef>
+                          <a:spcPct val="0"/>
+                        </a:spcBef>
+                        <a:spcAft>
+                          <a:spcPct val="0"/>
+                        </a:spcAft>
+                        <a:buClrTx/>
+                        <a:buSzTx/>
+                        <a:buFontTx/>
+                        <a:buNone/>
+                        <a:tabLst/>
+                      </a:pPr>
+                      <a:r>
+                        <a:rPr kumimoji="0" lang="ru-RU" sz="1000" b="0" i="0" u="none" strike="noStrike" cap="none" normalizeH="0" baseline="0" dirty="0">
+                          <a:ln>
+                            <a:noFill/>
+                          </a:ln>
+                          <a:solidFill>
+                            <a:schemeClr val="tx1"/>
+                          </a:solidFill>
+                          <a:effectLst/>
+                          <a:latin typeface="Times New Roman" pitchFamily="18" charset="0"/>
+                          <a:cs typeface="Times New Roman" pitchFamily="18" charset="0"/>
+                        </a:rPr>
+                        <a:t>Касимов Р. А</a:t>
+                      </a:r>
+                    </a:p>
+                  </a:txBody>
+                  <a:tcPr marL="71962" marR="71962" marT="17991" marB="35979" horzOverflow="overflow">
+                    <a:lnL w="12700" cap="flat" cmpd="sng" algn="ctr">
+                      <a:solidFill>
+                        <a:srgbClr val="000000"/>
+                      </a:solidFill>
+                      <a:prstDash val="solid"/>
+                      <a:round/>
+                      <a:headEnd type="none" w="med" len="med"/>
+                      <a:tailEnd type="none" w="med" len="med"/>
+                    </a:lnL>
+                    <a:lnR w="12700" cap="flat" cmpd="sng" algn="ctr">
+                      <a:solidFill>
+                        <a:srgbClr val="000000"/>
+                      </a:solidFill>
+                      <a:prstDash val="solid"/>
+                      <a:round/>
+                      <a:headEnd type="none" w="med" len="med"/>
+                      <a:tailEnd type="none" w="med" len="med"/>
+                    </a:lnR>
+                    <a:lnT w="12700" cap="flat" cmpd="sng" algn="ctr">
+                      <a:solidFill>
+                        <a:srgbClr val="000000"/>
+                      </a:solidFill>
+                      <a:prstDash val="solid"/>
+                      <a:round/>
+                      <a:headEnd type="none" w="med" len="med"/>
+                      <a:tailEnd type="none" w="med" len="med"/>
+                    </a:lnT>
+                    <a:lnB w="12700" cap="flat" cmpd="sng" algn="ctr">
+                      <a:solidFill>
+                        <a:srgbClr val="000000"/>
+                      </a:solidFill>
+                      <a:prstDash val="solid"/>
+                      <a:round/>
+                      <a:headEnd type="none" w="med" len="med"/>
+                      <a:tailEnd type="none" w="med" len="med"/>
+                    </a:lnB>
+                    <a:lnTlToBr>
+                      <a:noFill/>
+                    </a:lnTlToBr>
+                    <a:lnBlToTr>
+                      <a:noFill/>
+                    </a:lnBlToTr>
+                    <a:noFill/>
+                  </a:tcPr>
+                </a:tc>
+                <a:tc>
+                  <a:txBody>
+                    <a:bodyPr/>
+                    <a:lstStyle/>
+                    <a:p>
+                      <a:pPr marL="0" marR="0" lvl="0" indent="0" algn="l" defTabSz="914400" rtl="0" eaLnBrk="1" fontAlgn="base" latinLnBrk="0" hangingPunct="1">
+                        <a:lnSpc>
+                          <a:spcPct val="100000"/>
+                        </a:lnSpc>
+                        <a:spcBef>
+                          <a:spcPct val="20000"/>
+                        </a:spcBef>
+                        <a:spcAft>
+                          <a:spcPct val="0"/>
+                        </a:spcAft>
+                        <a:buClrTx/>
+                        <a:buSzTx/>
+                        <a:buFontTx/>
+                        <a:buNone/>
+                        <a:tabLst/>
+                      </a:pPr>
+                      <a:endParaRPr kumimoji="0" lang="ru-RU" sz="1000" b="0" i="0" u="none" strike="noStrike" cap="none" normalizeH="0" baseline="0">
+                        <a:ln>
+                          <a:noFill/>
+                        </a:ln>
+                        <a:solidFill>
+                          <a:schemeClr val="tx1"/>
+                        </a:solidFill>
+                        <a:effectLst/>
+                        <a:latin typeface="Arial" charset="0"/>
+                      </a:endParaRPr>
+                    </a:p>
+                  </a:txBody>
+                  <a:tcPr marL="71962" marR="71962" marT="17991" marB="35979" horzOverflow="overflow">
+                    <a:lnL w="12700" cap="flat" cmpd="sng" algn="ctr">
+                      <a:solidFill>
+                        <a:srgbClr val="000000"/>
+                      </a:solidFill>
+                      <a:prstDash val="solid"/>
+                      <a:round/>
+                      <a:headEnd type="none" w="med" len="med"/>
+                      <a:tailEnd type="none" w="med" len="med"/>
+                    </a:lnL>
+                    <a:lnR w="12700" cap="flat" cmpd="sng" algn="ctr">
+                      <a:solidFill>
+                        <a:srgbClr val="000000"/>
+                      </a:solidFill>
+                      <a:prstDash val="solid"/>
+                      <a:round/>
+                      <a:headEnd type="none" w="med" len="med"/>
+                      <a:tailEnd type="none" w="med" len="med"/>
+                    </a:lnR>
+                    <a:lnT w="12700" cap="flat" cmpd="sng" algn="ctr">
+                      <a:solidFill>
+                        <a:srgbClr val="000000"/>
+                      </a:solidFill>
+                      <a:prstDash val="solid"/>
+                      <a:round/>
+                      <a:headEnd type="none" w="med" len="med"/>
+                      <a:tailEnd type="none" w="med" len="med"/>
+                    </a:lnT>
+                    <a:lnB w="12700" cap="flat" cmpd="sng" algn="ctr">
+                      <a:solidFill>
+                        <a:srgbClr val="000000"/>
+                      </a:solidFill>
+                      <a:prstDash val="solid"/>
+                      <a:round/>
+                      <a:headEnd type="none" w="med" len="med"/>
+                      <a:tailEnd type="none" w="med" len="med"/>
+                    </a:lnB>
+                    <a:lnTlToBr>
+                      <a:noFill/>
+                    </a:lnTlToBr>
+                    <a:lnBlToTr>
+                      <a:noFill/>
+                    </a:lnBlToTr>
+                    <a:noFill/>
+                  </a:tcPr>
+                </a:tc>
+                <a:tc>
+                  <a:txBody>
+                    <a:bodyPr/>
+                    <a:lstStyle/>
+                    <a:p>
+                      <a:pPr marL="0" marR="0" lvl="0" indent="0" algn="l" defTabSz="914400" rtl="0" eaLnBrk="1" fontAlgn="base" latinLnBrk="0" hangingPunct="1">
+                        <a:lnSpc>
+                          <a:spcPct val="100000"/>
+                        </a:lnSpc>
+                        <a:spcBef>
+                          <a:spcPct val="20000"/>
+                        </a:spcBef>
+                        <a:spcAft>
+                          <a:spcPct val="0"/>
+                        </a:spcAft>
+                        <a:buClrTx/>
+                        <a:buSzTx/>
+                        <a:buFontTx/>
+                        <a:buNone/>
+                        <a:tabLst/>
+                      </a:pPr>
+                      <a:endParaRPr kumimoji="0" lang="ru-RU" sz="1000" b="0" i="0" u="none" strike="noStrike" cap="none" normalizeH="0" baseline="0" dirty="0">
+                        <a:ln>
+                          <a:noFill/>
+                        </a:ln>
+                        <a:solidFill>
+                          <a:schemeClr val="tx1"/>
+                        </a:solidFill>
+                        <a:effectLst/>
+                        <a:latin typeface="Arial" charset="0"/>
+                      </a:endParaRPr>
+                    </a:p>
+                  </a:txBody>
+                  <a:tcPr marL="71962" marR="71962" marT="17991" marB="35979" horzOverflow="overflow">
+                    <a:lnL w="12700" cap="flat" cmpd="sng" algn="ctr">
+                      <a:solidFill>
+                        <a:srgbClr val="000000"/>
+                      </a:solidFill>
+                      <a:prstDash val="solid"/>
+                      <a:round/>
+                      <a:headEnd type="none" w="med" len="med"/>
+                      <a:tailEnd type="none" w="med" len="med"/>
+                    </a:lnL>
+                    <a:lnR w="12700" cap="flat" cmpd="sng" algn="ctr">
+                      <a:solidFill>
+                        <a:srgbClr val="000000"/>
+                      </a:solidFill>
+                      <a:prstDash val="solid"/>
+                      <a:round/>
+                      <a:headEnd type="none" w="med" len="med"/>
+                      <a:tailEnd type="none" w="med" len="med"/>
+                    </a:lnR>
+                    <a:lnT w="12700" cap="flat" cmpd="sng" algn="ctr">
+                      <a:solidFill>
+                        <a:srgbClr val="000000"/>
+                      </a:solidFill>
+                      <a:prstDash val="solid"/>
+                      <a:round/>
+                      <a:headEnd type="none" w="med" len="med"/>
+                      <a:tailEnd type="none" w="med" len="med"/>
+                    </a:lnT>
+                    <a:lnB w="12700" cap="flat" cmpd="sng" algn="ctr">
+                      <a:solidFill>
+                        <a:srgbClr val="000000"/>
+                      </a:solidFill>
+                      <a:prstDash val="solid"/>
+                      <a:round/>
+                      <a:headEnd type="none" w="med" len="med"/>
+                      <a:tailEnd type="none" w="med" len="med"/>
+                    </a:lnB>
+                    <a:lnTlToBr>
+                      <a:noFill/>
+                    </a:lnTlToBr>
+                    <a:lnBlToTr>
+                      <a:noFill/>
+                    </a:lnBlToTr>
+                    <a:noFill/>
+                  </a:tcPr>
+                </a:tc>
+                <a:extLst>
+                  <a:ext uri="{0D108BD9-81ED-4DB2-BD59-A6C34878D82A}">
+                    <a16:rowId xmlns:a16="http://schemas.microsoft.com/office/drawing/2014/main" val="10001"/>
+                  </a:ext>
+                </a:extLst>
+              </a:tr>
+            </a:tbl>
+          </a:graphicData>
+        </a:graphic>
+      </p:graphicFrame>
+      <p:sp>
+        <p:nvSpPr>
+          <p:cNvPr id="8" name="Line 158"/>
+          <p:cNvSpPr>
+            <a:spLocks noChangeShapeType="1"/>
+          </p:cNvSpPr>
+          <p:nvPr/>
+        </p:nvSpPr>
+        <p:spPr bwMode="auto">
+          <a:xfrm>
+            <a:off x="193675" y="188913"/>
+            <a:ext cx="8785225" cy="0"/>
+          </a:xfrm>
+          <a:prstGeom prst="line">
+            <a:avLst/>
+          </a:prstGeom>
+          <a:noFill/>
+          <a:ln w="12700" cap="sq">
+            <a:solidFill>
+              <a:schemeClr val="tx1"/>
+            </a:solidFill>
+            <a:round/>
+            <a:headEnd/>
+            <a:tailEnd/>
+          </a:ln>
+        </p:spPr>
+        <p:txBody>
+          <a:bodyPr/>
+          <a:lstStyle/>
+          <a:p>
+            <a:endParaRPr lang="ru-RU"/>
+          </a:p>
+        </p:txBody>
+      </p:sp>
+      <p:sp>
+        <p:nvSpPr>
+          <p:cNvPr id="9" name="Line 159"/>
+          <p:cNvSpPr>
+            <a:spLocks noChangeShapeType="1"/>
+          </p:cNvSpPr>
+          <p:nvPr/>
+        </p:nvSpPr>
+        <p:spPr bwMode="auto">
+          <a:xfrm>
+            <a:off x="193675" y="6669088"/>
+            <a:ext cx="8785225" cy="0"/>
+          </a:xfrm>
+          <a:prstGeom prst="line">
+            <a:avLst/>
+          </a:prstGeom>
+          <a:noFill/>
+          <a:ln w="12700" cap="sq">
+            <a:solidFill>
+              <a:schemeClr val="tx1"/>
+            </a:solidFill>
+            <a:round/>
+            <a:headEnd/>
+            <a:tailEnd/>
+          </a:ln>
+        </p:spPr>
+        <p:txBody>
+          <a:bodyPr/>
+          <a:lstStyle/>
+          <a:p>
+            <a:endParaRPr lang="ru-RU" dirty="0"/>
+          </a:p>
+        </p:txBody>
+      </p:sp>
+      <p:sp>
+        <p:nvSpPr>
+          <p:cNvPr id="10" name="Rectangle 25"/>
+          <p:cNvSpPr>
+            <a:spLocks noChangeArrowheads="1"/>
+          </p:cNvSpPr>
+          <p:nvPr/>
+        </p:nvSpPr>
+        <p:spPr bwMode="auto">
+          <a:xfrm>
+            <a:off x="342900" y="1380855"/>
+            <a:ext cx="8333556" cy="2677656"/>
+          </a:xfrm>
+          <a:prstGeom prst="rect">
+            <a:avLst/>
+          </a:prstGeom>
+          <a:noFill/>
+          <a:ln w="9525">
+            <a:noFill/>
+            <a:miter lim="800000"/>
+            <a:headEnd/>
+            <a:tailEnd/>
+          </a:ln>
+        </p:spPr>
+        <p:txBody>
+          <a:bodyPr wrap="square" anchor="ctr">
+            <a:spAutoFit/>
+          </a:bodyPr>
+          <a:lstStyle/>
+          <a:p>
+            <a:pPr>
+              <a:buFontTx/>
+              <a:buChar char="•"/>
+              <a:tabLst>
+                <a:tab pos="457200" algn="l"/>
+              </a:tabLst>
+            </a:pPr>
+            <a:r>
+              <a:rPr lang="ru-RU" sz="2400" dirty="0"/>
+              <a:t> исследована предметная область;</a:t>
+            </a:r>
+          </a:p>
+          <a:p>
+            <a:pPr>
+              <a:buFontTx/>
+              <a:buChar char="•"/>
+              <a:tabLst>
+                <a:tab pos="457200" algn="l"/>
+              </a:tabLst>
+            </a:pPr>
+            <a:r>
+              <a:rPr lang="ru-RU" sz="2400" dirty="0"/>
+              <a:t> проведён обзор существующих программных решений;</a:t>
+            </a:r>
+          </a:p>
+          <a:p>
+            <a:pPr>
+              <a:buFontTx/>
+              <a:buChar char="•"/>
+              <a:tabLst>
+                <a:tab pos="457200" algn="l"/>
+              </a:tabLst>
+            </a:pPr>
+            <a:r>
+              <a:rPr lang="ru-RU" sz="2400" dirty="0"/>
+              <a:t> выбраны язык и среда программирования;</a:t>
+            </a:r>
+          </a:p>
+          <a:p>
+            <a:pPr>
+              <a:buFontTx/>
+              <a:buChar char="•"/>
+              <a:tabLst>
+                <a:tab pos="457200" algn="l"/>
+              </a:tabLst>
+            </a:pPr>
+            <a:r>
+              <a:rPr lang="ru-RU" sz="2400" dirty="0"/>
+              <a:t> разработана схема данных ПМ НКСО;</a:t>
+            </a:r>
+          </a:p>
+          <a:p>
+            <a:pPr>
+              <a:buFontTx/>
+              <a:buChar char="•"/>
+              <a:tabLst>
+                <a:tab pos="457200" algn="l"/>
+              </a:tabLst>
+            </a:pPr>
+            <a:r>
+              <a:rPr lang="ru-RU" sz="2400" dirty="0"/>
+              <a:t> разработана схема алгоритма ПМ НКСО;</a:t>
+            </a:r>
+          </a:p>
+          <a:p>
+            <a:pPr>
+              <a:buFontTx/>
+              <a:buChar char="•"/>
+              <a:tabLst>
+                <a:tab pos="457200" algn="l"/>
+              </a:tabLst>
+            </a:pPr>
+            <a:r>
+              <a:rPr lang="ru-RU" sz="2400" dirty="0"/>
+              <a:t> выполнена программная реализация;</a:t>
+            </a:r>
+          </a:p>
+          <a:p>
+            <a:pPr>
+              <a:tabLst>
+                <a:tab pos="457200" algn="l"/>
+              </a:tabLst>
+            </a:pPr>
+            <a:endParaRPr lang="ru-RU" sz="2400" dirty="0"/>
+          </a:p>
+        </p:txBody>
+      </p:sp>
+    </p:spTree>
+  </p:cSld>
+  <p:clrMapOvr>
+    <a:masterClrMapping/>
+  </p:clrMapOvr>
+</p:sld>
+</file>
+
 <file path=ppt/slides/slide2.xml><?xml version="1.0" encoding="utf-8"?>
 <p:sld xmlns:a="http://schemas.openxmlformats.org/drawingml/2006/main" xmlns:r="http://schemas.openxmlformats.org/officeDocument/2006/relationships" xmlns:p="http://schemas.openxmlformats.org/presentationml/2006/main">
   <p:cSld>
@@ -5175,8 +6233,8 @@
           </a:p>
         </p:txBody>
       </p:sp>
-      <mc:AlternateContent xmlns:mc="http://schemas.openxmlformats.org/markup-compatibility/2006">
-        <mc:Choice xmlns:a14="http://schemas.microsoft.com/office/drawing/2010/main" Requires="a14">
+      <mc:AlternateContent xmlns:mc="http://schemas.openxmlformats.org/markup-compatibility/2006" xmlns:a14="http://schemas.microsoft.com/office/drawing/2010/main">
+        <mc:Choice Requires="a14">
           <p:graphicFrame>
             <p:nvGraphicFramePr>
               <p:cNvPr id="11" name="Таблица 10">
@@ -5558,7 +6616,7 @@
             </a:graphic>
           </p:graphicFrame>
         </mc:Choice>
-        <mc:Fallback>
+        <mc:Fallback xmlns="">
           <p:graphicFrame>
             <p:nvGraphicFramePr>
               <p:cNvPr id="11" name="Таблица 10">
@@ -6880,8 +7938,8 @@
           </a:p>
         </p:txBody>
       </p:sp>
-      <mc:AlternateContent xmlns:mc="http://schemas.openxmlformats.org/markup-compatibility/2006">
-        <mc:Choice xmlns:a14="http://schemas.microsoft.com/office/drawing/2010/main" Requires="a14">
+      <mc:AlternateContent xmlns:mc="http://schemas.openxmlformats.org/markup-compatibility/2006" xmlns:a14="http://schemas.microsoft.com/office/drawing/2010/main">
+        <mc:Choice Requires="a14">
           <p:graphicFrame>
             <p:nvGraphicFramePr>
               <p:cNvPr id="3" name="Таблица 2">
@@ -8414,7 +9472,7 @@
             </a:graphic>
           </p:graphicFrame>
         </mc:Choice>
-        <mc:Fallback>
+        <mc:Fallback xmlns="">
           <p:graphicFrame>
             <p:nvGraphicFramePr>
               <p:cNvPr id="3" name="Таблица 2">
@@ -10595,8 +11653,8 @@
           </a:p>
         </p:txBody>
       </p:sp>
-      <mc:AlternateContent xmlns:mc="http://schemas.openxmlformats.org/markup-compatibility/2006">
-        <mc:Choice xmlns:a14="http://schemas.microsoft.com/office/drawing/2010/main" Requires="a14">
+      <mc:AlternateContent xmlns:mc="http://schemas.openxmlformats.org/markup-compatibility/2006" xmlns:a14="http://schemas.microsoft.com/office/drawing/2010/main">
+        <mc:Choice Requires="a14">
           <p:graphicFrame>
             <p:nvGraphicFramePr>
               <p:cNvPr id="16" name="Таблица 15">
@@ -12160,7 +13218,7 @@
             </a:graphic>
           </p:graphicFrame>
         </mc:Choice>
-        <mc:Fallback>
+        <mc:Fallback xmlns="">
           <p:graphicFrame>
             <p:nvGraphicFramePr>
               <p:cNvPr id="16" name="Таблица 15">
@@ -21355,1037 +22413,307 @@
       </p:grpSpPr>
       <p:sp>
         <p:nvSpPr>
-          <p:cNvPr id="4" name="Rectangle 23"/>
-          <p:cNvSpPr>
-            <a:spLocks noChangeArrowheads="1"/>
-          </p:cNvSpPr>
+          <p:cNvPr id="2" name="Google Shape;244;g8998f6f379_0_0">
+            <a:extLst>
+              <a:ext uri="{FF2B5EF4-FFF2-40B4-BE49-F238E27FC236}">
+                <a16:creationId xmlns:a16="http://schemas.microsoft.com/office/drawing/2014/main" id="{98AAF697-FE53-4BB9-8320-FC0C82067E8C}"/>
+              </a:ext>
+            </a:extLst>
+          </p:cNvPr>
+          <p:cNvSpPr/>
           <p:nvPr/>
         </p:nvSpPr>
-        <p:spPr bwMode="auto">
+        <p:spPr>
           <a:xfrm>
-            <a:off x="250825" y="260350"/>
-            <a:ext cx="8642350" cy="427038"/>
+            <a:off x="251520" y="260648"/>
+            <a:ext cx="8642400" cy="426900"/>
           </a:xfrm>
           <a:prstGeom prst="rect">
             <a:avLst/>
           </a:prstGeom>
           <a:noFill/>
-          <a:ln w="9525">
+          <a:ln>
             <a:noFill/>
-            <a:miter lim="800000"/>
-            <a:headEnd/>
-            <a:tailEnd/>
           </a:ln>
         </p:spPr>
         <p:txBody>
-          <a:bodyPr>
-            <a:spAutoFit/>
+          <a:bodyPr spcFirstLastPara="1" wrap="square" lIns="91425" tIns="45700" rIns="91425" bIns="45700" anchor="t" anchorCtr="0">
+            <a:noAutofit/>
           </a:bodyPr>
           <a:lstStyle/>
           <a:p>
-            <a:pPr algn="ctr"/>
+            <a:pPr marL="0" marR="0" lvl="0" indent="0" algn="ctr" rtl="0">
+              <a:spcBef>
+                <a:spcPts val="0"/>
+              </a:spcBef>
+              <a:spcAft>
+                <a:spcPts val="0"/>
+              </a:spcAft>
+              <a:buNone/>
+            </a:pPr>
             <a:r>
-              <a:rPr lang="ru-RU" sz="2200" b="1" dirty="0"/>
-              <a:t>Результаты работы</a:t>
+              <a:rPr lang="ru-RU" sz="2200" b="1">
+                <a:solidFill>
+                  <a:schemeClr val="dk1"/>
+                </a:solidFill>
+                <a:latin typeface="Times New Roman"/>
+                <a:ea typeface="Times New Roman"/>
+                <a:cs typeface="Times New Roman"/>
+                <a:sym typeface="Times New Roman"/>
+              </a:rPr>
+              <a:t>Отладка и тестирование</a:t>
             </a:r>
+            <a:endParaRPr sz="2200" b="1">
+              <a:solidFill>
+                <a:schemeClr val="dk1"/>
+              </a:solidFill>
+              <a:latin typeface="Times New Roman"/>
+              <a:ea typeface="Times New Roman"/>
+              <a:cs typeface="Times New Roman"/>
+              <a:sym typeface="Times New Roman"/>
+            </a:endParaRPr>
           </a:p>
         </p:txBody>
       </p:sp>
-      <p:sp>
-        <p:nvSpPr>
-          <p:cNvPr id="5" name="Line 137"/>
-          <p:cNvSpPr>
-            <a:spLocks noChangeShapeType="1"/>
-          </p:cNvSpPr>
+      <p:cxnSp>
+        <p:nvCxnSpPr>
+          <p:cNvPr id="3" name="Google Shape;245;g8998f6f379_0_0">
+            <a:extLst>
+              <a:ext uri="{FF2B5EF4-FFF2-40B4-BE49-F238E27FC236}">
+                <a16:creationId xmlns:a16="http://schemas.microsoft.com/office/drawing/2014/main" id="{71994361-8B6A-4007-A52C-60DEEB123B29}"/>
+              </a:ext>
+            </a:extLst>
+          </p:cNvPr>
+          <p:cNvCxnSpPr/>
           <p:nvPr/>
-        </p:nvSpPr>
-        <p:spPr bwMode="auto">
+        </p:nvCxnSpPr>
+        <p:spPr>
           <a:xfrm>
             <a:off x="193675" y="188913"/>
-            <a:ext cx="0" cy="6480175"/>
+            <a:ext cx="0" cy="6480300"/>
           </a:xfrm>
-          <a:prstGeom prst="line">
+          <a:prstGeom prst="straightConnector1">
             <a:avLst/>
           </a:prstGeom>
           <a:noFill/>
-          <a:ln w="12700" cap="sq">
+          <a:ln w="12700" cap="sq" cmpd="sng">
             <a:solidFill>
-              <a:schemeClr val="tx1"/>
+              <a:schemeClr val="dk1"/>
             </a:solidFill>
+            <a:prstDash val="solid"/>
             <a:round/>
-            <a:headEnd/>
-            <a:tailEnd/>
+            <a:headEnd type="none" w="med" len="med"/>
+            <a:tailEnd type="none" w="med" len="med"/>
           </a:ln>
         </p:spPr>
-        <p:txBody>
-          <a:bodyPr/>
-          <a:lstStyle/>
-          <a:p>
-            <a:endParaRPr lang="ru-RU"/>
-          </a:p>
-        </p:txBody>
-      </p:sp>
-      <p:sp>
-        <p:nvSpPr>
-          <p:cNvPr id="6" name="Line 138"/>
-          <p:cNvSpPr>
-            <a:spLocks noChangeShapeType="1"/>
-          </p:cNvSpPr>
+      </p:cxnSp>
+      <p:cxnSp>
+        <p:nvCxnSpPr>
+          <p:cNvPr id="4" name="Google Shape;246;g8998f6f379_0_0">
+            <a:extLst>
+              <a:ext uri="{FF2B5EF4-FFF2-40B4-BE49-F238E27FC236}">
+                <a16:creationId xmlns:a16="http://schemas.microsoft.com/office/drawing/2014/main" id="{618E18A2-1416-48A5-AFBE-563EB23EDC67}"/>
+              </a:ext>
+            </a:extLst>
+          </p:cNvPr>
+          <p:cNvCxnSpPr/>
           <p:nvPr/>
-        </p:nvSpPr>
-        <p:spPr bwMode="auto">
+        </p:nvCxnSpPr>
+        <p:spPr>
           <a:xfrm>
             <a:off x="8978900" y="188913"/>
-            <a:ext cx="0" cy="6480175"/>
+            <a:ext cx="0" cy="6480300"/>
           </a:xfrm>
-          <a:prstGeom prst="line">
+          <a:prstGeom prst="straightConnector1">
             <a:avLst/>
           </a:prstGeom>
           <a:noFill/>
-          <a:ln w="12700" cap="sq">
+          <a:ln w="12700" cap="sq" cmpd="sng">
             <a:solidFill>
-              <a:schemeClr val="tx1"/>
+              <a:schemeClr val="dk1"/>
             </a:solidFill>
+            <a:prstDash val="solid"/>
             <a:round/>
-            <a:headEnd/>
-            <a:tailEnd/>
+            <a:headEnd type="none" w="med" len="med"/>
+            <a:tailEnd type="none" w="med" len="med"/>
           </a:ln>
         </p:spPr>
-        <p:txBody>
-          <a:bodyPr/>
-          <a:lstStyle/>
-          <a:p>
-            <a:endParaRPr lang="ru-RU"/>
-          </a:p>
-        </p:txBody>
-      </p:sp>
-      <p:graphicFrame>
-        <p:nvGraphicFramePr>
-          <p:cNvPr id="7" name="Group 10"/>
-          <p:cNvGraphicFramePr>
-            <a:graphicFrameLocks noGrp="1"/>
-          </p:cNvGraphicFramePr>
-          <p:nvPr>
-            <p:extLst>
-              <p:ext uri="{D42A27DB-BD31-4B8C-83A1-F6EECF244321}">
-                <p14:modId xmlns:p14="http://schemas.microsoft.com/office/powerpoint/2010/main" val="1946067037"/>
-              </p:ext>
-            </p:extLst>
-          </p:nvPr>
-        </p:nvGraphicFramePr>
-        <p:xfrm>
-          <a:off x="6156325" y="6093297"/>
-          <a:ext cx="2822575" cy="574194"/>
-        </p:xfrm>
-        <a:graphic>
-          <a:graphicData uri="http://schemas.openxmlformats.org/drawingml/2006/table">
-            <a:tbl>
-              <a:tblPr/>
-              <a:tblGrid>
-                <a:gridCol w="792163">
-                  <a:extLst>
-                    <a:ext uri="{9D8B030D-6E8A-4147-A177-3AD203B41FA5}">
-                      <a16:colId xmlns:a16="http://schemas.microsoft.com/office/drawing/2014/main" val="20000"/>
-                    </a:ext>
-                  </a:extLst>
-                </a:gridCol>
-                <a:gridCol w="1008062">
-                  <a:extLst>
-                    <a:ext uri="{9D8B030D-6E8A-4147-A177-3AD203B41FA5}">
-                      <a16:colId xmlns:a16="http://schemas.microsoft.com/office/drawing/2014/main" val="20001"/>
-                    </a:ext>
-                  </a:extLst>
-                </a:gridCol>
-                <a:gridCol w="649288">
-                  <a:extLst>
-                    <a:ext uri="{9D8B030D-6E8A-4147-A177-3AD203B41FA5}">
-                      <a16:colId xmlns:a16="http://schemas.microsoft.com/office/drawing/2014/main" val="20002"/>
-                    </a:ext>
-                  </a:extLst>
-                </a:gridCol>
-                <a:gridCol w="373062">
-                  <a:extLst>
-                    <a:ext uri="{9D8B030D-6E8A-4147-A177-3AD203B41FA5}">
-                      <a16:colId xmlns:a16="http://schemas.microsoft.com/office/drawing/2014/main" val="20003"/>
-                    </a:ext>
-                  </a:extLst>
-                </a:gridCol>
-              </a:tblGrid>
-              <a:tr h="367824">
-                <a:tc>
-                  <a:txBody>
-                    <a:bodyPr/>
-                    <a:lstStyle/>
-                    <a:p>
-                      <a:pPr marL="0" marR="0" lvl="0" indent="0" algn="l" defTabSz="914400" rtl="0" eaLnBrk="1" fontAlgn="base" latinLnBrk="0" hangingPunct="1">
-                        <a:lnSpc>
-                          <a:spcPct val="100000"/>
-                        </a:lnSpc>
-                        <a:spcBef>
-                          <a:spcPct val="0"/>
-                        </a:spcBef>
-                        <a:spcAft>
-                          <a:spcPct val="0"/>
-                        </a:spcAft>
-                        <a:buClrTx/>
-                        <a:buSzTx/>
-                        <a:buFontTx/>
-                        <a:buNone/>
-                        <a:tabLst/>
-                      </a:pPr>
-                      <a:r>
-                        <a:rPr kumimoji="0" lang="ru-RU" sz="1000" b="0" i="0" u="none" strike="noStrike" cap="none" normalizeH="0" baseline="0" dirty="0">
-                          <a:ln>
-                            <a:noFill/>
-                          </a:ln>
-                          <a:solidFill>
-                            <a:schemeClr val="tx1"/>
-                          </a:solidFill>
-                          <a:effectLst/>
-                          <a:latin typeface="Times New Roman" pitchFamily="18" charset="0"/>
-                          <a:cs typeface="Times New Roman" pitchFamily="18" charset="0"/>
-                        </a:rPr>
-                        <a:t>Разработал</a:t>
-                      </a:r>
-                      <a:endParaRPr kumimoji="0" lang="ru-RU" sz="1000" b="0" i="0" u="none" strike="noStrike" cap="none" normalizeH="0" baseline="0" dirty="0">
-                        <a:ln>
-                          <a:noFill/>
-                        </a:ln>
-                        <a:solidFill>
-                          <a:schemeClr val="tx1"/>
-                        </a:solidFill>
-                        <a:effectLst/>
-                        <a:latin typeface="Arial" charset="0"/>
-                      </a:endParaRPr>
-                    </a:p>
-                  </a:txBody>
-                  <a:tcPr marL="71962" marR="71962" marT="17991" marB="35979" horzOverflow="overflow">
-                    <a:lnL w="12700" cap="flat" cmpd="sng" algn="ctr">
-                      <a:solidFill>
-                        <a:srgbClr val="000000"/>
-                      </a:solidFill>
-                      <a:prstDash val="solid"/>
-                      <a:round/>
-                      <a:headEnd type="none" w="med" len="med"/>
-                      <a:tailEnd type="none" w="med" len="med"/>
-                    </a:lnL>
-                    <a:lnR w="12700" cap="flat" cmpd="sng" algn="ctr">
-                      <a:solidFill>
-                        <a:srgbClr val="000000"/>
-                      </a:solidFill>
-                      <a:prstDash val="solid"/>
-                      <a:round/>
-                      <a:headEnd type="none" w="med" len="med"/>
-                      <a:tailEnd type="none" w="med" len="med"/>
-                    </a:lnR>
-                    <a:lnT w="12700" cap="flat" cmpd="sng" algn="ctr">
-                      <a:solidFill>
-                        <a:srgbClr val="000000"/>
-                      </a:solidFill>
-                      <a:prstDash val="solid"/>
-                      <a:round/>
-                      <a:headEnd type="none" w="med" len="med"/>
-                      <a:tailEnd type="none" w="med" len="med"/>
-                    </a:lnT>
-                    <a:lnB w="12700" cap="flat" cmpd="sng" algn="ctr">
-                      <a:solidFill>
-                        <a:srgbClr val="000000"/>
-                      </a:solidFill>
-                      <a:prstDash val="solid"/>
-                      <a:round/>
-                      <a:headEnd type="none" w="med" len="med"/>
-                      <a:tailEnd type="none" w="med" len="med"/>
-                    </a:lnB>
-                    <a:lnTlToBr>
-                      <a:noFill/>
-                    </a:lnTlToBr>
-                    <a:lnBlToTr>
-                      <a:noFill/>
-                    </a:lnBlToTr>
-                    <a:noFill/>
-                  </a:tcPr>
-                </a:tc>
-                <a:tc>
-                  <a:txBody>
-                    <a:bodyPr/>
-                    <a:lstStyle/>
-                    <a:p>
-                      <a:pPr marL="0" marR="0" lvl="0" indent="0" algn="l" defTabSz="914400" rtl="0" eaLnBrk="1" fontAlgn="base" latinLnBrk="0" hangingPunct="1">
-                        <a:lnSpc>
-                          <a:spcPct val="100000"/>
-                        </a:lnSpc>
-                        <a:spcBef>
-                          <a:spcPct val="0"/>
-                        </a:spcBef>
-                        <a:spcAft>
-                          <a:spcPct val="0"/>
-                        </a:spcAft>
-                        <a:buClrTx/>
-                        <a:buSzTx/>
-                        <a:buFontTx/>
-                        <a:buNone/>
-                        <a:tabLst/>
-                      </a:pPr>
-                      <a:r>
-                        <a:rPr kumimoji="0" lang="ru-RU" sz="1000" b="0" i="0" u="none" strike="noStrike" cap="none" normalizeH="0" baseline="0" dirty="0">
-                          <a:ln>
-                            <a:noFill/>
-                          </a:ln>
-                          <a:solidFill>
-                            <a:schemeClr val="tx1"/>
-                          </a:solidFill>
-                          <a:effectLst/>
-                          <a:latin typeface="Times New Roman" pitchFamily="18" charset="0"/>
-                          <a:cs typeface="Times New Roman" pitchFamily="18" charset="0"/>
-                        </a:rPr>
-                        <a:t>Федотов А. А</a:t>
-                      </a:r>
-                    </a:p>
-                  </a:txBody>
-                  <a:tcPr marL="71962" marR="71962" marT="17991" marB="35979" horzOverflow="overflow">
-                    <a:lnL w="12700" cap="flat" cmpd="sng" algn="ctr">
-                      <a:solidFill>
-                        <a:srgbClr val="000000"/>
-                      </a:solidFill>
-                      <a:prstDash val="solid"/>
-                      <a:round/>
-                      <a:headEnd type="none" w="med" len="med"/>
-                      <a:tailEnd type="none" w="med" len="med"/>
-                    </a:lnL>
-                    <a:lnR w="12700" cap="flat" cmpd="sng" algn="ctr">
-                      <a:solidFill>
-                        <a:srgbClr val="000000"/>
-                      </a:solidFill>
-                      <a:prstDash val="solid"/>
-                      <a:round/>
-                      <a:headEnd type="none" w="med" len="med"/>
-                      <a:tailEnd type="none" w="med" len="med"/>
-                    </a:lnR>
-                    <a:lnT w="12700" cap="flat" cmpd="sng" algn="ctr">
-                      <a:solidFill>
-                        <a:srgbClr val="000000"/>
-                      </a:solidFill>
-                      <a:prstDash val="solid"/>
-                      <a:round/>
-                      <a:headEnd type="none" w="med" len="med"/>
-                      <a:tailEnd type="none" w="med" len="med"/>
-                    </a:lnT>
-                    <a:lnB w="12700" cap="flat" cmpd="sng" algn="ctr">
-                      <a:solidFill>
-                        <a:srgbClr val="000000"/>
-                      </a:solidFill>
-                      <a:prstDash val="solid"/>
-                      <a:round/>
-                      <a:headEnd type="none" w="med" len="med"/>
-                      <a:tailEnd type="none" w="med" len="med"/>
-                    </a:lnB>
-                    <a:lnTlToBr>
-                      <a:noFill/>
-                    </a:lnTlToBr>
-                    <a:lnBlToTr>
-                      <a:noFill/>
-                    </a:lnBlToTr>
-                    <a:noFill/>
-                  </a:tcPr>
-                </a:tc>
-                <a:tc>
-                  <a:txBody>
-                    <a:bodyPr/>
-                    <a:lstStyle/>
-                    <a:p>
-                      <a:pPr marL="0" marR="0" lvl="0" indent="0" algn="l" defTabSz="914400" rtl="0" eaLnBrk="1" fontAlgn="base" latinLnBrk="0" hangingPunct="1">
-                        <a:lnSpc>
-                          <a:spcPct val="100000"/>
-                        </a:lnSpc>
-                        <a:spcBef>
-                          <a:spcPct val="20000"/>
-                        </a:spcBef>
-                        <a:spcAft>
-                          <a:spcPct val="0"/>
-                        </a:spcAft>
-                        <a:buClrTx/>
-                        <a:buSzTx/>
-                        <a:buFontTx/>
-                        <a:buNone/>
-                        <a:tabLst/>
-                      </a:pPr>
-                      <a:endParaRPr kumimoji="0" lang="ru-RU" sz="1000" b="0" i="0" u="none" strike="noStrike" cap="none" normalizeH="0" baseline="0">
-                        <a:ln>
-                          <a:noFill/>
-                        </a:ln>
-                        <a:solidFill>
-                          <a:schemeClr val="tx1"/>
-                        </a:solidFill>
-                        <a:effectLst/>
-                        <a:latin typeface="Arial" charset="0"/>
-                      </a:endParaRPr>
-                    </a:p>
-                  </a:txBody>
-                  <a:tcPr marL="71962" marR="71962" marT="17991" marB="35979" horzOverflow="overflow">
-                    <a:lnL w="12700" cap="flat" cmpd="sng" algn="ctr">
-                      <a:solidFill>
-                        <a:srgbClr val="000000"/>
-                      </a:solidFill>
-                      <a:prstDash val="solid"/>
-                      <a:round/>
-                      <a:headEnd type="none" w="med" len="med"/>
-                      <a:tailEnd type="none" w="med" len="med"/>
-                    </a:lnL>
-                    <a:lnR w="12700" cap="flat" cmpd="sng" algn="ctr">
-                      <a:solidFill>
-                        <a:srgbClr val="000000"/>
-                      </a:solidFill>
-                      <a:prstDash val="solid"/>
-                      <a:round/>
-                      <a:headEnd type="none" w="med" len="med"/>
-                      <a:tailEnd type="none" w="med" len="med"/>
-                    </a:lnR>
-                    <a:lnT w="12700" cap="flat" cmpd="sng" algn="ctr">
-                      <a:solidFill>
-                        <a:srgbClr val="000000"/>
-                      </a:solidFill>
-                      <a:prstDash val="solid"/>
-                      <a:round/>
-                      <a:headEnd type="none" w="med" len="med"/>
-                      <a:tailEnd type="none" w="med" len="med"/>
-                    </a:lnT>
-                    <a:lnB w="12700" cap="flat" cmpd="sng" algn="ctr">
-                      <a:solidFill>
-                        <a:srgbClr val="000000"/>
-                      </a:solidFill>
-                      <a:prstDash val="solid"/>
-                      <a:round/>
-                      <a:headEnd type="none" w="med" len="med"/>
-                      <a:tailEnd type="none" w="med" len="med"/>
-                    </a:lnB>
-                    <a:lnTlToBr>
-                      <a:noFill/>
-                    </a:lnTlToBr>
-                    <a:lnBlToTr>
-                      <a:noFill/>
-                    </a:lnBlToTr>
-                    <a:noFill/>
-                  </a:tcPr>
-                </a:tc>
-                <a:tc>
-                  <a:txBody>
-                    <a:bodyPr/>
-                    <a:lstStyle/>
-                    <a:p>
-                      <a:pPr marL="0" marR="0" lvl="0" indent="0" algn="l" defTabSz="914400" rtl="0" eaLnBrk="1" fontAlgn="base" latinLnBrk="0" hangingPunct="1">
-                        <a:lnSpc>
-                          <a:spcPct val="100000"/>
-                        </a:lnSpc>
-                        <a:spcBef>
-                          <a:spcPct val="20000"/>
-                        </a:spcBef>
-                        <a:spcAft>
-                          <a:spcPct val="0"/>
-                        </a:spcAft>
-                        <a:buClrTx/>
-                        <a:buSzTx/>
-                        <a:buFontTx/>
-                        <a:buNone/>
-                        <a:tabLst/>
-                      </a:pPr>
-                      <a:r>
-                        <a:rPr kumimoji="0" lang="ru-RU" sz="1000" b="0" i="0" u="none" strike="noStrike" cap="none" normalizeH="0" baseline="0" dirty="0">
-                          <a:ln>
-                            <a:noFill/>
-                          </a:ln>
-                          <a:solidFill>
-                            <a:schemeClr val="tx1"/>
-                          </a:solidFill>
-                          <a:effectLst/>
-                          <a:latin typeface="Times New Roman" pitchFamily="18" charset="0"/>
-                        </a:rPr>
-                        <a:t>9</a:t>
-                      </a:r>
-                    </a:p>
-                  </a:txBody>
-                  <a:tcPr marL="71962" marR="71962" marT="17991" marB="35979" horzOverflow="overflow">
-                    <a:lnL w="12700" cap="flat" cmpd="sng" algn="ctr">
-                      <a:solidFill>
-                        <a:srgbClr val="000000"/>
-                      </a:solidFill>
-                      <a:prstDash val="solid"/>
-                      <a:round/>
-                      <a:headEnd type="none" w="med" len="med"/>
-                      <a:tailEnd type="none" w="med" len="med"/>
-                    </a:lnL>
-                    <a:lnR w="12700" cap="flat" cmpd="sng" algn="ctr">
-                      <a:solidFill>
-                        <a:srgbClr val="000000"/>
-                      </a:solidFill>
-                      <a:prstDash val="solid"/>
-                      <a:round/>
-                      <a:headEnd type="none" w="med" len="med"/>
-                      <a:tailEnd type="none" w="med" len="med"/>
-                    </a:lnR>
-                    <a:lnT w="12700" cap="flat" cmpd="sng" algn="ctr">
-                      <a:solidFill>
-                        <a:srgbClr val="000000"/>
-                      </a:solidFill>
-                      <a:prstDash val="solid"/>
-                      <a:round/>
-                      <a:headEnd type="none" w="med" len="med"/>
-                      <a:tailEnd type="none" w="med" len="med"/>
-                    </a:lnT>
-                    <a:lnB w="12700" cap="flat" cmpd="sng" algn="ctr">
-                      <a:solidFill>
-                        <a:srgbClr val="000000"/>
-                      </a:solidFill>
-                      <a:prstDash val="solid"/>
-                      <a:round/>
-                      <a:headEnd type="none" w="med" len="med"/>
-                      <a:tailEnd type="none" w="med" len="med"/>
-                    </a:lnB>
-                    <a:lnTlToBr>
-                      <a:noFill/>
-                    </a:lnTlToBr>
-                    <a:lnBlToTr>
-                      <a:noFill/>
-                    </a:lnBlToTr>
-                    <a:noFill/>
-                  </a:tcPr>
-                </a:tc>
-                <a:extLst>
-                  <a:ext uri="{0D108BD9-81ED-4DB2-BD59-A6C34878D82A}">
-                    <a16:rowId xmlns:a16="http://schemas.microsoft.com/office/drawing/2014/main" val="10000"/>
-                  </a:ext>
-                </a:extLst>
-              </a:tr>
-              <a:tr h="0">
-                <a:tc>
-                  <a:txBody>
-                    <a:bodyPr/>
-                    <a:lstStyle/>
-                    <a:p>
-                      <a:pPr marL="0" marR="0" lvl="0" indent="0" algn="l" defTabSz="914400" rtl="0" eaLnBrk="1" fontAlgn="base" latinLnBrk="0" hangingPunct="1">
-                        <a:lnSpc>
-                          <a:spcPct val="100000"/>
-                        </a:lnSpc>
-                        <a:spcBef>
-                          <a:spcPct val="0"/>
-                        </a:spcBef>
-                        <a:spcAft>
-                          <a:spcPct val="0"/>
-                        </a:spcAft>
-                        <a:buClrTx/>
-                        <a:buSzTx/>
-                        <a:buFontTx/>
-                        <a:buNone/>
-                        <a:tabLst/>
-                      </a:pPr>
-                      <a:r>
-                        <a:rPr kumimoji="0" lang="ru-RU" sz="1000" b="0" i="0" u="none" strike="noStrike" cap="none" normalizeH="0" baseline="0">
-                          <a:ln>
-                            <a:noFill/>
-                          </a:ln>
-                          <a:solidFill>
-                            <a:schemeClr val="tx1"/>
-                          </a:solidFill>
-                          <a:effectLst/>
-                          <a:latin typeface="Times New Roman" pitchFamily="18" charset="0"/>
-                          <a:cs typeface="Times New Roman" pitchFamily="18" charset="0"/>
-                        </a:rPr>
-                        <a:t>Утвердил</a:t>
-                      </a:r>
-                      <a:endParaRPr kumimoji="0" lang="ru-RU" sz="1000" b="0" i="0" u="none" strike="noStrike" cap="none" normalizeH="0" baseline="0">
-                        <a:ln>
-                          <a:noFill/>
-                        </a:ln>
-                        <a:solidFill>
-                          <a:schemeClr val="tx1"/>
-                        </a:solidFill>
-                        <a:effectLst/>
-                        <a:latin typeface="Arial" charset="0"/>
-                      </a:endParaRPr>
-                    </a:p>
-                  </a:txBody>
-                  <a:tcPr marL="71962" marR="71962" marT="17991" marB="35979" horzOverflow="overflow">
-                    <a:lnL w="12700" cap="flat" cmpd="sng" algn="ctr">
-                      <a:solidFill>
-                        <a:srgbClr val="000000"/>
-                      </a:solidFill>
-                      <a:prstDash val="solid"/>
-                      <a:round/>
-                      <a:headEnd type="none" w="med" len="med"/>
-                      <a:tailEnd type="none" w="med" len="med"/>
-                    </a:lnL>
-                    <a:lnR w="12700" cap="flat" cmpd="sng" algn="ctr">
-                      <a:solidFill>
-                        <a:srgbClr val="000000"/>
-                      </a:solidFill>
-                      <a:prstDash val="solid"/>
-                      <a:round/>
-                      <a:headEnd type="none" w="med" len="med"/>
-                      <a:tailEnd type="none" w="med" len="med"/>
-                    </a:lnR>
-                    <a:lnT w="12700" cap="flat" cmpd="sng" algn="ctr">
-                      <a:solidFill>
-                        <a:srgbClr val="000000"/>
-                      </a:solidFill>
-                      <a:prstDash val="solid"/>
-                      <a:round/>
-                      <a:headEnd type="none" w="med" len="med"/>
-                      <a:tailEnd type="none" w="med" len="med"/>
-                    </a:lnT>
-                    <a:lnB w="12700" cap="flat" cmpd="sng" algn="ctr">
-                      <a:solidFill>
-                        <a:srgbClr val="000000"/>
-                      </a:solidFill>
-                      <a:prstDash val="solid"/>
-                      <a:round/>
-                      <a:headEnd type="none" w="med" len="med"/>
-                      <a:tailEnd type="none" w="med" len="med"/>
-                    </a:lnB>
-                    <a:lnTlToBr>
-                      <a:noFill/>
-                    </a:lnTlToBr>
-                    <a:lnBlToTr>
-                      <a:noFill/>
-                    </a:lnBlToTr>
-                    <a:noFill/>
-                  </a:tcPr>
-                </a:tc>
-                <a:tc>
-                  <a:txBody>
-                    <a:bodyPr/>
-                    <a:lstStyle/>
-                    <a:p>
-                      <a:pPr marL="0" marR="0" lvl="0" indent="0" algn="l" defTabSz="914400" rtl="0" eaLnBrk="1" fontAlgn="base" latinLnBrk="0" hangingPunct="1">
-                        <a:lnSpc>
-                          <a:spcPct val="100000"/>
-                        </a:lnSpc>
-                        <a:spcBef>
-                          <a:spcPct val="0"/>
-                        </a:spcBef>
-                        <a:spcAft>
-                          <a:spcPct val="0"/>
-                        </a:spcAft>
-                        <a:buClrTx/>
-                        <a:buSzTx/>
-                        <a:buFontTx/>
-                        <a:buNone/>
-                        <a:tabLst/>
-                      </a:pPr>
-                      <a:r>
-                        <a:rPr kumimoji="0" lang="ru-RU" sz="1000" b="0" i="0" u="none" strike="noStrike" cap="none" normalizeH="0" baseline="0" dirty="0">
-                          <a:ln>
-                            <a:noFill/>
-                          </a:ln>
-                          <a:solidFill>
-                            <a:schemeClr val="tx1"/>
-                          </a:solidFill>
-                          <a:effectLst/>
-                          <a:latin typeface="Times New Roman" pitchFamily="18" charset="0"/>
-                          <a:cs typeface="Times New Roman" pitchFamily="18" charset="0"/>
-                        </a:rPr>
-                        <a:t>Касимов Р. А</a:t>
-                      </a:r>
-                    </a:p>
-                  </a:txBody>
-                  <a:tcPr marL="71962" marR="71962" marT="17991" marB="35979" horzOverflow="overflow">
-                    <a:lnL w="12700" cap="flat" cmpd="sng" algn="ctr">
-                      <a:solidFill>
-                        <a:srgbClr val="000000"/>
-                      </a:solidFill>
-                      <a:prstDash val="solid"/>
-                      <a:round/>
-                      <a:headEnd type="none" w="med" len="med"/>
-                      <a:tailEnd type="none" w="med" len="med"/>
-                    </a:lnL>
-                    <a:lnR w="12700" cap="flat" cmpd="sng" algn="ctr">
-                      <a:solidFill>
-                        <a:srgbClr val="000000"/>
-                      </a:solidFill>
-                      <a:prstDash val="solid"/>
-                      <a:round/>
-                      <a:headEnd type="none" w="med" len="med"/>
-                      <a:tailEnd type="none" w="med" len="med"/>
-                    </a:lnR>
-                    <a:lnT w="12700" cap="flat" cmpd="sng" algn="ctr">
-                      <a:solidFill>
-                        <a:srgbClr val="000000"/>
-                      </a:solidFill>
-                      <a:prstDash val="solid"/>
-                      <a:round/>
-                      <a:headEnd type="none" w="med" len="med"/>
-                      <a:tailEnd type="none" w="med" len="med"/>
-                    </a:lnT>
-                    <a:lnB w="12700" cap="flat" cmpd="sng" algn="ctr">
-                      <a:solidFill>
-                        <a:srgbClr val="000000"/>
-                      </a:solidFill>
-                      <a:prstDash val="solid"/>
-                      <a:round/>
-                      <a:headEnd type="none" w="med" len="med"/>
-                      <a:tailEnd type="none" w="med" len="med"/>
-                    </a:lnB>
-                    <a:lnTlToBr>
-                      <a:noFill/>
-                    </a:lnTlToBr>
-                    <a:lnBlToTr>
-                      <a:noFill/>
-                    </a:lnBlToTr>
-                    <a:noFill/>
-                  </a:tcPr>
-                </a:tc>
-                <a:tc>
-                  <a:txBody>
-                    <a:bodyPr/>
-                    <a:lstStyle/>
-                    <a:p>
-                      <a:pPr marL="0" marR="0" lvl="0" indent="0" algn="l" defTabSz="914400" rtl="0" eaLnBrk="1" fontAlgn="base" latinLnBrk="0" hangingPunct="1">
-                        <a:lnSpc>
-                          <a:spcPct val="100000"/>
-                        </a:lnSpc>
-                        <a:spcBef>
-                          <a:spcPct val="20000"/>
-                        </a:spcBef>
-                        <a:spcAft>
-                          <a:spcPct val="0"/>
-                        </a:spcAft>
-                        <a:buClrTx/>
-                        <a:buSzTx/>
-                        <a:buFontTx/>
-                        <a:buNone/>
-                        <a:tabLst/>
-                      </a:pPr>
-                      <a:endParaRPr kumimoji="0" lang="ru-RU" sz="1000" b="0" i="0" u="none" strike="noStrike" cap="none" normalizeH="0" baseline="0">
-                        <a:ln>
-                          <a:noFill/>
-                        </a:ln>
-                        <a:solidFill>
-                          <a:schemeClr val="tx1"/>
-                        </a:solidFill>
-                        <a:effectLst/>
-                        <a:latin typeface="Arial" charset="0"/>
-                      </a:endParaRPr>
-                    </a:p>
-                  </a:txBody>
-                  <a:tcPr marL="71962" marR="71962" marT="17991" marB="35979" horzOverflow="overflow">
-                    <a:lnL w="12700" cap="flat" cmpd="sng" algn="ctr">
-                      <a:solidFill>
-                        <a:srgbClr val="000000"/>
-                      </a:solidFill>
-                      <a:prstDash val="solid"/>
-                      <a:round/>
-                      <a:headEnd type="none" w="med" len="med"/>
-                      <a:tailEnd type="none" w="med" len="med"/>
-                    </a:lnL>
-                    <a:lnR w="12700" cap="flat" cmpd="sng" algn="ctr">
-                      <a:solidFill>
-                        <a:srgbClr val="000000"/>
-                      </a:solidFill>
-                      <a:prstDash val="solid"/>
-                      <a:round/>
-                      <a:headEnd type="none" w="med" len="med"/>
-                      <a:tailEnd type="none" w="med" len="med"/>
-                    </a:lnR>
-                    <a:lnT w="12700" cap="flat" cmpd="sng" algn="ctr">
-                      <a:solidFill>
-                        <a:srgbClr val="000000"/>
-                      </a:solidFill>
-                      <a:prstDash val="solid"/>
-                      <a:round/>
-                      <a:headEnd type="none" w="med" len="med"/>
-                      <a:tailEnd type="none" w="med" len="med"/>
-                    </a:lnT>
-                    <a:lnB w="12700" cap="flat" cmpd="sng" algn="ctr">
-                      <a:solidFill>
-                        <a:srgbClr val="000000"/>
-                      </a:solidFill>
-                      <a:prstDash val="solid"/>
-                      <a:round/>
-                      <a:headEnd type="none" w="med" len="med"/>
-                      <a:tailEnd type="none" w="med" len="med"/>
-                    </a:lnB>
-                    <a:lnTlToBr>
-                      <a:noFill/>
-                    </a:lnTlToBr>
-                    <a:lnBlToTr>
-                      <a:noFill/>
-                    </a:lnBlToTr>
-                    <a:noFill/>
-                  </a:tcPr>
-                </a:tc>
-                <a:tc>
-                  <a:txBody>
-                    <a:bodyPr/>
-                    <a:lstStyle/>
-                    <a:p>
-                      <a:pPr marL="0" marR="0" lvl="0" indent="0" algn="l" defTabSz="914400" rtl="0" eaLnBrk="1" fontAlgn="base" latinLnBrk="0" hangingPunct="1">
-                        <a:lnSpc>
-                          <a:spcPct val="100000"/>
-                        </a:lnSpc>
-                        <a:spcBef>
-                          <a:spcPct val="20000"/>
-                        </a:spcBef>
-                        <a:spcAft>
-                          <a:spcPct val="0"/>
-                        </a:spcAft>
-                        <a:buClrTx/>
-                        <a:buSzTx/>
-                        <a:buFontTx/>
-                        <a:buNone/>
-                        <a:tabLst/>
-                      </a:pPr>
-                      <a:endParaRPr kumimoji="0" lang="ru-RU" sz="1000" b="0" i="0" u="none" strike="noStrike" cap="none" normalizeH="0" baseline="0" dirty="0">
-                        <a:ln>
-                          <a:noFill/>
-                        </a:ln>
-                        <a:solidFill>
-                          <a:schemeClr val="tx1"/>
-                        </a:solidFill>
-                        <a:effectLst/>
-                        <a:latin typeface="Arial" charset="0"/>
-                      </a:endParaRPr>
-                    </a:p>
-                  </a:txBody>
-                  <a:tcPr marL="71962" marR="71962" marT="17991" marB="35979" horzOverflow="overflow">
-                    <a:lnL w="12700" cap="flat" cmpd="sng" algn="ctr">
-                      <a:solidFill>
-                        <a:srgbClr val="000000"/>
-                      </a:solidFill>
-                      <a:prstDash val="solid"/>
-                      <a:round/>
-                      <a:headEnd type="none" w="med" len="med"/>
-                      <a:tailEnd type="none" w="med" len="med"/>
-                    </a:lnL>
-                    <a:lnR w="12700" cap="flat" cmpd="sng" algn="ctr">
-                      <a:solidFill>
-                        <a:srgbClr val="000000"/>
-                      </a:solidFill>
-                      <a:prstDash val="solid"/>
-                      <a:round/>
-                      <a:headEnd type="none" w="med" len="med"/>
-                      <a:tailEnd type="none" w="med" len="med"/>
-                    </a:lnR>
-                    <a:lnT w="12700" cap="flat" cmpd="sng" algn="ctr">
-                      <a:solidFill>
-                        <a:srgbClr val="000000"/>
-                      </a:solidFill>
-                      <a:prstDash val="solid"/>
-                      <a:round/>
-                      <a:headEnd type="none" w="med" len="med"/>
-                      <a:tailEnd type="none" w="med" len="med"/>
-                    </a:lnT>
-                    <a:lnB w="12700" cap="flat" cmpd="sng" algn="ctr">
-                      <a:solidFill>
-                        <a:srgbClr val="000000"/>
-                      </a:solidFill>
-                      <a:prstDash val="solid"/>
-                      <a:round/>
-                      <a:headEnd type="none" w="med" len="med"/>
-                      <a:tailEnd type="none" w="med" len="med"/>
-                    </a:lnB>
-                    <a:lnTlToBr>
-                      <a:noFill/>
-                    </a:lnTlToBr>
-                    <a:lnBlToTr>
-                      <a:noFill/>
-                    </a:lnBlToTr>
-                    <a:noFill/>
-                  </a:tcPr>
-                </a:tc>
-                <a:extLst>
-                  <a:ext uri="{0D108BD9-81ED-4DB2-BD59-A6C34878D82A}">
-                    <a16:rowId xmlns:a16="http://schemas.microsoft.com/office/drawing/2014/main" val="10001"/>
-                  </a:ext>
-                </a:extLst>
-              </a:tr>
-            </a:tbl>
-          </a:graphicData>
-        </a:graphic>
-      </p:graphicFrame>
-      <p:sp>
-        <p:nvSpPr>
-          <p:cNvPr id="8" name="Line 158"/>
-          <p:cNvSpPr>
-            <a:spLocks noChangeShapeType="1"/>
-          </p:cNvSpPr>
+      </p:cxnSp>
+      <p:cxnSp>
+        <p:nvCxnSpPr>
+          <p:cNvPr id="5" name="Google Shape;248;g8998f6f379_0_0">
+            <a:extLst>
+              <a:ext uri="{FF2B5EF4-FFF2-40B4-BE49-F238E27FC236}">
+                <a16:creationId xmlns:a16="http://schemas.microsoft.com/office/drawing/2014/main" id="{E5899327-B786-4521-9A85-ADD6DC15F66D}"/>
+              </a:ext>
+            </a:extLst>
+          </p:cNvPr>
+          <p:cNvCxnSpPr/>
           <p:nvPr/>
-        </p:nvSpPr>
-        <p:spPr bwMode="auto">
+        </p:nvCxnSpPr>
+        <p:spPr>
           <a:xfrm>
             <a:off x="193675" y="188913"/>
-            <a:ext cx="8785225" cy="0"/>
+            <a:ext cx="8785200" cy="0"/>
           </a:xfrm>
-          <a:prstGeom prst="line">
+          <a:prstGeom prst="straightConnector1">
             <a:avLst/>
           </a:prstGeom>
           <a:noFill/>
-          <a:ln w="12700" cap="sq">
+          <a:ln w="12700" cap="sq" cmpd="sng">
             <a:solidFill>
-              <a:schemeClr val="tx1"/>
+              <a:schemeClr val="dk1"/>
             </a:solidFill>
+            <a:prstDash val="solid"/>
             <a:round/>
-            <a:headEnd/>
-            <a:tailEnd/>
+            <a:headEnd type="none" w="med" len="med"/>
+            <a:tailEnd type="none" w="med" len="med"/>
           </a:ln>
         </p:spPr>
-        <p:txBody>
-          <a:bodyPr/>
-          <a:lstStyle/>
-          <a:p>
-            <a:endParaRPr lang="ru-RU"/>
-          </a:p>
-        </p:txBody>
-      </p:sp>
-      <p:sp>
-        <p:nvSpPr>
-          <p:cNvPr id="9" name="Line 159"/>
-          <p:cNvSpPr>
-            <a:spLocks noChangeShapeType="1"/>
-          </p:cNvSpPr>
+      </p:cxnSp>
+      <p:cxnSp>
+        <p:nvCxnSpPr>
+          <p:cNvPr id="6" name="Google Shape;249;g8998f6f379_0_0">
+            <a:extLst>
+              <a:ext uri="{FF2B5EF4-FFF2-40B4-BE49-F238E27FC236}">
+                <a16:creationId xmlns:a16="http://schemas.microsoft.com/office/drawing/2014/main" id="{A90EAA04-03A1-44C6-90EE-5654A77BDF02}"/>
+              </a:ext>
+            </a:extLst>
+          </p:cNvPr>
+          <p:cNvCxnSpPr/>
           <p:nvPr/>
-        </p:nvSpPr>
-        <p:spPr bwMode="auto">
+        </p:nvCxnSpPr>
+        <p:spPr>
           <a:xfrm>
             <a:off x="193675" y="6669088"/>
-            <a:ext cx="8785225" cy="0"/>
+            <a:ext cx="8785200" cy="0"/>
           </a:xfrm>
-          <a:prstGeom prst="line">
+          <a:prstGeom prst="straightConnector1">
             <a:avLst/>
           </a:prstGeom>
           <a:noFill/>
-          <a:ln w="12700" cap="sq">
+          <a:ln w="12700" cap="sq" cmpd="sng">
             <a:solidFill>
-              <a:schemeClr val="tx1"/>
+              <a:schemeClr val="dk1"/>
             </a:solidFill>
+            <a:prstDash val="solid"/>
             <a:round/>
-            <a:headEnd/>
-            <a:tailEnd/>
+            <a:headEnd type="none" w="med" len="med"/>
+            <a:tailEnd type="none" w="med" len="med"/>
           </a:ln>
         </p:spPr>
-        <p:txBody>
-          <a:bodyPr/>
-          <a:lstStyle/>
-          <a:p>
-            <a:endParaRPr lang="ru-RU" dirty="0"/>
-          </a:p>
-        </p:txBody>
-      </p:sp>
-      <p:sp>
-        <p:nvSpPr>
-          <p:cNvPr id="10" name="Rectangle 25"/>
-          <p:cNvSpPr>
-            <a:spLocks noChangeArrowheads="1"/>
-          </p:cNvSpPr>
+      </p:cxnSp>
+      <p:pic>
+        <p:nvPicPr>
+          <p:cNvPr id="10" name="Рисунок 9">
+            <a:extLst>
+              <a:ext uri="{FF2B5EF4-FFF2-40B4-BE49-F238E27FC236}">
+                <a16:creationId xmlns:a16="http://schemas.microsoft.com/office/drawing/2014/main" id="{88E33F24-E1AF-48AA-B778-0875512E2768}"/>
+              </a:ext>
+            </a:extLst>
+          </p:cNvPr>
+          <p:cNvPicPr/>
           <p:nvPr/>
-        </p:nvSpPr>
+        </p:nvPicPr>
+        <p:blipFill rotWithShape="1">
+          <a:blip r:embed="rId2"/>
+          <a:srcRect l="22092" t="-811" r="55273" b="59726"/>
+          <a:stretch/>
+        </p:blipFill>
         <p:spPr bwMode="auto">
           <a:xfrm>
-            <a:off x="342900" y="1380855"/>
-            <a:ext cx="8333556" cy="2677656"/>
+            <a:off x="827584" y="968755"/>
+            <a:ext cx="3744414" cy="3324341"/>
           </a:xfrm>
           <a:prstGeom prst="rect">
             <a:avLst/>
           </a:prstGeom>
-          <a:noFill/>
-          <a:ln w="9525">
+          <a:ln>
             <a:noFill/>
-            <a:miter lim="800000"/>
-            <a:headEnd/>
-            <a:tailEnd/>
           </a:ln>
+          <a:extLst>
+            <a:ext uri="{53640926-AAD7-44D8-BBD7-CCE9431645EC}">
+              <a14:shadowObscured xmlns:a14="http://schemas.microsoft.com/office/drawing/2010/main"/>
+            </a:ext>
+          </a:extLst>
         </p:spPr>
-        <p:txBody>
-          <a:bodyPr wrap="square" anchor="ctr">
-            <a:spAutoFit/>
-          </a:bodyPr>
-          <a:lstStyle/>
-          <a:p>
-            <a:pPr>
-              <a:buFontTx/>
-              <a:buChar char="•"/>
-              <a:tabLst>
-                <a:tab pos="457200" algn="l"/>
-              </a:tabLst>
-            </a:pPr>
-            <a:r>
-              <a:rPr lang="ru-RU" sz="2400" dirty="0"/>
-              <a:t> исследована предметная область;</a:t>
-            </a:r>
-          </a:p>
-          <a:p>
-            <a:pPr>
-              <a:buFontTx/>
-              <a:buChar char="•"/>
-              <a:tabLst>
-                <a:tab pos="457200" algn="l"/>
-              </a:tabLst>
-            </a:pPr>
-            <a:r>
-              <a:rPr lang="ru-RU" sz="2400" dirty="0"/>
-              <a:t> проведён обзор существующих программных решений;</a:t>
-            </a:r>
-          </a:p>
-          <a:p>
-            <a:pPr>
-              <a:buFontTx/>
-              <a:buChar char="•"/>
-              <a:tabLst>
-                <a:tab pos="457200" algn="l"/>
-              </a:tabLst>
-            </a:pPr>
-            <a:r>
-              <a:rPr lang="ru-RU" sz="2400" dirty="0"/>
-              <a:t> выбраны язык и среда программирования;</a:t>
-            </a:r>
-          </a:p>
-          <a:p>
-            <a:pPr>
-              <a:buFontTx/>
-              <a:buChar char="•"/>
-              <a:tabLst>
-                <a:tab pos="457200" algn="l"/>
-              </a:tabLst>
-            </a:pPr>
-            <a:r>
-              <a:rPr lang="ru-RU" sz="2400" dirty="0"/>
-              <a:t> разработана схема данных ПМ НКСО;</a:t>
-            </a:r>
-          </a:p>
-          <a:p>
-            <a:pPr>
-              <a:buFontTx/>
-              <a:buChar char="•"/>
-              <a:tabLst>
-                <a:tab pos="457200" algn="l"/>
-              </a:tabLst>
-            </a:pPr>
-            <a:r>
-              <a:rPr lang="ru-RU" sz="2400" dirty="0"/>
-              <a:t> разработана схема алгоритма ПМ НКСО;</a:t>
-            </a:r>
-          </a:p>
-          <a:p>
-            <a:pPr>
-              <a:buFontTx/>
-              <a:buChar char="•"/>
-              <a:tabLst>
-                <a:tab pos="457200" algn="l"/>
-              </a:tabLst>
-            </a:pPr>
-            <a:r>
-              <a:rPr lang="ru-RU" sz="2400" dirty="0"/>
-              <a:t> выполнена программная реализация;</a:t>
-            </a:r>
-          </a:p>
-          <a:p>
-            <a:pPr>
-              <a:tabLst>
-                <a:tab pos="457200" algn="l"/>
-              </a:tabLst>
-            </a:pPr>
-            <a:endParaRPr lang="ru-RU" sz="2400" dirty="0"/>
-          </a:p>
-        </p:txBody>
-      </p:sp>
+      </p:pic>
+      <p:pic>
+        <p:nvPicPr>
+          <p:cNvPr id="11" name="Рисунок 10">
+            <a:extLst>
+              <a:ext uri="{FF2B5EF4-FFF2-40B4-BE49-F238E27FC236}">
+                <a16:creationId xmlns:a16="http://schemas.microsoft.com/office/drawing/2014/main" id="{D5536693-1466-42FE-81C5-427FD7713593}"/>
+              </a:ext>
+            </a:extLst>
+          </p:cNvPr>
+          <p:cNvPicPr/>
+          <p:nvPr/>
+        </p:nvPicPr>
+        <p:blipFill rotWithShape="1">
+          <a:blip r:embed="rId3"/>
+          <a:srcRect r="67326" b="21853"/>
+          <a:stretch/>
+        </p:blipFill>
+        <p:spPr bwMode="auto">
+          <a:xfrm>
+            <a:off x="386453" y="5103109"/>
+            <a:ext cx="4320486" cy="796253"/>
+          </a:xfrm>
+          <a:prstGeom prst="rect">
+            <a:avLst/>
+          </a:prstGeom>
+          <a:ln>
+            <a:noFill/>
+          </a:ln>
+          <a:extLst>
+            <a:ext uri="{53640926-AAD7-44D8-BBD7-CCE9431645EC}">
+              <a14:shadowObscured xmlns:a14="http://schemas.microsoft.com/office/drawing/2010/main"/>
+            </a:ext>
+          </a:extLst>
+        </p:spPr>
+      </p:pic>
+      <p:pic>
+        <p:nvPicPr>
+          <p:cNvPr id="12" name="Рисунок 11">
+            <a:extLst>
+              <a:ext uri="{FF2B5EF4-FFF2-40B4-BE49-F238E27FC236}">
+                <a16:creationId xmlns:a16="http://schemas.microsoft.com/office/drawing/2014/main" id="{3F1535A8-183C-44CF-A726-6CC6852CABE1}"/>
+              </a:ext>
+            </a:extLst>
+          </p:cNvPr>
+          <p:cNvPicPr/>
+          <p:nvPr/>
+        </p:nvPicPr>
+        <p:blipFill rotWithShape="1">
+          <a:blip r:embed="rId4"/>
+          <a:srcRect r="42059"/>
+          <a:stretch/>
+        </p:blipFill>
+        <p:spPr bwMode="auto">
+          <a:xfrm>
+            <a:off x="4679669" y="1553360"/>
+            <a:ext cx="4138797" cy="3751281"/>
+          </a:xfrm>
+          <a:prstGeom prst="rect">
+            <a:avLst/>
+          </a:prstGeom>
+          <a:ln>
+            <a:noFill/>
+          </a:ln>
+          <a:extLst>
+            <a:ext uri="{53640926-AAD7-44D8-BBD7-CCE9431645EC}">
+              <a14:shadowObscured xmlns:a14="http://schemas.microsoft.com/office/drawing/2010/main"/>
+            </a:ext>
+          </a:extLst>
+        </p:spPr>
+      </p:pic>
     </p:spTree>
+    <p:extLst>
+      <p:ext uri="{BB962C8B-B14F-4D97-AF65-F5344CB8AC3E}">
+        <p14:creationId xmlns:p14="http://schemas.microsoft.com/office/powerpoint/2010/main" val="2329590171"/>
+      </p:ext>
+    </p:extLst>
   </p:cSld>
   <p:clrMapOvr>
     <a:masterClrMapping/>

</xml_diff>

<commit_message>
some fixes after Kasimov
</commit_message>
<xml_diff>
--- a/крайняя/Федотов_ПИН-41_Презентация.pptx
+++ b/крайняя/Федотов_ПИН-41_Презентация.pptx
@@ -318,7 +318,7 @@
             <a:fld id="{D3F45E69-51FF-4017-B855-FA6AEE2AB1D5}" type="datetimeFigureOut">
               <a:rPr lang="ru-RU" smtClean="0"/>
               <a:pPr/>
-              <a:t>26.05.2021</a:t>
+              <a:t>27.05.2021</a:t>
             </a:fld>
             <a:endParaRPr lang="ru-RU"/>
           </a:p>
@@ -483,7 +483,7 @@
             <a:fld id="{D3F45E69-51FF-4017-B855-FA6AEE2AB1D5}" type="datetimeFigureOut">
               <a:rPr lang="ru-RU" smtClean="0"/>
               <a:pPr/>
-              <a:t>26.05.2021</a:t>
+              <a:t>27.05.2021</a:t>
             </a:fld>
             <a:endParaRPr lang="ru-RU"/>
           </a:p>
@@ -658,7 +658,7 @@
             <a:fld id="{D3F45E69-51FF-4017-B855-FA6AEE2AB1D5}" type="datetimeFigureOut">
               <a:rPr lang="ru-RU" smtClean="0"/>
               <a:pPr/>
-              <a:t>26.05.2021</a:t>
+              <a:t>27.05.2021</a:t>
             </a:fld>
             <a:endParaRPr lang="ru-RU"/>
           </a:p>
@@ -823,7 +823,7 @@
             <a:fld id="{D3F45E69-51FF-4017-B855-FA6AEE2AB1D5}" type="datetimeFigureOut">
               <a:rPr lang="ru-RU" smtClean="0"/>
               <a:pPr/>
-              <a:t>26.05.2021</a:t>
+              <a:t>27.05.2021</a:t>
             </a:fld>
             <a:endParaRPr lang="ru-RU"/>
           </a:p>
@@ -1065,7 +1065,7 @@
             <a:fld id="{D3F45E69-51FF-4017-B855-FA6AEE2AB1D5}" type="datetimeFigureOut">
               <a:rPr lang="ru-RU" smtClean="0"/>
               <a:pPr/>
-              <a:t>26.05.2021</a:t>
+              <a:t>27.05.2021</a:t>
             </a:fld>
             <a:endParaRPr lang="ru-RU"/>
           </a:p>
@@ -1347,7 +1347,7 @@
             <a:fld id="{D3F45E69-51FF-4017-B855-FA6AEE2AB1D5}" type="datetimeFigureOut">
               <a:rPr lang="ru-RU" smtClean="0"/>
               <a:pPr/>
-              <a:t>26.05.2021</a:t>
+              <a:t>27.05.2021</a:t>
             </a:fld>
             <a:endParaRPr lang="ru-RU"/>
           </a:p>
@@ -1763,7 +1763,7 @@
             <a:fld id="{D3F45E69-51FF-4017-B855-FA6AEE2AB1D5}" type="datetimeFigureOut">
               <a:rPr lang="ru-RU" smtClean="0"/>
               <a:pPr/>
-              <a:t>26.05.2021</a:t>
+              <a:t>27.05.2021</a:t>
             </a:fld>
             <a:endParaRPr lang="ru-RU"/>
           </a:p>
@@ -1877,7 +1877,7 @@
             <a:fld id="{D3F45E69-51FF-4017-B855-FA6AEE2AB1D5}" type="datetimeFigureOut">
               <a:rPr lang="ru-RU" smtClean="0"/>
               <a:pPr/>
-              <a:t>26.05.2021</a:t>
+              <a:t>27.05.2021</a:t>
             </a:fld>
             <a:endParaRPr lang="ru-RU"/>
           </a:p>
@@ -1969,7 +1969,7 @@
             <a:fld id="{D3F45E69-51FF-4017-B855-FA6AEE2AB1D5}" type="datetimeFigureOut">
               <a:rPr lang="ru-RU" smtClean="0"/>
               <a:pPr/>
-              <a:t>26.05.2021</a:t>
+              <a:t>27.05.2021</a:t>
             </a:fld>
             <a:endParaRPr lang="ru-RU"/>
           </a:p>
@@ -2241,7 +2241,7 @@
             <a:fld id="{D3F45E69-51FF-4017-B855-FA6AEE2AB1D5}" type="datetimeFigureOut">
               <a:rPr lang="ru-RU" smtClean="0"/>
               <a:pPr/>
-              <a:t>26.05.2021</a:t>
+              <a:t>27.05.2021</a:t>
             </a:fld>
             <a:endParaRPr lang="ru-RU"/>
           </a:p>
@@ -2490,7 +2490,7 @@
             <a:fld id="{D3F45E69-51FF-4017-B855-FA6AEE2AB1D5}" type="datetimeFigureOut">
               <a:rPr lang="ru-RU" smtClean="0"/>
               <a:pPr/>
-              <a:t>26.05.2021</a:t>
+              <a:t>27.05.2021</a:t>
             </a:fld>
             <a:endParaRPr lang="ru-RU"/>
           </a:p>
@@ -2698,7 +2698,7 @@
             <a:fld id="{D3F45E69-51FF-4017-B855-FA6AEE2AB1D5}" type="datetimeFigureOut">
               <a:rPr lang="ru-RU" smtClean="0"/>
               <a:pPr/>
-              <a:t>26.05.2021</a:t>
+              <a:t>27.05.2021</a:t>
             </a:fld>
             <a:endParaRPr lang="ru-RU"/>
           </a:p>
@@ -4012,7 +4012,7 @@
         <p:spPr bwMode="auto">
           <a:xfrm>
             <a:off x="539552" y="1412776"/>
-            <a:ext cx="7262566" cy="1015663"/>
+            <a:ext cx="8594597" cy="707886"/>
           </a:xfrm>
           <a:prstGeom prst="rect">
             <a:avLst/>
@@ -4033,21 +4033,27 @@
           <a:p>
             <a:r>
               <a:rPr lang="ru-RU" sz="2000" b="1" dirty="0"/>
-              <a:t>Руководитель от института </a:t>
+              <a:t>Руководитель: </a:t>
             </a:r>
             <a:r>
-              <a:rPr lang="ru-RU" sz="2000" b="1" dirty="0" err="1"/>
+              <a:rPr lang="ru-RU" sz="2000" dirty="0"/>
+              <a:t>доцент института </a:t>
+            </a:r>
+            <a:r>
+              <a:rPr lang="ru-RU" sz="2000" dirty="0" err="1"/>
               <a:t>СПИНТех</a:t>
             </a:r>
             <a:r>
-              <a:rPr lang="ru-RU" sz="2000" b="1" dirty="0"/>
-              <a:t>: </a:t>
+              <a:rPr lang="ru-RU" sz="2000" dirty="0"/>
+              <a:t>, </a:t>
             </a:r>
-          </a:p>
-          <a:p>
+            <a:r>
+              <a:rPr lang="ru-RU" sz="2000" dirty="0" err="1"/>
+              <a:t>к.т.н</a:t>
+            </a:r>
             <a:r>
               <a:rPr lang="ru-RU" sz="2000" dirty="0"/>
-              <a:t>к. т. н, доцент Касимов Рустам Азатович</a:t>
+              <a:t> Касимов Рустам Азатович</a:t>
             </a:r>
           </a:p>
           <a:p>
@@ -4073,7 +4079,7 @@
         <p:spPr bwMode="auto">
           <a:xfrm>
             <a:off x="611560" y="3212976"/>
-            <a:ext cx="8105911" cy="3339376"/>
+            <a:ext cx="8105911" cy="3647152"/>
           </a:xfrm>
           <a:prstGeom prst="rect">
             <a:avLst/>
@@ -4098,7 +4104,7 @@
             </a:r>
             <a:r>
               <a:rPr lang="ru-RU" sz="2000" dirty="0"/>
-              <a:t>упростить настройку конфигурации сетевых сервисов</a:t>
+              <a:t>настроить конфигурацию сетевых сервисов</a:t>
             </a:r>
           </a:p>
           <a:p>
@@ -4186,6 +4192,19 @@
             <a:r>
               <a:rPr lang="ru-RU" sz="2000" dirty="0"/>
               <a:t>программная реализация;</a:t>
+            </a:r>
+          </a:p>
+          <a:p>
+            <a:pPr marL="266700" indent="-266700">
+              <a:buFont typeface="Times New Roman" pitchFamily="18" charset="0"/>
+              <a:buChar char="•"/>
+              <a:tabLst>
+                <a:tab pos="266700" algn="l"/>
+              </a:tabLst>
+            </a:pPr>
+            <a:r>
+              <a:rPr lang="ru-RU" sz="2000" dirty="0"/>
+              <a:t>провести отладку и тестирование</a:t>
             </a:r>
           </a:p>
           <a:p>
@@ -5158,8 +5177,8 @@
         </p:nvSpPr>
         <p:spPr bwMode="auto">
           <a:xfrm>
-            <a:off x="342900" y="1380855"/>
-            <a:ext cx="8333556" cy="2677656"/>
+            <a:off x="342900" y="1196189"/>
+            <a:ext cx="8333556" cy="3046988"/>
           </a:xfrm>
           <a:prstGeom prst="rect">
             <a:avLst/>
@@ -5257,6 +5276,19 @@
           </a:p>
           <a:p>
             <a:pPr>
+              <a:buFontTx/>
+              <a:buChar char="•"/>
+              <a:tabLst>
+                <a:tab pos="457200" algn="l"/>
+              </a:tabLst>
+            </a:pPr>
+            <a:r>
+              <a:rPr lang="ru-RU" sz="2400" dirty="0"/>
+              <a:t> проведены отладка и тестирование</a:t>
+            </a:r>
+          </a:p>
+          <a:p>
+            <a:pPr>
               <a:tabLst>
                 <a:tab pos="457200" algn="l"/>
               </a:tabLst>
@@ -5317,13 +5349,13 @@
               </a:ext>
             </a:extLst>
           </a:blip>
-          <a:srcRect b="9957"/>
+          <a:srcRect b="51327"/>
           <a:stretch/>
         </p:blipFill>
         <p:spPr>
           <a:xfrm>
-            <a:off x="539552" y="824002"/>
-            <a:ext cx="5862770" cy="5209997"/>
+            <a:off x="300277" y="1890702"/>
+            <a:ext cx="5862770" cy="2816296"/>
           </a:xfrm>
           <a:prstGeom prst="rect">
             <a:avLst/>
@@ -6233,700 +6265,41 @@
           </a:p>
         </p:txBody>
       </p:sp>
-      <mc:AlternateContent xmlns:mc="http://schemas.openxmlformats.org/markup-compatibility/2006" xmlns:a14="http://schemas.microsoft.com/office/drawing/2010/main">
-        <mc:Choice Requires="a14">
-          <p:graphicFrame>
-            <p:nvGraphicFramePr>
-              <p:cNvPr id="11" name="Таблица 10">
-                <a:extLst>
-                  <a:ext uri="{FF2B5EF4-FFF2-40B4-BE49-F238E27FC236}">
-                    <a16:creationId xmlns:a16="http://schemas.microsoft.com/office/drawing/2014/main" id="{D983CC9C-2622-40E5-A3DF-695802A8AEFF}"/>
-                  </a:ext>
-                </a:extLst>
-              </p:cNvPr>
-              <p:cNvGraphicFramePr>
-                <a:graphicFrameLocks noGrp="1"/>
-              </p:cNvGraphicFramePr>
-              <p:nvPr>
-                <p:extLst>
-                  <p:ext uri="{D42A27DB-BD31-4B8C-83A1-F6EECF244321}">
-                    <p14:modId xmlns:p14="http://schemas.microsoft.com/office/powerpoint/2010/main" val="1960077517"/>
-                  </p:ext>
-                </p:extLst>
-              </p:nvPr>
-            </p:nvGraphicFramePr>
-            <p:xfrm>
-              <a:off x="4139811" y="923791"/>
-              <a:ext cx="4723648" cy="2808303"/>
-            </p:xfrm>
-            <a:graphic>
-              <a:graphicData uri="http://schemas.openxmlformats.org/drawingml/2006/table">
-                <a:tbl>
-                  <a:tblPr firstRow="1" bandRow="1">
-                    <a:tableStyleId>{D7AC3CCA-C797-4891-BE02-D94E43425B78}</a:tableStyleId>
-                  </a:tblPr>
-                  <a:tblGrid>
-                    <a:gridCol w="2361824">
-                      <a:extLst>
-                        <a:ext uri="{9D8B030D-6E8A-4147-A177-3AD203B41FA5}">
-                          <a16:colId xmlns:a16="http://schemas.microsoft.com/office/drawing/2014/main" val="1288979779"/>
-                        </a:ext>
-                      </a:extLst>
-                    </a:gridCol>
-                    <a:gridCol w="2361824">
-                      <a:extLst>
-                        <a:ext uri="{9D8B030D-6E8A-4147-A177-3AD203B41FA5}">
-                          <a16:colId xmlns:a16="http://schemas.microsoft.com/office/drawing/2014/main" val="836490692"/>
-                        </a:ext>
-                      </a:extLst>
-                    </a:gridCol>
-                  </a:tblGrid>
-                  <a:tr h="570739">
-                    <a:tc>
-                      <a:txBody>
-                        <a:bodyPr/>
-                        <a:lstStyle/>
-                        <a:p>
-                          <a:pPr marL="0" marR="0" lvl="0" indent="0" algn="just" defTabSz="914400" rtl="0" eaLnBrk="1" fontAlgn="auto" latinLnBrk="0" hangingPunct="1">
-                            <a:lnSpc>
-                              <a:spcPct val="100000"/>
-                            </a:lnSpc>
-                            <a:spcBef>
-                              <a:spcPts val="0"/>
-                            </a:spcBef>
-                            <a:spcAft>
-                              <a:spcPts val="0"/>
-                            </a:spcAft>
-                            <a:buClrTx/>
-                            <a:buSzTx/>
-                            <a:buFontTx/>
-                            <a:buNone/>
-                            <a:tabLst/>
-                            <a:defRPr/>
-                          </a:pPr>
-                          <a:r>
-                            <a:rPr lang="ru-RU" sz="1300" dirty="0">
-                              <a:effectLst/>
-                              <a:latin typeface="Times New Roman" panose="02020603050405020304" pitchFamily="18" charset="0"/>
-                              <a:ea typeface="Calibri" panose="020F0502020204030204" pitchFamily="34" charset="0"/>
-                              <a:cs typeface="Times New Roman" panose="02020603050405020304" pitchFamily="18" charset="0"/>
-                            </a:rPr>
-                            <a:t>До разработки ПМ</a:t>
-                          </a:r>
-                        </a:p>
-                      </a:txBody>
-                      <a:tcPr marL="68580" marR="68580" marT="0" marB="0"/>
-                    </a:tc>
-                    <a:tc>
-                      <a:txBody>
-                        <a:bodyPr/>
-                        <a:lstStyle/>
-                        <a:p>
-                          <a:pPr marL="0" marR="0" lvl="0" indent="0" algn="just" defTabSz="914400" rtl="0" eaLnBrk="1" fontAlgn="auto" latinLnBrk="0" hangingPunct="1">
-                            <a:lnSpc>
-                              <a:spcPct val="100000"/>
-                            </a:lnSpc>
-                            <a:spcBef>
-                              <a:spcPts val="0"/>
-                            </a:spcBef>
-                            <a:spcAft>
-                              <a:spcPts val="0"/>
-                            </a:spcAft>
-                            <a:buClrTx/>
-                            <a:buSzTx/>
-                            <a:buFontTx/>
-                            <a:buNone/>
-                            <a:tabLst/>
-                            <a:defRPr/>
-                          </a:pPr>
-                          <a14:m>
-                            <m:oMathPara xmlns:m="http://schemas.openxmlformats.org/officeDocument/2006/math">
-                              <m:oMathParaPr>
-                                <m:jc m:val="centerGroup"/>
-                              </m:oMathParaPr>
-                              <m:oMath xmlns:m="http://schemas.openxmlformats.org/officeDocument/2006/math">
-                                <m:r>
-                                  <m:rPr>
-                                    <m:nor/>
-                                  </m:rPr>
-                                  <a:rPr lang="ru-RU" sz="1300" dirty="0" smtClean="0">
-                                    <a:effectLst/>
-                                    <a:latin typeface="Cambria Math" panose="02040503050406030204" pitchFamily="18" charset="0"/>
-                                    <a:ea typeface="Calibri" panose="020F0502020204030204" pitchFamily="34" charset="0"/>
-                                    <a:cs typeface="Times New Roman" panose="02020603050405020304" pitchFamily="18" charset="0"/>
-                                  </a:rPr>
-                                  <m:t>П</m:t>
-                                </m:r>
-                                <m:r>
-                                  <m:rPr>
-                                    <m:nor/>
-                                  </m:rPr>
-                                  <a:rPr lang="ru-RU" sz="1300" b="1" i="0" dirty="0" smtClean="0">
-                                    <a:effectLst/>
-                                    <a:latin typeface="Cambria Math" panose="02040503050406030204" pitchFamily="18" charset="0"/>
-                                    <a:ea typeface="Calibri" panose="020F0502020204030204" pitchFamily="34" charset="0"/>
-                                    <a:cs typeface="Times New Roman" panose="02020603050405020304" pitchFamily="18" charset="0"/>
-                                  </a:rPr>
-                                  <m:t>осле</m:t>
-                                </m:r>
-                                <m:r>
-                                  <m:rPr>
-                                    <m:nor/>
-                                  </m:rPr>
-                                  <a:rPr lang="ru-RU" sz="1300" dirty="0" smtClean="0">
-                                    <a:effectLst/>
-                                    <a:latin typeface="Times New Roman" panose="02020603050405020304" pitchFamily="18" charset="0"/>
-                                    <a:ea typeface="Calibri" panose="020F0502020204030204" pitchFamily="34" charset="0"/>
-                                    <a:cs typeface="Times New Roman" panose="02020603050405020304" pitchFamily="18" charset="0"/>
-                                  </a:rPr>
-                                  <m:t> разработки</m:t>
-                                </m:r>
-                                <m:r>
-                                  <m:rPr>
-                                    <m:nor/>
-                                  </m:rPr>
-                                  <a:rPr lang="ru-RU" sz="1300" b="1" i="0" dirty="0" smtClean="0">
-                                    <a:effectLst/>
-                                    <a:latin typeface="Times New Roman" panose="02020603050405020304" pitchFamily="18" charset="0"/>
-                                    <a:ea typeface="Calibri" panose="020F0502020204030204" pitchFamily="34" charset="0"/>
-                                    <a:cs typeface="Times New Roman" panose="02020603050405020304" pitchFamily="18" charset="0"/>
-                                  </a:rPr>
-                                  <m:t> ПМ</m:t>
-                                </m:r>
-                              </m:oMath>
-                            </m:oMathPara>
-                          </a14:m>
-                          <a:endParaRPr lang="ru-RU" sz="1300" dirty="0">
-                            <a:effectLst/>
-                            <a:latin typeface="Times New Roman" panose="02020603050405020304" pitchFamily="18" charset="0"/>
-                            <a:ea typeface="Calibri" panose="020F0502020204030204" pitchFamily="34" charset="0"/>
-                            <a:cs typeface="Times New Roman" panose="02020603050405020304" pitchFamily="18" charset="0"/>
-                          </a:endParaRPr>
-                        </a:p>
-                      </a:txBody>
-                      <a:tcPr marL="68580" marR="68580" marT="0" marB="0"/>
-                    </a:tc>
-                    <a:extLst>
-                      <a:ext uri="{0D108BD9-81ED-4DB2-BD59-A6C34878D82A}">
-                        <a16:rowId xmlns:a16="http://schemas.microsoft.com/office/drawing/2014/main" val="539312823"/>
-                      </a:ext>
-                    </a:extLst>
-                  </a:tr>
-                  <a:tr h="629426">
-                    <a:tc>
-                      <a:txBody>
-                        <a:bodyPr/>
-                        <a:lstStyle/>
-                        <a:p>
-                          <a:pPr algn="just">
-                            <a:lnSpc>
-                              <a:spcPct val="100000"/>
-                            </a:lnSpc>
-                            <a:spcAft>
-                              <a:spcPts val="0"/>
-                            </a:spcAft>
-                          </a:pPr>
-                          <a:r>
-                            <a:rPr lang="ru-RU" sz="1300" dirty="0">
-                              <a:effectLst/>
-                              <a:latin typeface="Times New Roman" panose="02020603050405020304" pitchFamily="18" charset="0"/>
-                              <a:ea typeface="Calibri" panose="020F0502020204030204" pitchFamily="34" charset="0"/>
-                              <a:cs typeface="Times New Roman" panose="02020603050405020304" pitchFamily="18" charset="0"/>
-                            </a:rPr>
-                            <a:t>Необходимо загружать дополнительные конфигурационные файлы</a:t>
-                          </a:r>
-                        </a:p>
-                      </a:txBody>
-                      <a:tcPr marL="68580" marR="68580" marT="0" marB="0"/>
-                    </a:tc>
-                    <a:tc>
-                      <a:txBody>
-                        <a:bodyPr/>
-                        <a:lstStyle/>
-                        <a:p>
-                          <a:pPr algn="just">
-                            <a:lnSpc>
-                              <a:spcPct val="100000"/>
-                            </a:lnSpc>
-                            <a:spcAft>
-                              <a:spcPts val="0"/>
-                            </a:spcAft>
-                          </a:pPr>
-                          <a:r>
-                            <a:rPr lang="ru-RU" sz="1300" dirty="0">
-                              <a:effectLst/>
-                              <a:latin typeface="Times New Roman" panose="02020603050405020304" pitchFamily="18" charset="0"/>
-                              <a:ea typeface="Calibri" panose="020F0502020204030204" pitchFamily="34" charset="0"/>
-                              <a:cs typeface="Times New Roman" panose="02020603050405020304" pitchFamily="18" charset="0"/>
-                            </a:rPr>
-                            <a:t>Дополнительные файлы загружаются автоматически</a:t>
-                          </a:r>
-                        </a:p>
-                      </a:txBody>
-                      <a:tcPr marL="68580" marR="68580" marT="0" marB="0"/>
-                    </a:tc>
-                    <a:extLst>
-                      <a:ext uri="{0D108BD9-81ED-4DB2-BD59-A6C34878D82A}">
-                        <a16:rowId xmlns:a16="http://schemas.microsoft.com/office/drawing/2014/main" val="2097034049"/>
-                      </a:ext>
-                    </a:extLst>
-                  </a:tr>
-                  <a:tr h="839234">
-                    <a:tc>
-                      <a:txBody>
-                        <a:bodyPr/>
-                        <a:lstStyle/>
-                        <a:p>
-                          <a:pPr algn="just">
-                            <a:lnSpc>
-                              <a:spcPct val="100000"/>
-                            </a:lnSpc>
-                            <a:spcAft>
-                              <a:spcPts val="0"/>
-                            </a:spcAft>
-                          </a:pPr>
-                          <a:r>
-                            <a:rPr lang="ru-RU" sz="1300" dirty="0">
-                              <a:effectLst/>
-                              <a:latin typeface="Times New Roman" panose="02020603050405020304" pitchFamily="18" charset="0"/>
-                              <a:ea typeface="Calibri" panose="020F0502020204030204" pitchFamily="34" charset="0"/>
-                              <a:cs typeface="Times New Roman" panose="02020603050405020304" pitchFamily="18" charset="0"/>
-                            </a:rPr>
-                            <a:t>Необходимо изменять конфигурационные файлы в зависимости от выставляемых настроек</a:t>
-                          </a:r>
-                        </a:p>
-                      </a:txBody>
-                      <a:tcPr marL="68580" marR="68580" marT="0" marB="0"/>
-                    </a:tc>
-                    <a:tc>
-                      <a:txBody>
-                        <a:bodyPr/>
-                        <a:lstStyle/>
-                        <a:p>
-                          <a:pPr marL="0" marR="0" lvl="0" indent="0" algn="just" defTabSz="914400" rtl="0" eaLnBrk="1" fontAlgn="auto" latinLnBrk="0" hangingPunct="1">
-                            <a:lnSpc>
-                              <a:spcPct val="100000"/>
-                            </a:lnSpc>
-                            <a:spcBef>
-                              <a:spcPts val="0"/>
-                            </a:spcBef>
-                            <a:spcAft>
-                              <a:spcPts val="0"/>
-                            </a:spcAft>
-                            <a:buClrTx/>
-                            <a:buSzTx/>
-                            <a:buFontTx/>
-                            <a:buNone/>
-                            <a:tabLst/>
-                            <a:defRPr/>
-                          </a:pPr>
-                          <a:r>
-                            <a:rPr lang="ru-RU" sz="1300" dirty="0">
-                              <a:effectLst/>
-                              <a:latin typeface="Times New Roman" panose="02020603050405020304" pitchFamily="18" charset="0"/>
-                              <a:ea typeface="Calibri" panose="020F0502020204030204" pitchFamily="34" charset="0"/>
-                              <a:cs typeface="Times New Roman" panose="02020603050405020304" pitchFamily="18" charset="0"/>
-                            </a:rPr>
-                            <a:t>Достаточно просто вводить команды для настроек и проверки статуса</a:t>
-                          </a:r>
-                        </a:p>
-                        <a:p>
-                          <a:pPr algn="just">
-                            <a:lnSpc>
-                              <a:spcPct val="100000"/>
-                            </a:lnSpc>
-                            <a:spcAft>
-                              <a:spcPts val="0"/>
-                            </a:spcAft>
-                          </a:pPr>
-                          <a:endParaRPr lang="ru-RU" sz="1300" dirty="0">
-                            <a:effectLst/>
-                            <a:latin typeface="Times New Roman" panose="02020603050405020304" pitchFamily="18" charset="0"/>
-                            <a:ea typeface="Calibri" panose="020F0502020204030204" pitchFamily="34" charset="0"/>
-                            <a:cs typeface="Times New Roman" panose="02020603050405020304" pitchFamily="18" charset="0"/>
-                          </a:endParaRPr>
-                        </a:p>
-                      </a:txBody>
-                      <a:tcPr marL="68580" marR="68580" marT="0" marB="0"/>
-                    </a:tc>
-                    <a:extLst>
-                      <a:ext uri="{0D108BD9-81ED-4DB2-BD59-A6C34878D82A}">
-                        <a16:rowId xmlns:a16="http://schemas.microsoft.com/office/drawing/2014/main" val="734690886"/>
-                      </a:ext>
-                    </a:extLst>
-                  </a:tr>
-                  <a:tr h="768904">
-                    <a:tc>
-                      <a:txBody>
-                        <a:bodyPr/>
-                        <a:lstStyle/>
-                        <a:p>
-                          <a:pPr algn="just">
-                            <a:lnSpc>
-                              <a:spcPct val="100000"/>
-                            </a:lnSpc>
-                            <a:spcAft>
-                              <a:spcPts val="0"/>
-                            </a:spcAft>
-                          </a:pPr>
-                          <a:r>
-                            <a:rPr lang="ru-RU" sz="1300" dirty="0">
-                              <a:effectLst/>
-                              <a:latin typeface="Times New Roman" panose="02020603050405020304" pitchFamily="18" charset="0"/>
-                              <a:ea typeface="Calibri" panose="020F0502020204030204" pitchFamily="34" charset="0"/>
-                              <a:cs typeface="Times New Roman" panose="02020603050405020304" pitchFamily="18" charset="0"/>
-                            </a:rPr>
-                            <a:t>Необходимо вводить команды для установки  настроек и проверки статуса</a:t>
-                          </a:r>
-                        </a:p>
-                      </a:txBody>
-                      <a:tcPr marL="68580" marR="68580" marT="0" marB="0"/>
-                    </a:tc>
-                    <a:tc>
-                      <a:txBody>
-                        <a:bodyPr/>
-                        <a:lstStyle/>
-                        <a:p>
-                          <a:pPr algn="just">
-                            <a:lnSpc>
-                              <a:spcPct val="100000"/>
-                            </a:lnSpc>
-                            <a:spcAft>
-                              <a:spcPts val="0"/>
-                            </a:spcAft>
-                          </a:pPr>
-                          <a:endParaRPr lang="ru-RU" sz="1300" dirty="0">
-                            <a:effectLst/>
-                            <a:latin typeface="Times New Roman" panose="02020603050405020304" pitchFamily="18" charset="0"/>
-                            <a:ea typeface="Calibri" panose="020F0502020204030204" pitchFamily="34" charset="0"/>
-                            <a:cs typeface="Times New Roman" panose="02020603050405020304" pitchFamily="18" charset="0"/>
-                          </a:endParaRPr>
-                        </a:p>
-                      </a:txBody>
-                      <a:tcPr marL="68580" marR="68580" marT="0" marB="0"/>
-                    </a:tc>
-                    <a:extLst>
-                      <a:ext uri="{0D108BD9-81ED-4DB2-BD59-A6C34878D82A}">
-                        <a16:rowId xmlns:a16="http://schemas.microsoft.com/office/drawing/2014/main" val="1771316432"/>
-                      </a:ext>
-                    </a:extLst>
-                  </a:tr>
-                </a:tbl>
-              </a:graphicData>
-            </a:graphic>
-          </p:graphicFrame>
-        </mc:Choice>
-        <mc:Fallback xmlns="">
-          <p:graphicFrame>
-            <p:nvGraphicFramePr>
-              <p:cNvPr id="11" name="Таблица 10">
-                <a:extLst>
-                  <a:ext uri="{FF2B5EF4-FFF2-40B4-BE49-F238E27FC236}">
-                    <a16:creationId xmlns:a16="http://schemas.microsoft.com/office/drawing/2014/main" id="{D983CC9C-2622-40E5-A3DF-695802A8AEFF}"/>
-                  </a:ext>
-                </a:extLst>
-              </p:cNvPr>
-              <p:cNvGraphicFramePr>
-                <a:graphicFrameLocks noGrp="1"/>
-              </p:cNvGraphicFramePr>
-              <p:nvPr>
-                <p:extLst>
-                  <p:ext uri="{D42A27DB-BD31-4B8C-83A1-F6EECF244321}">
-                    <p14:modId xmlns:p14="http://schemas.microsoft.com/office/powerpoint/2010/main" val="1960077517"/>
-                  </p:ext>
-                </p:extLst>
-              </p:nvPr>
-            </p:nvGraphicFramePr>
-            <p:xfrm>
-              <a:off x="4139811" y="923791"/>
-              <a:ext cx="4723648" cy="2808303"/>
-            </p:xfrm>
-            <a:graphic>
-              <a:graphicData uri="http://schemas.openxmlformats.org/drawingml/2006/table">
-                <a:tbl>
-                  <a:tblPr firstRow="1" bandRow="1">
-                    <a:tableStyleId>{D7AC3CCA-C797-4891-BE02-D94E43425B78}</a:tableStyleId>
-                  </a:tblPr>
-                  <a:tblGrid>
-                    <a:gridCol w="2361824">
-                      <a:extLst>
-                        <a:ext uri="{9D8B030D-6E8A-4147-A177-3AD203B41FA5}">
-                          <a16:colId xmlns:a16="http://schemas.microsoft.com/office/drawing/2014/main" val="1288979779"/>
-                        </a:ext>
-                      </a:extLst>
-                    </a:gridCol>
-                    <a:gridCol w="2361824">
-                      <a:extLst>
-                        <a:ext uri="{9D8B030D-6E8A-4147-A177-3AD203B41FA5}">
-                          <a16:colId xmlns:a16="http://schemas.microsoft.com/office/drawing/2014/main" val="836490692"/>
-                        </a:ext>
-                      </a:extLst>
-                    </a:gridCol>
-                  </a:tblGrid>
-                  <a:tr h="570739">
-                    <a:tc>
-                      <a:txBody>
-                        <a:bodyPr/>
-                        <a:lstStyle/>
-                        <a:p>
-                          <a:pPr marL="0" marR="0" lvl="0" indent="0" algn="just" defTabSz="914400" rtl="0" eaLnBrk="1" fontAlgn="auto" latinLnBrk="0" hangingPunct="1">
-                            <a:lnSpc>
-                              <a:spcPct val="100000"/>
-                            </a:lnSpc>
-                            <a:spcBef>
-                              <a:spcPts val="0"/>
-                            </a:spcBef>
-                            <a:spcAft>
-                              <a:spcPts val="0"/>
-                            </a:spcAft>
-                            <a:buClrTx/>
-                            <a:buSzTx/>
-                            <a:buFontTx/>
-                            <a:buNone/>
-                            <a:tabLst/>
-                            <a:defRPr/>
-                          </a:pPr>
-                          <a:r>
-                            <a:rPr lang="ru-RU" sz="1300" dirty="0">
-                              <a:effectLst/>
-                              <a:latin typeface="Times New Roman" panose="02020603050405020304" pitchFamily="18" charset="0"/>
-                              <a:ea typeface="Calibri" panose="020F0502020204030204" pitchFamily="34" charset="0"/>
-                              <a:cs typeface="Times New Roman" panose="02020603050405020304" pitchFamily="18" charset="0"/>
-                            </a:rPr>
-                            <a:t>До разработки ПМ</a:t>
-                          </a:r>
-                        </a:p>
-                      </a:txBody>
-                      <a:tcPr marL="68580" marR="68580" marT="0" marB="0"/>
-                    </a:tc>
-                    <a:tc>
-                      <a:txBody>
-                        <a:bodyPr/>
-                        <a:lstStyle/>
-                        <a:p>
-                          <a:endParaRPr lang="ru-RU"/>
-                        </a:p>
-                      </a:txBody>
-                      <a:tcPr marL="68580" marR="68580" marT="0" marB="0">
-                        <a:blipFill>
-                          <a:blip r:embed="rId4"/>
-                          <a:stretch>
-                            <a:fillRect l="-100517" t="-8511" r="-775" b="-393617"/>
-                          </a:stretch>
-                        </a:blipFill>
-                      </a:tcPr>
-                    </a:tc>
-                    <a:extLst>
-                      <a:ext uri="{0D108BD9-81ED-4DB2-BD59-A6C34878D82A}">
-                        <a16:rowId xmlns:a16="http://schemas.microsoft.com/office/drawing/2014/main" val="539312823"/>
-                      </a:ext>
-                    </a:extLst>
-                  </a:tr>
-                  <a:tr h="629426">
-                    <a:tc>
-                      <a:txBody>
-                        <a:bodyPr/>
-                        <a:lstStyle/>
-                        <a:p>
-                          <a:pPr algn="just">
-                            <a:lnSpc>
-                              <a:spcPct val="100000"/>
-                            </a:lnSpc>
-                            <a:spcAft>
-                              <a:spcPts val="0"/>
-                            </a:spcAft>
-                          </a:pPr>
-                          <a:r>
-                            <a:rPr lang="ru-RU" sz="1300" dirty="0">
-                              <a:effectLst/>
-                              <a:latin typeface="Times New Roman" panose="02020603050405020304" pitchFamily="18" charset="0"/>
-                              <a:ea typeface="Calibri" panose="020F0502020204030204" pitchFamily="34" charset="0"/>
-                              <a:cs typeface="Times New Roman" panose="02020603050405020304" pitchFamily="18" charset="0"/>
-                            </a:rPr>
-                            <a:t>Необходимо загружать дополнительные конфигурационные файлы</a:t>
-                          </a:r>
-                        </a:p>
-                      </a:txBody>
-                      <a:tcPr marL="68580" marR="68580" marT="0" marB="0"/>
-                    </a:tc>
-                    <a:tc>
-                      <a:txBody>
-                        <a:bodyPr/>
-                        <a:lstStyle/>
-                        <a:p>
-                          <a:pPr algn="just">
-                            <a:lnSpc>
-                              <a:spcPct val="100000"/>
-                            </a:lnSpc>
-                            <a:spcAft>
-                              <a:spcPts val="0"/>
-                            </a:spcAft>
-                          </a:pPr>
-                          <a:r>
-                            <a:rPr lang="ru-RU" sz="1300" dirty="0">
-                              <a:effectLst/>
-                              <a:latin typeface="Times New Roman" panose="02020603050405020304" pitchFamily="18" charset="0"/>
-                              <a:ea typeface="Calibri" panose="020F0502020204030204" pitchFamily="34" charset="0"/>
-                              <a:cs typeface="Times New Roman" panose="02020603050405020304" pitchFamily="18" charset="0"/>
-                            </a:rPr>
-                            <a:t>Дополнительные файлы загружаются автоматически</a:t>
-                          </a:r>
-                        </a:p>
-                      </a:txBody>
-                      <a:tcPr marL="68580" marR="68580" marT="0" marB="0"/>
-                    </a:tc>
-                    <a:extLst>
-                      <a:ext uri="{0D108BD9-81ED-4DB2-BD59-A6C34878D82A}">
-                        <a16:rowId xmlns:a16="http://schemas.microsoft.com/office/drawing/2014/main" val="2097034049"/>
-                      </a:ext>
-                    </a:extLst>
-                  </a:tr>
-                  <a:tr h="839234">
-                    <a:tc>
-                      <a:txBody>
-                        <a:bodyPr/>
-                        <a:lstStyle/>
-                        <a:p>
-                          <a:pPr algn="just">
-                            <a:lnSpc>
-                              <a:spcPct val="100000"/>
-                            </a:lnSpc>
-                            <a:spcAft>
-                              <a:spcPts val="0"/>
-                            </a:spcAft>
-                          </a:pPr>
-                          <a:r>
-                            <a:rPr lang="ru-RU" sz="1300" dirty="0">
-                              <a:effectLst/>
-                              <a:latin typeface="Times New Roman" panose="02020603050405020304" pitchFamily="18" charset="0"/>
-                              <a:ea typeface="Calibri" panose="020F0502020204030204" pitchFamily="34" charset="0"/>
-                              <a:cs typeface="Times New Roman" panose="02020603050405020304" pitchFamily="18" charset="0"/>
-                            </a:rPr>
-                            <a:t>Необходимо изменять конфигурационные файлы в зависимости от выставляемых настроек</a:t>
-                          </a:r>
-                        </a:p>
-                      </a:txBody>
-                      <a:tcPr marL="68580" marR="68580" marT="0" marB="0"/>
-                    </a:tc>
-                    <a:tc>
-                      <a:txBody>
-                        <a:bodyPr/>
-                        <a:lstStyle/>
-                        <a:p>
-                          <a:pPr marL="0" marR="0" lvl="0" indent="0" algn="just" defTabSz="914400" rtl="0" eaLnBrk="1" fontAlgn="auto" latinLnBrk="0" hangingPunct="1">
-                            <a:lnSpc>
-                              <a:spcPct val="100000"/>
-                            </a:lnSpc>
-                            <a:spcBef>
-                              <a:spcPts val="0"/>
-                            </a:spcBef>
-                            <a:spcAft>
-                              <a:spcPts val="0"/>
-                            </a:spcAft>
-                            <a:buClrTx/>
-                            <a:buSzTx/>
-                            <a:buFontTx/>
-                            <a:buNone/>
-                            <a:tabLst/>
-                            <a:defRPr/>
-                          </a:pPr>
-                          <a:r>
-                            <a:rPr lang="ru-RU" sz="1300" dirty="0">
-                              <a:effectLst/>
-                              <a:latin typeface="Times New Roman" panose="02020603050405020304" pitchFamily="18" charset="0"/>
-                              <a:ea typeface="Calibri" panose="020F0502020204030204" pitchFamily="34" charset="0"/>
-                              <a:cs typeface="Times New Roman" panose="02020603050405020304" pitchFamily="18" charset="0"/>
-                            </a:rPr>
-                            <a:t>Достаточно просто вводить команды для настроек и проверки статуса</a:t>
-                          </a:r>
-                        </a:p>
-                        <a:p>
-                          <a:pPr algn="just">
-                            <a:lnSpc>
-                              <a:spcPct val="100000"/>
-                            </a:lnSpc>
-                            <a:spcAft>
-                              <a:spcPts val="0"/>
-                            </a:spcAft>
-                          </a:pPr>
-                          <a:endParaRPr lang="ru-RU" sz="1300" dirty="0">
-                            <a:effectLst/>
-                            <a:latin typeface="Times New Roman" panose="02020603050405020304" pitchFamily="18" charset="0"/>
-                            <a:ea typeface="Calibri" panose="020F0502020204030204" pitchFamily="34" charset="0"/>
-                            <a:cs typeface="Times New Roman" panose="02020603050405020304" pitchFamily="18" charset="0"/>
-                          </a:endParaRPr>
-                        </a:p>
-                      </a:txBody>
-                      <a:tcPr marL="68580" marR="68580" marT="0" marB="0"/>
-                    </a:tc>
-                    <a:extLst>
-                      <a:ext uri="{0D108BD9-81ED-4DB2-BD59-A6C34878D82A}">
-                        <a16:rowId xmlns:a16="http://schemas.microsoft.com/office/drawing/2014/main" val="734690886"/>
-                      </a:ext>
-                    </a:extLst>
-                  </a:tr>
-                  <a:tr h="768904">
-                    <a:tc>
-                      <a:txBody>
-                        <a:bodyPr/>
-                        <a:lstStyle/>
-                        <a:p>
-                          <a:pPr algn="just">
-                            <a:lnSpc>
-                              <a:spcPct val="100000"/>
-                            </a:lnSpc>
-                            <a:spcAft>
-                              <a:spcPts val="0"/>
-                            </a:spcAft>
-                          </a:pPr>
-                          <a:r>
-                            <a:rPr lang="ru-RU" sz="1300" dirty="0">
-                              <a:effectLst/>
-                              <a:latin typeface="Times New Roman" panose="02020603050405020304" pitchFamily="18" charset="0"/>
-                              <a:ea typeface="Calibri" panose="020F0502020204030204" pitchFamily="34" charset="0"/>
-                              <a:cs typeface="Times New Roman" panose="02020603050405020304" pitchFamily="18" charset="0"/>
-                            </a:rPr>
-                            <a:t>Необходимо вводить команды для установки  настроек и проверки статуса</a:t>
-                          </a:r>
-                        </a:p>
-                      </a:txBody>
-                      <a:tcPr marL="68580" marR="68580" marT="0" marB="0"/>
-                    </a:tc>
-                    <a:tc>
-                      <a:txBody>
-                        <a:bodyPr/>
-                        <a:lstStyle/>
-                        <a:p>
-                          <a:pPr algn="just">
-                            <a:lnSpc>
-                              <a:spcPct val="100000"/>
-                            </a:lnSpc>
-                            <a:spcAft>
-                              <a:spcPts val="0"/>
-                            </a:spcAft>
-                          </a:pPr>
-                          <a:endParaRPr lang="ru-RU" sz="1300" dirty="0">
-                            <a:effectLst/>
-                            <a:latin typeface="Times New Roman" panose="02020603050405020304" pitchFamily="18" charset="0"/>
-                            <a:ea typeface="Calibri" panose="020F0502020204030204" pitchFamily="34" charset="0"/>
-                            <a:cs typeface="Times New Roman" panose="02020603050405020304" pitchFamily="18" charset="0"/>
-                          </a:endParaRPr>
-                        </a:p>
-                      </a:txBody>
-                      <a:tcPr marL="68580" marR="68580" marT="0" marB="0"/>
-                    </a:tc>
-                    <a:extLst>
-                      <a:ext uri="{0D108BD9-81ED-4DB2-BD59-A6C34878D82A}">
-                        <a16:rowId xmlns:a16="http://schemas.microsoft.com/office/drawing/2014/main" val="1771316432"/>
-                      </a:ext>
-                    </a:extLst>
-                  </a:tr>
-                </a:tbl>
-              </a:graphicData>
-            </a:graphic>
-          </p:graphicFrame>
-        </mc:Fallback>
-      </mc:AlternateContent>
+      <p:pic>
+        <p:nvPicPr>
+          <p:cNvPr id="12" name="Рисунок 11">
+            <a:extLst>
+              <a:ext uri="{FF2B5EF4-FFF2-40B4-BE49-F238E27FC236}">
+                <a16:creationId xmlns:a16="http://schemas.microsoft.com/office/drawing/2014/main" id="{19FAD0B4-70EF-4916-B309-8DACEE1C3DC5}"/>
+              </a:ext>
+            </a:extLst>
+          </p:cNvPr>
+          <p:cNvPicPr>
+            <a:picLocks noChangeAspect="1"/>
+          </p:cNvPicPr>
+          <p:nvPr/>
+        </p:nvPicPr>
+        <p:blipFill rotWithShape="1">
+          <a:blip r:embed="rId3">
+            <a:extLst>
+              <a:ext uri="{28A0092B-C50C-407E-A947-70E740481C1C}">
+                <a14:useLocalDpi xmlns:a14="http://schemas.microsoft.com/office/drawing/2010/main" val="0"/>
+              </a:ext>
+            </a:extLst>
+          </a:blip>
+          <a:srcRect t="52488" b="9957"/>
+          <a:stretch/>
+        </p:blipFill>
+        <p:spPr>
+          <a:xfrm>
+            <a:off x="4788024" y="2212377"/>
+            <a:ext cx="5862770" cy="2172948"/>
+          </a:xfrm>
+          <a:prstGeom prst="rect">
+            <a:avLst/>
+          </a:prstGeom>
+        </p:spPr>
+      </p:pic>
     </p:spTree>
   </p:cSld>
   <p:clrMapOvr>
@@ -7876,7 +7249,7 @@
         <p:spPr>
           <a:xfrm>
             <a:off x="484245" y="5323165"/>
-            <a:ext cx="4303780" cy="1200329"/>
+            <a:ext cx="4303780" cy="1384995"/>
           </a:xfrm>
           <a:prstGeom prst="rect">
             <a:avLst/>
@@ -7932,14 +7305,26 @@
               <a:rPr lang="en-US" sz="1200" u="sng" dirty="0">
                 <a:hlinkClick r:id="rId2"/>
               </a:rPr>
-              <a:t> https://www.s-terra.ru/</a:t>
+              <a:t> </a:t>
             </a:r>
-            <a:endParaRPr lang="en-US" sz="1200" u="sng" dirty="0"/>
+            <a:r>
+              <a:rPr lang="en-US" sz="1200" u="sng" dirty="0">
+                <a:hlinkClick r:id="rId2"/>
+              </a:rPr>
+              <a:t>https://www.s-terra.ru/</a:t>
+            </a:r>
+            <a:endParaRPr lang="ru-RU" sz="1200" u="sng" dirty="0"/>
+          </a:p>
+          <a:p>
+            <a:r>
+              <a:rPr lang="en-US" sz="1200" u="sng" dirty="0"/>
+              <a:t>[6] https://datatracker.ietf.org/doc/html/rfc5905</a:t>
+            </a:r>
           </a:p>
         </p:txBody>
       </p:sp>
-      <mc:AlternateContent xmlns:mc="http://schemas.openxmlformats.org/markup-compatibility/2006" xmlns:a14="http://schemas.microsoft.com/office/drawing/2010/main">
-        <mc:Choice Requires="a14">
+      <mc:AlternateContent xmlns:mc="http://schemas.openxmlformats.org/markup-compatibility/2006">
+        <mc:Choice xmlns:a14="http://schemas.microsoft.com/office/drawing/2010/main" Requires="a14">
           <p:graphicFrame>
             <p:nvGraphicFramePr>
               <p:cNvPr id="3" name="Таблица 2">
@@ -7955,7 +7340,7 @@
               <p:nvPr>
                 <p:extLst>
                   <p:ext uri="{D42A27DB-BD31-4B8C-83A1-F6EECF244321}">
-                    <p14:modId xmlns:p14="http://schemas.microsoft.com/office/powerpoint/2010/main" val="1595924908"/>
+                    <p14:modId xmlns:p14="http://schemas.microsoft.com/office/powerpoint/2010/main" val="2896672826"/>
                   </p:ext>
                 </p:extLst>
               </p:nvPr>
@@ -8521,24 +7906,90 @@
                               <a:spcPts val="0"/>
                             </a:spcAft>
                           </a:pPr>
-                          <a:r>
-                            <a:rPr lang="ru-RU" sz="1300" dirty="0">
-                              <a:effectLst/>
-                              <a:latin typeface="Times New Roman" panose="02020603050405020304" pitchFamily="18" charset="0"/>
-                              <a:ea typeface="Calibri" panose="020F0502020204030204" pitchFamily="34" charset="0"/>
-                              <a:cs typeface="Times New Roman" panose="02020603050405020304" pitchFamily="18" charset="0"/>
-                            </a:rPr>
-                            <a:t>Возможность настройки </a:t>
-                          </a:r>
-                          <a:r>
-                            <a:rPr lang="en-US" sz="1300" dirty="0">
-                              <a:effectLst/>
-                              <a:latin typeface="Times New Roman" panose="02020603050405020304" pitchFamily="18" charset="0"/>
-                              <a:ea typeface="Calibri" panose="020F0502020204030204" pitchFamily="34" charset="0"/>
-                              <a:cs typeface="Times New Roman" panose="02020603050405020304" pitchFamily="18" charset="0"/>
-                            </a:rPr>
-                            <a:t>NTP</a:t>
-                          </a:r>
+                          <a14:m>
+                            <m:oMathPara xmlns:m="http://schemas.openxmlformats.org/officeDocument/2006/math">
+                              <m:oMathParaPr>
+                                <m:jc m:val="centerGroup"/>
+                              </m:oMathParaPr>
+                              <m:oMath xmlns:m="http://schemas.openxmlformats.org/officeDocument/2006/math">
+                                <m:sSup>
+                                  <m:sSupPr>
+                                    <m:ctrlPr>
+                                      <a:rPr lang="en-US" sz="1300" i="1" smtClean="0">
+                                        <a:effectLst/>
+                                        <a:latin typeface="Cambria Math" panose="02040503050406030204" pitchFamily="18" charset="0"/>
+                                        <a:cs typeface="Times New Roman" panose="02020603050405020304" pitchFamily="18" charset="0"/>
+                                      </a:rPr>
+                                    </m:ctrlPr>
+                                  </m:sSupPr>
+                                  <m:e>
+                                    <m:eqArr>
+                                      <m:eqArrPr>
+                                        <m:ctrlPr>
+                                          <a:rPr lang="ru-RU" sz="1300" dirty="0" smtClean="0">
+                                            <a:effectLst/>
+                                            <a:latin typeface="Cambria Math" panose="02040503050406030204" pitchFamily="18" charset="0"/>
+                                            <a:ea typeface="Calibri" panose="020F0502020204030204" pitchFamily="34" charset="0"/>
+                                            <a:cs typeface="Times New Roman" panose="02020603050405020304" pitchFamily="18" charset="0"/>
+                                          </a:rPr>
+                                        </m:ctrlPr>
+                                      </m:eqArrPr>
+                                      <m:e>
+                                        <m:r>
+                                          <m:rPr>
+                                            <m:nor/>
+                                          </m:rPr>
+                                          <a:rPr lang="ru-RU" sz="1300" dirty="0" smtClean="0">
+                                            <a:effectLst/>
+                                            <a:latin typeface="Times New Roman" panose="02020603050405020304" pitchFamily="18" charset="0"/>
+                                            <a:ea typeface="Calibri" panose="020F0502020204030204" pitchFamily="34" charset="0"/>
+                                            <a:cs typeface="Times New Roman" panose="02020603050405020304" pitchFamily="18" charset="0"/>
+                                          </a:rPr>
+                                          <m:t>Возможность</m:t>
+                                        </m:r>
+                                      </m:e>
+                                      <m:e>
+                                        <m:r>
+                                          <m:rPr>
+                                            <m:nor/>
+                                          </m:rPr>
+                                          <a:rPr lang="ru-RU" sz="1300" dirty="0" smtClean="0">
+                                            <a:effectLst/>
+                                            <a:latin typeface="Times New Roman" panose="02020603050405020304" pitchFamily="18" charset="0"/>
+                                            <a:ea typeface="Calibri" panose="020F0502020204030204" pitchFamily="34" charset="0"/>
+                                            <a:cs typeface="Times New Roman" panose="02020603050405020304" pitchFamily="18" charset="0"/>
+                                          </a:rPr>
+                                          <m:t> настройки </m:t>
+                                        </m:r>
+                                        <m:r>
+                                          <m:rPr>
+                                            <m:nor/>
+                                          </m:rPr>
+                                          <a:rPr lang="en-US" sz="1300" dirty="0" smtClean="0">
+                                            <a:effectLst/>
+                                            <a:latin typeface="Times New Roman" panose="02020603050405020304" pitchFamily="18" charset="0"/>
+                                            <a:ea typeface="Calibri" panose="020F0502020204030204" pitchFamily="34" charset="0"/>
+                                            <a:cs typeface="Times New Roman" panose="02020603050405020304" pitchFamily="18" charset="0"/>
+                                          </a:rPr>
+                                          <m:t>NTP</m:t>
+                                        </m:r>
+                                      </m:e>
+                                    </m:eqArr>
+                                  </m:e>
+                                  <m:sup>
+                                    <m:r>
+                                      <a:rPr lang="en-US" sz="1300" b="0" i="1" smtClean="0">
+                                        <a:effectLst/>
+                                        <a:latin typeface="Cambria Math" panose="02040503050406030204" pitchFamily="18" charset="0"/>
+                                        <a:cs typeface="Times New Roman" panose="02020603050405020304" pitchFamily="18" charset="0"/>
+                                      </a:rPr>
+                                      <m:t>[6]</m:t>
+                                    </m:r>
+                                  </m:sup>
+                                </m:sSup>
+                              </m:oMath>
+                            </m:oMathPara>
+                          </a14:m>
                           <a:endParaRPr lang="ru-RU" sz="1300" dirty="0">
                             <a:effectLst/>
                             <a:latin typeface="Times New Roman" panose="02020603050405020304" pitchFamily="18" charset="0"/>
@@ -8563,7 +8014,7 @@
                             </a:spcAft>
                           </a:pPr>
                           <a:r>
-                            <a:rPr lang="ru-RU" sz="1300">
+                            <a:rPr lang="ru-RU" sz="1300" dirty="0">
                               <a:effectLst/>
                               <a:latin typeface="Times New Roman" panose="02020603050405020304" pitchFamily="18" charset="0"/>
                               <a:ea typeface="Calibri" panose="020F0502020204030204" pitchFamily="34" charset="0"/>
@@ -8804,7 +8255,7 @@
                             </a:spcAft>
                           </a:pPr>
                           <a:r>
-                            <a:rPr lang="ru-RU" sz="1300">
+                            <a:rPr lang="ru-RU" sz="1300" dirty="0">
                               <a:effectLst/>
                               <a:latin typeface="Times New Roman" panose="02020603050405020304" pitchFamily="18" charset="0"/>
                               <a:ea typeface="Calibri" panose="020F0502020204030204" pitchFamily="34" charset="0"/>
@@ -9472,7 +8923,7 @@
             </a:graphic>
           </p:graphicFrame>
         </mc:Choice>
-        <mc:Fallback xmlns="">
+        <mc:Fallback>
           <p:graphicFrame>
             <p:nvGraphicFramePr>
               <p:cNvPr id="3" name="Таблица 2">
@@ -9488,7 +8939,7 @@
               <p:nvPr>
                 <p:extLst>
                   <p:ext uri="{D42A27DB-BD31-4B8C-83A1-F6EECF244321}">
-                    <p14:modId xmlns:p14="http://schemas.microsoft.com/office/powerpoint/2010/main" val="1595924908"/>
+                    <p14:modId xmlns:p14="http://schemas.microsoft.com/office/powerpoint/2010/main" val="2896672826"/>
                   </p:ext>
                 </p:extLst>
               </p:nvPr>
@@ -9671,41 +9122,17 @@
                         <a:bodyPr/>
                         <a:lstStyle/>
                         <a:p>
-                          <a:pPr algn="just">
-                            <a:lnSpc>
-                              <a:spcPct val="100000"/>
-                            </a:lnSpc>
-                            <a:spcAft>
-                              <a:spcPts val="0"/>
-                            </a:spcAft>
-                          </a:pPr>
-                          <a:r>
-                            <a:rPr lang="ru-RU" sz="1300" dirty="0">
-                              <a:effectLst/>
-                              <a:latin typeface="Times New Roman" panose="02020603050405020304" pitchFamily="18" charset="0"/>
-                              <a:ea typeface="Calibri" panose="020F0502020204030204" pitchFamily="34" charset="0"/>
-                              <a:cs typeface="Times New Roman" panose="02020603050405020304" pitchFamily="18" charset="0"/>
-                            </a:rPr>
-                            <a:t>Возможность настройки </a:t>
-                          </a:r>
-                          <a:r>
-                            <a:rPr lang="en-US" sz="1300" dirty="0">
-                              <a:effectLst/>
-                              <a:latin typeface="Times New Roman" panose="02020603050405020304" pitchFamily="18" charset="0"/>
-                              <a:ea typeface="Calibri" panose="020F0502020204030204" pitchFamily="34" charset="0"/>
-                              <a:cs typeface="Times New Roman" panose="02020603050405020304" pitchFamily="18" charset="0"/>
-                            </a:rPr>
-                            <a:t>NTP</a:t>
-                          </a:r>
-                          <a:endParaRPr lang="ru-RU" sz="1300" dirty="0">
-                            <a:effectLst/>
-                            <a:latin typeface="Times New Roman" panose="02020603050405020304" pitchFamily="18" charset="0"/>
-                            <a:ea typeface="Calibri" panose="020F0502020204030204" pitchFamily="34" charset="0"/>
-                            <a:cs typeface="Times New Roman" panose="02020603050405020304" pitchFamily="18" charset="0"/>
-                          </a:endParaRPr>
+                          <a:endParaRPr lang="ru-RU"/>
                         </a:p>
                       </a:txBody>
-                      <a:tcPr marL="68580" marR="68580" marT="0" marB="0"/>
+                      <a:tcPr marL="68580" marR="68580" marT="0" marB="0">
+                        <a:blipFill>
+                          <a:blip r:embed="rId3"/>
+                          <a:stretch>
+                            <a:fillRect l="-452" t="-165753" r="-505430" b="-795890"/>
+                          </a:stretch>
+                        </a:blipFill>
+                      </a:tcPr>
                     </a:tc>
                     <a:tc>
                       <a:txBody>
@@ -9721,7 +9148,7 @@
                             </a:spcAft>
                           </a:pPr>
                           <a:r>
-                            <a:rPr lang="ru-RU" sz="1300">
+                            <a:rPr lang="ru-RU" sz="1300" dirty="0">
                               <a:effectLst/>
                               <a:latin typeface="Times New Roman" panose="02020603050405020304" pitchFamily="18" charset="0"/>
                               <a:ea typeface="Calibri" panose="020F0502020204030204" pitchFamily="34" charset="0"/>
@@ -9962,7 +9389,7 @@
                             </a:spcAft>
                           </a:pPr>
                           <a:r>
-                            <a:rPr lang="ru-RU" sz="1300">
+                            <a:rPr lang="ru-RU" sz="1300" dirty="0">
                               <a:effectLst/>
                               <a:latin typeface="Times New Roman" panose="02020603050405020304" pitchFamily="18" charset="0"/>
                               <a:ea typeface="Calibri" panose="020F0502020204030204" pitchFamily="34" charset="0"/>
@@ -11581,8 +11008,8 @@
         </p:nvSpPr>
         <p:spPr bwMode="auto">
           <a:xfrm>
-            <a:off x="453728" y="5506629"/>
-            <a:ext cx="4572000" cy="1015663"/>
+            <a:off x="250824" y="3067494"/>
+            <a:ext cx="8065591" cy="1015663"/>
           </a:xfrm>
           <a:prstGeom prst="rect">
             <a:avLst/>
@@ -11596,7 +11023,7 @@
           </a:ln>
         </p:spPr>
         <p:txBody>
-          <a:bodyPr>
+          <a:bodyPr wrap="square" numCol="2">
             <a:spAutoFit/>
           </a:bodyPr>
           <a:lstStyle/>
@@ -11653,8 +11080,8 @@
           </a:p>
         </p:txBody>
       </p:sp>
-      <mc:AlternateContent xmlns:mc="http://schemas.openxmlformats.org/markup-compatibility/2006" xmlns:a14="http://schemas.microsoft.com/office/drawing/2010/main">
-        <mc:Choice Requires="a14">
+      <mc:AlternateContent xmlns:mc="http://schemas.openxmlformats.org/markup-compatibility/2006">
+        <mc:Choice xmlns:a14="http://schemas.microsoft.com/office/drawing/2010/main" Requires="a14">
           <p:graphicFrame>
             <p:nvGraphicFramePr>
               <p:cNvPr id="16" name="Таблица 15">
@@ -11670,14 +11097,14 @@
               <p:nvPr>
                 <p:extLst>
                   <p:ext uri="{D42A27DB-BD31-4B8C-83A1-F6EECF244321}">
-                    <p14:modId xmlns:p14="http://schemas.microsoft.com/office/powerpoint/2010/main" val="3197924817"/>
+                    <p14:modId xmlns:p14="http://schemas.microsoft.com/office/powerpoint/2010/main" val="4108884770"/>
                   </p:ext>
                 </p:extLst>
               </p:nvPr>
             </p:nvGraphicFramePr>
             <p:xfrm>
               <a:off x="279400" y="739738"/>
-              <a:ext cx="8670924" cy="4620085"/>
+              <a:ext cx="8670924" cy="2275406"/>
             </p:xfrm>
             <a:graphic>
               <a:graphicData uri="http://schemas.openxmlformats.org/drawingml/2006/table">
@@ -12270,7 +11697,7 @@
                       </a:ext>
                     </a:extLst>
                   </a:tr>
-                  <a:tr h="722964">
+                  <a:tr h="199112">
                     <a:tc>
                       <a:txBody>
                         <a:bodyPr/>
@@ -12291,19 +11718,6 @@
                             <a:t>Знание языка, опыт работы с ним</a:t>
                           </a:r>
                         </a:p>
-                        <a:p>
-                          <a:pPr algn="l">
-                            <a:spcAft>
-                              <a:spcPts val="0"/>
-                            </a:spcAft>
-                          </a:pPr>
-                          <a:endParaRPr lang="ru-RU" sz="1300" dirty="0">
-                            <a:effectLst/>
-                            <a:latin typeface="Times New Roman" panose="02020603050405020304" pitchFamily="18" charset="0"/>
-                            <a:ea typeface="Calibri" panose="020F0502020204030204" pitchFamily="34" charset="0"/>
-                            <a:cs typeface="Times New Roman" panose="02020603050405020304" pitchFamily="18" charset="0"/>
-                          </a:endParaRPr>
-                        </a:p>
                       </a:txBody>
                       <a:tcPr marL="68580" marR="68580" marT="0" marB="0"/>
                     </a:tc>
@@ -12318,13 +11732,22 @@
                             </a:spcAft>
                           </a:pPr>
                           <a:r>
+                            <a:rPr lang="en-US" sz="1300" dirty="0">
+                              <a:effectLst/>
+                              <a:latin typeface="Times New Roman" panose="02020603050405020304" pitchFamily="18" charset="0"/>
+                              <a:ea typeface="Calibri" panose="020F0502020204030204" pitchFamily="34" charset="0"/>
+                              <a:cs typeface="Times New Roman" panose="02020603050405020304" pitchFamily="18" charset="0"/>
+                            </a:rPr>
+                            <a:t>3 </a:t>
+                          </a:r>
+                          <a:r>
                             <a:rPr lang="ru-RU" sz="1300" dirty="0">
                               <a:effectLst/>
                               <a:latin typeface="Times New Roman" panose="02020603050405020304" pitchFamily="18" charset="0"/>
                               <a:ea typeface="Calibri" panose="020F0502020204030204" pitchFamily="34" charset="0"/>
                               <a:cs typeface="Times New Roman" panose="02020603050405020304" pitchFamily="18" charset="0"/>
                             </a:rPr>
-                            <a:t>Есть</a:t>
+                            <a:t>года</a:t>
                           </a:r>
                         </a:p>
                       </a:txBody>
@@ -12348,13 +11771,13 @@
                             </a:spcAft>
                           </a:pPr>
                           <a:r>
-                            <a:rPr lang="ru-RU" sz="1300">
+                            <a:rPr lang="ru-RU" sz="1300" dirty="0">
                               <a:effectLst/>
                               <a:latin typeface="Times New Roman" panose="02020603050405020304" pitchFamily="18" charset="0"/>
                               <a:ea typeface="Calibri" panose="020F0502020204030204" pitchFamily="34" charset="0"/>
                               <a:cs typeface="Times New Roman" panose="02020603050405020304" pitchFamily="18" charset="0"/>
                             </a:rPr>
-                            <a:t>Есть</a:t>
+                            <a:t>2 года</a:t>
                           </a:r>
                         </a:p>
                       </a:txBody>
@@ -12402,13 +11825,13 @@
                             </a:spcAft>
                           </a:pPr>
                           <a:r>
-                            <a:rPr lang="ru-RU" sz="1300">
+                            <a:rPr lang="ru-RU" sz="1300" dirty="0">
                               <a:effectLst/>
                               <a:latin typeface="Times New Roman" panose="02020603050405020304" pitchFamily="18" charset="0"/>
                               <a:ea typeface="Calibri" panose="020F0502020204030204" pitchFamily="34" charset="0"/>
                               <a:cs typeface="Times New Roman" panose="02020603050405020304" pitchFamily="18" charset="0"/>
                             </a:rPr>
-                            <a:t>Нет</a:t>
+                            <a:t>1 год</a:t>
                           </a:r>
                         </a:p>
                       </a:txBody>
@@ -12443,30 +11866,7 @@
                       </a:ext>
                     </a:extLst>
                   </a:tr>
-                  <a:tr h="733285">
-                    <a:tc>
-                      <a:txBody>
-                        <a:bodyPr/>
-                        <a:lstStyle/>
-                        <a:p>
-                          <a:pPr algn="l">
-                            <a:spcAft>
-                              <a:spcPts val="0"/>
-                            </a:spcAft>
-                          </a:pPr>
-                          <a:r>
-                            <a:rPr lang="ru-RU" sz="1300">
-                              <a:effectLst/>
-                              <a:latin typeface="Times New Roman" panose="02020603050405020304" pitchFamily="18" charset="0"/>
-                              <a:ea typeface="Calibri" panose="020F0502020204030204" pitchFamily="34" charset="0"/>
-                              <a:cs typeface="Times New Roman" panose="02020603050405020304" pitchFamily="18" charset="0"/>
-                            </a:rPr>
-                            <a:t>Синтаксис (удобство разработки)</a:t>
-                          </a:r>
-                        </a:p>
-                      </a:txBody>
-                      <a:tcPr marL="68580" marR="68580" marT="0" marB="0"/>
-                    </a:tc>
+                  <a:tr h="393852">
                     <a:tc>
                       <a:txBody>
                         <a:bodyPr/>
@@ -12484,176 +11884,7 @@
                               <a:ea typeface="Calibri" panose="020F0502020204030204" pitchFamily="34" charset="0"/>
                               <a:cs typeface="Times New Roman" panose="02020603050405020304" pitchFamily="18" charset="0"/>
                             </a:rPr>
-                            <a:t>Удобный</a:t>
-                          </a:r>
-                        </a:p>
-                      </a:txBody>
-                      <a:tcPr marL="68580" marR="68580" marT="0" marB="0">
-                        <a:solidFill>
-                          <a:schemeClr val="tx2">
-                            <a:lumMod val="40000"/>
-                            <a:lumOff val="60000"/>
-                          </a:schemeClr>
-                        </a:solidFill>
-                      </a:tcPr>
-                    </a:tc>
-                    <a:tc>
-                      <a:txBody>
-                        <a:bodyPr/>
-                        <a:lstStyle/>
-                        <a:p>
-                          <a:pPr algn="l">
-                            <a:spcAft>
-                              <a:spcPts val="0"/>
-                            </a:spcAft>
-                          </a:pPr>
-                          <a:r>
-                            <a:rPr lang="ru-RU" sz="1300">
-                              <a:effectLst/>
-                              <a:latin typeface="Times New Roman" panose="02020603050405020304" pitchFamily="18" charset="0"/>
-                              <a:ea typeface="Calibri" panose="020F0502020204030204" pitchFamily="34" charset="0"/>
-                              <a:cs typeface="Times New Roman" panose="02020603050405020304" pitchFamily="18" charset="0"/>
-                            </a:rPr>
-                            <a:t>Удобный</a:t>
-                          </a:r>
-                        </a:p>
-                        <a:p>
-                          <a:pPr algn="l">
-                            <a:spcAft>
-                              <a:spcPts val="0"/>
-                            </a:spcAft>
-                          </a:pPr>
-                          <a:r>
-                            <a:rPr lang="ru-RU" sz="1300">
-                              <a:effectLst/>
-                              <a:latin typeface="Times New Roman" panose="02020603050405020304" pitchFamily="18" charset="0"/>
-                              <a:ea typeface="Calibri" panose="020F0502020204030204" pitchFamily="34" charset="0"/>
-                              <a:cs typeface="Times New Roman" panose="02020603050405020304" pitchFamily="18" charset="0"/>
-                            </a:rPr>
-                            <a:t> </a:t>
-                          </a:r>
-                        </a:p>
-                      </a:txBody>
-                      <a:tcPr marL="68580" marR="68580" marT="0" marB="0">
-                        <a:solidFill>
-                          <a:srgbClr val="CBCBCB"/>
-                        </a:solidFill>
-                      </a:tcPr>
-                    </a:tc>
-                    <a:tc>
-                      <a:txBody>
-                        <a:bodyPr/>
-                        <a:lstStyle/>
-                        <a:p>
-                          <a:pPr algn="l">
-                            <a:spcAft>
-                              <a:spcPts val="0"/>
-                            </a:spcAft>
-                          </a:pPr>
-                          <a:r>
-                            <a:rPr lang="ru-RU" sz="1300" dirty="0">
-                              <a:effectLst/>
-                              <a:latin typeface="Times New Roman" panose="02020603050405020304" pitchFamily="18" charset="0"/>
-                              <a:ea typeface="Calibri" panose="020F0502020204030204" pitchFamily="34" charset="0"/>
-                              <a:cs typeface="Times New Roman" panose="02020603050405020304" pitchFamily="18" charset="0"/>
-                            </a:rPr>
-                            <a:t>Не удобный</a:t>
-                          </a:r>
-                        </a:p>
-                      </a:txBody>
-                      <a:tcPr marL="68580" marR="68580" marT="0" marB="0">
-                        <a:solidFill>
-                          <a:srgbClr val="CBCBCB"/>
-                        </a:solidFill>
-                      </a:tcPr>
-                    </a:tc>
-                    <a:tc>
-                      <a:txBody>
-                        <a:bodyPr/>
-                        <a:lstStyle/>
-                        <a:p>
-                          <a:pPr algn="l">
-                            <a:spcAft>
-                              <a:spcPts val="0"/>
-                            </a:spcAft>
-                          </a:pPr>
-                          <a:r>
-                            <a:rPr lang="ru-RU" sz="1300">
-                              <a:effectLst/>
-                              <a:latin typeface="Times New Roman" panose="02020603050405020304" pitchFamily="18" charset="0"/>
-                              <a:ea typeface="Calibri" panose="020F0502020204030204" pitchFamily="34" charset="0"/>
-                              <a:cs typeface="Times New Roman" panose="02020603050405020304" pitchFamily="18" charset="0"/>
-                            </a:rPr>
-                            <a:t>Удобный</a:t>
-                          </a:r>
-                        </a:p>
-                        <a:p>
-                          <a:pPr algn="l">
-                            <a:spcAft>
-                              <a:spcPts val="0"/>
-                            </a:spcAft>
-                          </a:pPr>
-                          <a:r>
-                            <a:rPr lang="ru-RU" sz="1300">
-                              <a:effectLst/>
-                              <a:latin typeface="Times New Roman" panose="02020603050405020304" pitchFamily="18" charset="0"/>
-                              <a:ea typeface="Calibri" panose="020F0502020204030204" pitchFamily="34" charset="0"/>
-                              <a:cs typeface="Times New Roman" panose="02020603050405020304" pitchFamily="18" charset="0"/>
-                            </a:rPr>
-                            <a:t> </a:t>
-                          </a:r>
-                        </a:p>
-                      </a:txBody>
-                      <a:tcPr marL="68580" marR="68580" marT="0" marB="0"/>
-                    </a:tc>
-                    <a:tc>
-                      <a:txBody>
-                        <a:bodyPr/>
-                        <a:lstStyle/>
-                        <a:p>
-                          <a:pPr algn="l">
-                            <a:spcAft>
-                              <a:spcPts val="0"/>
-                            </a:spcAft>
-                          </a:pPr>
-                          <a:r>
-                            <a:rPr lang="ru-RU" sz="1300">
-                              <a:effectLst/>
-                              <a:latin typeface="Times New Roman" panose="02020603050405020304" pitchFamily="18" charset="0"/>
-                              <a:ea typeface="Calibri" panose="020F0502020204030204" pitchFamily="34" charset="0"/>
-                              <a:cs typeface="Times New Roman" panose="02020603050405020304" pitchFamily="18" charset="0"/>
-                            </a:rPr>
-                            <a:t>Не удобный</a:t>
-                          </a:r>
-                        </a:p>
-                      </a:txBody>
-                      <a:tcPr marL="68580" marR="68580" marT="0" marB="0"/>
-                    </a:tc>
-                    <a:extLst>
-                      <a:ext uri="{0D108BD9-81ED-4DB2-BD59-A6C34878D82A}">
-                        <a16:rowId xmlns:a16="http://schemas.microsoft.com/office/drawing/2014/main" val="10003"/>
-                      </a:ext>
-                    </a:extLst>
-                  </a:tr>
-                  <a:tr h="733285">
-                    <a:tc>
-                      <a:txBody>
-                        <a:bodyPr/>
-                        <a:lstStyle/>
-                        <a:p>
-                          <a:pPr algn="l">
-                            <a:spcAft>
-                              <a:spcPts val="0"/>
-                            </a:spcAft>
-                          </a:pPr>
-                          <a:r>
-                            <a:rPr lang="ru-RU" sz="1300" dirty="0">
-                              <a:effectLst/>
-                              <a:latin typeface="Times New Roman" panose="02020603050405020304" pitchFamily="18" charset="0"/>
-                              <a:ea typeface="Calibri" panose="020F0502020204030204" pitchFamily="34" charset="0"/>
-                              <a:cs typeface="Times New Roman" panose="02020603050405020304" pitchFamily="18" charset="0"/>
-                            </a:rPr>
-                            <a:t>Использование языка в других проектах кампании</a:t>
+                            <a:t>Использование языка в смежных проектах кампании</a:t>
                           </a:r>
                         </a:p>
                       </a:txBody>
@@ -12706,23 +11937,7 @@
                               <a:ea typeface="Calibri" panose="020F0502020204030204" pitchFamily="34" charset="0"/>
                               <a:cs typeface="Times New Roman" panose="02020603050405020304" pitchFamily="18" charset="0"/>
                             </a:rPr>
-                            <a:t>Используется</a:t>
-                          </a:r>
-                        </a:p>
-                        <a:p>
-                          <a:pPr algn="l">
-                            <a:spcAft>
-                              <a:spcPts val="0"/>
-                            </a:spcAft>
-                          </a:pPr>
-                          <a:r>
-                            <a:rPr lang="ru-RU" sz="1300" dirty="0">
-                              <a:effectLst/>
-                              <a:latin typeface="Times New Roman" panose="02020603050405020304" pitchFamily="18" charset="0"/>
-                              <a:ea typeface="Calibri" panose="020F0502020204030204" pitchFamily="34" charset="0"/>
-                              <a:cs typeface="Times New Roman" panose="02020603050405020304" pitchFamily="18" charset="0"/>
-                            </a:rPr>
-                            <a:t> </a:t>
+                            <a:t>Не используется</a:t>
                           </a:r>
                         </a:p>
                       </a:txBody>
@@ -12793,7 +12008,7 @@
                             </a:spcAft>
                           </a:pPr>
                           <a:r>
-                            <a:rPr lang="ru-RU" sz="1300">
+                            <a:rPr lang="ru-RU" sz="1300" dirty="0">
                               <a:effectLst/>
                               <a:latin typeface="Times New Roman" panose="02020603050405020304" pitchFamily="18" charset="0"/>
                               <a:ea typeface="Calibri" panose="020F0502020204030204" pitchFamily="34" charset="0"/>
@@ -12811,7 +12026,7 @@
                       </a:ext>
                     </a:extLst>
                   </a:tr>
-                  <a:tr h="1204940">
+                  <a:tr h="956711">
                     <a:tc>
                       <a:txBody>
                         <a:bodyPr/>
@@ -13035,190 +12250,12 @@
                       </a:ext>
                     </a:extLst>
                   </a:tr>
-                  <a:tr h="733285">
-                    <a:tc>
-                      <a:txBody>
-                        <a:bodyPr/>
-                        <a:lstStyle/>
-                        <a:p>
-                          <a:pPr algn="l">
-                            <a:spcAft>
-                              <a:spcPts val="0"/>
-                            </a:spcAft>
-                          </a:pPr>
-                          <a:r>
-                            <a:rPr lang="ru-RU" sz="1300" dirty="0">
-                              <a:effectLst/>
-                              <a:latin typeface="Times New Roman" panose="02020603050405020304" pitchFamily="18" charset="0"/>
-                              <a:ea typeface="Calibri" panose="020F0502020204030204" pitchFamily="34" charset="0"/>
-                              <a:cs typeface="Times New Roman" panose="02020603050405020304" pitchFamily="18" charset="0"/>
-                            </a:rPr>
-                            <a:t>Возможность разработки по </a:t>
-                          </a:r>
-                          <a:r>
-                            <a:rPr lang="en-US" sz="1300" dirty="0">
-                              <a:effectLst/>
-                              <a:latin typeface="Times New Roman" panose="02020603050405020304" pitchFamily="18" charset="0"/>
-                              <a:ea typeface="Calibri" panose="020F0502020204030204" pitchFamily="34" charset="0"/>
-                              <a:cs typeface="Times New Roman" panose="02020603050405020304" pitchFamily="18" charset="0"/>
-                            </a:rPr>
-                            <a:t>UNIX-</a:t>
-                          </a:r>
-                          <a:r>
-                            <a:rPr lang="ru-RU" sz="1300" dirty="0">
-                              <a:effectLst/>
-                              <a:latin typeface="Times New Roman" panose="02020603050405020304" pitchFamily="18" charset="0"/>
-                              <a:ea typeface="Calibri" panose="020F0502020204030204" pitchFamily="34" charset="0"/>
-                              <a:cs typeface="Times New Roman" panose="02020603050405020304" pitchFamily="18" charset="0"/>
-                            </a:rPr>
-                            <a:t>подобные системы</a:t>
-                          </a:r>
-                        </a:p>
-                      </a:txBody>
-                      <a:tcPr marL="68580" marR="68580" marT="0" marB="0"/>
-                    </a:tc>
-                    <a:tc>
-                      <a:txBody>
-                        <a:bodyPr/>
-                        <a:lstStyle/>
-                        <a:p>
-                          <a:pPr algn="l">
-                            <a:spcAft>
-                              <a:spcPts val="0"/>
-                            </a:spcAft>
-                          </a:pPr>
-                          <a:r>
-                            <a:rPr lang="ru-RU" sz="1300" dirty="0">
-                              <a:effectLst/>
-                              <a:latin typeface="Times New Roman" panose="02020603050405020304" pitchFamily="18" charset="0"/>
-                              <a:ea typeface="Calibri" panose="020F0502020204030204" pitchFamily="34" charset="0"/>
-                              <a:cs typeface="Times New Roman" panose="02020603050405020304" pitchFamily="18" charset="0"/>
-                            </a:rPr>
-                            <a:t>Есть</a:t>
-                          </a:r>
-                        </a:p>
-                      </a:txBody>
-                      <a:tcPr marL="68580" marR="68580" marT="0" marB="0">
-                        <a:solidFill>
-                          <a:schemeClr val="tx2">
-                            <a:lumMod val="40000"/>
-                            <a:lumOff val="60000"/>
-                          </a:schemeClr>
-                        </a:solidFill>
-                      </a:tcPr>
-                    </a:tc>
-                    <a:tc>
-                      <a:txBody>
-                        <a:bodyPr/>
-                        <a:lstStyle/>
-                        <a:p>
-                          <a:pPr algn="l">
-                            <a:spcAft>
-                              <a:spcPts val="0"/>
-                            </a:spcAft>
-                          </a:pPr>
-                          <a:r>
-                            <a:rPr lang="ru-RU" sz="1300" dirty="0">
-                              <a:effectLst/>
-                              <a:latin typeface="Times New Roman" panose="02020603050405020304" pitchFamily="18" charset="0"/>
-                              <a:ea typeface="Calibri" panose="020F0502020204030204" pitchFamily="34" charset="0"/>
-                              <a:cs typeface="Times New Roman" panose="02020603050405020304" pitchFamily="18" charset="0"/>
-                            </a:rPr>
-                            <a:t>Есть</a:t>
-                          </a:r>
-                        </a:p>
-                      </a:txBody>
-                      <a:tcPr marL="68580" marR="68580" marT="0" marB="0">
-                        <a:solidFill>
-                          <a:srgbClr val="E7E7E7"/>
-                        </a:solidFill>
-                      </a:tcPr>
-                    </a:tc>
-                    <a:tc>
-                      <a:txBody>
-                        <a:bodyPr/>
-                        <a:lstStyle/>
-                        <a:p>
-                          <a:pPr algn="l">
-                            <a:spcAft>
-                              <a:spcPts val="0"/>
-                            </a:spcAft>
-                          </a:pPr>
-                          <a:r>
-                            <a:rPr lang="ru-RU" sz="1300" dirty="0">
-                              <a:effectLst/>
-                              <a:latin typeface="Times New Roman" panose="02020603050405020304" pitchFamily="18" charset="0"/>
-                              <a:ea typeface="Calibri" panose="020F0502020204030204" pitchFamily="34" charset="0"/>
-                              <a:cs typeface="Times New Roman" panose="02020603050405020304" pitchFamily="18" charset="0"/>
-                            </a:rPr>
-                            <a:t>Есть</a:t>
-                          </a:r>
-                        </a:p>
-                      </a:txBody>
-                      <a:tcPr marL="68580" marR="68580" marT="0" marB="0">
-                        <a:solidFill>
-                          <a:srgbClr val="E7E7E7"/>
-                        </a:solidFill>
-                      </a:tcPr>
-                    </a:tc>
-                    <a:tc>
-                      <a:txBody>
-                        <a:bodyPr/>
-                        <a:lstStyle/>
-                        <a:p>
-                          <a:pPr algn="l">
-                            <a:spcAft>
-                              <a:spcPts val="0"/>
-                            </a:spcAft>
-                          </a:pPr>
-                          <a:r>
-                            <a:rPr lang="ru-RU" sz="1300" dirty="0">
-                              <a:effectLst/>
-                              <a:latin typeface="Times New Roman" panose="02020603050405020304" pitchFamily="18" charset="0"/>
-                              <a:ea typeface="Calibri" panose="020F0502020204030204" pitchFamily="34" charset="0"/>
-                              <a:cs typeface="Times New Roman" panose="02020603050405020304" pitchFamily="18" charset="0"/>
-                            </a:rPr>
-                            <a:t>Есть</a:t>
-                          </a:r>
-                        </a:p>
-                      </a:txBody>
-                      <a:tcPr marL="68580" marR="68580" marT="0" marB="0"/>
-                    </a:tc>
-                    <a:tc>
-                      <a:txBody>
-                        <a:bodyPr/>
-                        <a:lstStyle/>
-                        <a:p>
-                          <a:pPr algn="l">
-                            <a:spcAft>
-                              <a:spcPts val="0"/>
-                            </a:spcAft>
-                          </a:pPr>
-                          <a:r>
-                            <a:rPr lang="ru-RU" sz="1300" dirty="0">
-                              <a:effectLst/>
-                              <a:latin typeface="Times New Roman" panose="02020603050405020304" pitchFamily="18" charset="0"/>
-                              <a:ea typeface="Calibri" panose="020F0502020204030204" pitchFamily="34" charset="0"/>
-                              <a:cs typeface="Times New Roman" panose="02020603050405020304" pitchFamily="18" charset="0"/>
-                            </a:rPr>
-                            <a:t>Есть</a:t>
-                          </a:r>
-                        </a:p>
-                      </a:txBody>
-                      <a:tcPr marL="68580" marR="68580" marT="0" marB="0"/>
-                    </a:tc>
-                    <a:extLst>
-                      <a:ext uri="{0D108BD9-81ED-4DB2-BD59-A6C34878D82A}">
-                        <a16:rowId xmlns:a16="http://schemas.microsoft.com/office/drawing/2014/main" val="3930728994"/>
-                      </a:ext>
-                    </a:extLst>
-                  </a:tr>
                 </a:tbl>
               </a:graphicData>
             </a:graphic>
           </p:graphicFrame>
         </mc:Choice>
-        <mc:Fallback xmlns="">
+        <mc:Fallback>
           <p:graphicFrame>
             <p:nvGraphicFramePr>
               <p:cNvPr id="16" name="Таблица 15">
@@ -13234,14 +12271,14 @@
               <p:nvPr>
                 <p:extLst>
                   <p:ext uri="{D42A27DB-BD31-4B8C-83A1-F6EECF244321}">
-                    <p14:modId xmlns:p14="http://schemas.microsoft.com/office/powerpoint/2010/main" val="3197924817"/>
+                    <p14:modId xmlns:p14="http://schemas.microsoft.com/office/powerpoint/2010/main" val="4108884770"/>
                   </p:ext>
                 </p:extLst>
               </p:nvPr>
             </p:nvGraphicFramePr>
             <p:xfrm>
               <a:off x="279400" y="739738"/>
-              <a:ext cx="8670924" cy="4620085"/>
+              <a:ext cx="8670924" cy="2275406"/>
             </p:xfrm>
             <a:graphic>
               <a:graphicData uri="http://schemas.openxmlformats.org/drawingml/2006/table">
@@ -13329,7 +12366,7 @@
                         <a:blipFill>
                           <a:blip r:embed="rId4"/>
                           <a:stretch>
-                            <a:fillRect l="-192488" t="-9877" r="-377465" b="-839506"/>
+                            <a:fillRect l="-192488" t="-9877" r="-377465" b="-381481"/>
                           </a:stretch>
                         </a:blipFill>
                       </a:tcPr>
@@ -13346,7 +12383,7 @@
                         <a:blipFill>
                           <a:blip r:embed="rId4"/>
                           <a:stretch>
-                            <a:fillRect l="-292488" t="-9877" r="-277465" b="-839506"/>
+                            <a:fillRect l="-292488" t="-9877" r="-277465" b="-381481"/>
                           </a:stretch>
                         </a:blipFill>
                       </a:tcPr>
@@ -13363,7 +12400,7 @@
                         <a:blipFill>
                           <a:blip r:embed="rId4"/>
                           <a:stretch>
-                            <a:fillRect l="-392488" t="-9877" r="-177465" b="-839506"/>
+                            <a:fillRect l="-392488" t="-9877" r="-177465" b="-381481"/>
                           </a:stretch>
                         </a:blipFill>
                       </a:tcPr>
@@ -13380,7 +12417,7 @@
                         <a:blipFill>
                           <a:blip r:embed="rId4"/>
                           <a:stretch>
-                            <a:fillRect l="-592655" t="-9877" r="-113559" b="-839506"/>
+                            <a:fillRect l="-592655" t="-9877" r="-113559" b="-381481"/>
                           </a:stretch>
                         </a:blipFill>
                       </a:tcPr>
@@ -13397,7 +12434,7 @@
                         <a:blipFill>
                           <a:blip r:embed="rId4"/>
                           <a:stretch>
-                            <a:fillRect l="-616080" t="-9877" r="-1005" b="-839506"/>
+                            <a:fillRect l="-616080" t="-9877" r="-1005" b="-381481"/>
                           </a:stretch>
                         </a:blipFill>
                       </a:tcPr>
@@ -13408,7 +12445,7 @@
                       </a:ext>
                     </a:extLst>
                   </a:tr>
-                  <a:tr h="722964">
+                  <a:tr h="396240">
                     <a:tc>
                       <a:txBody>
                         <a:bodyPr/>
@@ -13429,19 +12466,6 @@
                             <a:t>Знание языка, опыт работы с ним</a:t>
                           </a:r>
                         </a:p>
-                        <a:p>
-                          <a:pPr algn="l">
-                            <a:spcAft>
-                              <a:spcPts val="0"/>
-                            </a:spcAft>
-                          </a:pPr>
-                          <a:endParaRPr lang="ru-RU" sz="1300" dirty="0">
-                            <a:effectLst/>
-                            <a:latin typeface="Times New Roman" panose="02020603050405020304" pitchFamily="18" charset="0"/>
-                            <a:ea typeface="Calibri" panose="020F0502020204030204" pitchFamily="34" charset="0"/>
-                            <a:cs typeface="Times New Roman" panose="02020603050405020304" pitchFamily="18" charset="0"/>
-                          </a:endParaRPr>
-                        </a:p>
                       </a:txBody>
                       <a:tcPr marL="68580" marR="68580" marT="0" marB="0"/>
                     </a:tc>
@@ -13456,13 +12480,22 @@
                             </a:spcAft>
                           </a:pPr>
                           <a:r>
+                            <a:rPr lang="en-US" sz="1300" dirty="0">
+                              <a:effectLst/>
+                              <a:latin typeface="Times New Roman" panose="02020603050405020304" pitchFamily="18" charset="0"/>
+                              <a:ea typeface="Calibri" panose="020F0502020204030204" pitchFamily="34" charset="0"/>
+                              <a:cs typeface="Times New Roman" panose="02020603050405020304" pitchFamily="18" charset="0"/>
+                            </a:rPr>
+                            <a:t>3 </a:t>
+                          </a:r>
+                          <a:r>
                             <a:rPr lang="ru-RU" sz="1300" dirty="0">
                               <a:effectLst/>
                               <a:latin typeface="Times New Roman" panose="02020603050405020304" pitchFamily="18" charset="0"/>
                               <a:ea typeface="Calibri" panose="020F0502020204030204" pitchFamily="34" charset="0"/>
                               <a:cs typeface="Times New Roman" panose="02020603050405020304" pitchFamily="18" charset="0"/>
                             </a:rPr>
-                            <a:t>Есть</a:t>
+                            <a:t>года</a:t>
                           </a:r>
                         </a:p>
                       </a:txBody>
@@ -13486,13 +12519,13 @@
                             </a:spcAft>
                           </a:pPr>
                           <a:r>
-                            <a:rPr lang="ru-RU" sz="1300">
+                            <a:rPr lang="ru-RU" sz="1300" dirty="0">
                               <a:effectLst/>
                               <a:latin typeface="Times New Roman" panose="02020603050405020304" pitchFamily="18" charset="0"/>
                               <a:ea typeface="Calibri" panose="020F0502020204030204" pitchFamily="34" charset="0"/>
                               <a:cs typeface="Times New Roman" panose="02020603050405020304" pitchFamily="18" charset="0"/>
                             </a:rPr>
-                            <a:t>Есть</a:t>
+                            <a:t>2 года</a:t>
                           </a:r>
                         </a:p>
                       </a:txBody>
@@ -13540,13 +12573,13 @@
                             </a:spcAft>
                           </a:pPr>
                           <a:r>
-                            <a:rPr lang="ru-RU" sz="1300">
+                            <a:rPr lang="ru-RU" sz="1300" dirty="0">
                               <a:effectLst/>
                               <a:latin typeface="Times New Roman" panose="02020603050405020304" pitchFamily="18" charset="0"/>
                               <a:ea typeface="Calibri" panose="020F0502020204030204" pitchFamily="34" charset="0"/>
                               <a:cs typeface="Times New Roman" panose="02020603050405020304" pitchFamily="18" charset="0"/>
                             </a:rPr>
-                            <a:t>Нет</a:t>
+                            <a:t>1 год</a:t>
                           </a:r>
                         </a:p>
                       </a:txBody>
@@ -13581,30 +12614,7 @@
                       </a:ext>
                     </a:extLst>
                   </a:tr>
-                  <a:tr h="733285">
-                    <a:tc>
-                      <a:txBody>
-                        <a:bodyPr/>
-                        <a:lstStyle/>
-                        <a:p>
-                          <a:pPr algn="l">
-                            <a:spcAft>
-                              <a:spcPts val="0"/>
-                            </a:spcAft>
-                          </a:pPr>
-                          <a:r>
-                            <a:rPr lang="ru-RU" sz="1300">
-                              <a:effectLst/>
-                              <a:latin typeface="Times New Roman" panose="02020603050405020304" pitchFamily="18" charset="0"/>
-                              <a:ea typeface="Calibri" panose="020F0502020204030204" pitchFamily="34" charset="0"/>
-                              <a:cs typeface="Times New Roman" panose="02020603050405020304" pitchFamily="18" charset="0"/>
-                            </a:rPr>
-                            <a:t>Синтаксис (удобство разработки)</a:t>
-                          </a:r>
-                        </a:p>
-                      </a:txBody>
-                      <a:tcPr marL="68580" marR="68580" marT="0" marB="0"/>
-                    </a:tc>
+                  <a:tr h="396240">
                     <a:tc>
                       <a:txBody>
                         <a:bodyPr/>
@@ -13622,176 +12632,7 @@
                               <a:ea typeface="Calibri" panose="020F0502020204030204" pitchFamily="34" charset="0"/>
                               <a:cs typeface="Times New Roman" panose="02020603050405020304" pitchFamily="18" charset="0"/>
                             </a:rPr>
-                            <a:t>Удобный</a:t>
-                          </a:r>
-                        </a:p>
-                      </a:txBody>
-                      <a:tcPr marL="68580" marR="68580" marT="0" marB="0">
-                        <a:solidFill>
-                          <a:schemeClr val="tx2">
-                            <a:lumMod val="40000"/>
-                            <a:lumOff val="60000"/>
-                          </a:schemeClr>
-                        </a:solidFill>
-                      </a:tcPr>
-                    </a:tc>
-                    <a:tc>
-                      <a:txBody>
-                        <a:bodyPr/>
-                        <a:lstStyle/>
-                        <a:p>
-                          <a:pPr algn="l">
-                            <a:spcAft>
-                              <a:spcPts val="0"/>
-                            </a:spcAft>
-                          </a:pPr>
-                          <a:r>
-                            <a:rPr lang="ru-RU" sz="1300">
-                              <a:effectLst/>
-                              <a:latin typeface="Times New Roman" panose="02020603050405020304" pitchFamily="18" charset="0"/>
-                              <a:ea typeface="Calibri" panose="020F0502020204030204" pitchFamily="34" charset="0"/>
-                              <a:cs typeface="Times New Roman" panose="02020603050405020304" pitchFamily="18" charset="0"/>
-                            </a:rPr>
-                            <a:t>Удобный</a:t>
-                          </a:r>
-                        </a:p>
-                        <a:p>
-                          <a:pPr algn="l">
-                            <a:spcAft>
-                              <a:spcPts val="0"/>
-                            </a:spcAft>
-                          </a:pPr>
-                          <a:r>
-                            <a:rPr lang="ru-RU" sz="1300">
-                              <a:effectLst/>
-                              <a:latin typeface="Times New Roman" panose="02020603050405020304" pitchFamily="18" charset="0"/>
-                              <a:ea typeface="Calibri" panose="020F0502020204030204" pitchFamily="34" charset="0"/>
-                              <a:cs typeface="Times New Roman" panose="02020603050405020304" pitchFamily="18" charset="0"/>
-                            </a:rPr>
-                            <a:t> </a:t>
-                          </a:r>
-                        </a:p>
-                      </a:txBody>
-                      <a:tcPr marL="68580" marR="68580" marT="0" marB="0">
-                        <a:solidFill>
-                          <a:srgbClr val="CBCBCB"/>
-                        </a:solidFill>
-                      </a:tcPr>
-                    </a:tc>
-                    <a:tc>
-                      <a:txBody>
-                        <a:bodyPr/>
-                        <a:lstStyle/>
-                        <a:p>
-                          <a:pPr algn="l">
-                            <a:spcAft>
-                              <a:spcPts val="0"/>
-                            </a:spcAft>
-                          </a:pPr>
-                          <a:r>
-                            <a:rPr lang="ru-RU" sz="1300" dirty="0">
-                              <a:effectLst/>
-                              <a:latin typeface="Times New Roman" panose="02020603050405020304" pitchFamily="18" charset="0"/>
-                              <a:ea typeface="Calibri" panose="020F0502020204030204" pitchFamily="34" charset="0"/>
-                              <a:cs typeface="Times New Roman" panose="02020603050405020304" pitchFamily="18" charset="0"/>
-                            </a:rPr>
-                            <a:t>Не удобный</a:t>
-                          </a:r>
-                        </a:p>
-                      </a:txBody>
-                      <a:tcPr marL="68580" marR="68580" marT="0" marB="0">
-                        <a:solidFill>
-                          <a:srgbClr val="CBCBCB"/>
-                        </a:solidFill>
-                      </a:tcPr>
-                    </a:tc>
-                    <a:tc>
-                      <a:txBody>
-                        <a:bodyPr/>
-                        <a:lstStyle/>
-                        <a:p>
-                          <a:pPr algn="l">
-                            <a:spcAft>
-                              <a:spcPts val="0"/>
-                            </a:spcAft>
-                          </a:pPr>
-                          <a:r>
-                            <a:rPr lang="ru-RU" sz="1300">
-                              <a:effectLst/>
-                              <a:latin typeface="Times New Roman" panose="02020603050405020304" pitchFamily="18" charset="0"/>
-                              <a:ea typeface="Calibri" panose="020F0502020204030204" pitchFamily="34" charset="0"/>
-                              <a:cs typeface="Times New Roman" panose="02020603050405020304" pitchFamily="18" charset="0"/>
-                            </a:rPr>
-                            <a:t>Удобный</a:t>
-                          </a:r>
-                        </a:p>
-                        <a:p>
-                          <a:pPr algn="l">
-                            <a:spcAft>
-                              <a:spcPts val="0"/>
-                            </a:spcAft>
-                          </a:pPr>
-                          <a:r>
-                            <a:rPr lang="ru-RU" sz="1300">
-                              <a:effectLst/>
-                              <a:latin typeface="Times New Roman" panose="02020603050405020304" pitchFamily="18" charset="0"/>
-                              <a:ea typeface="Calibri" panose="020F0502020204030204" pitchFamily="34" charset="0"/>
-                              <a:cs typeface="Times New Roman" panose="02020603050405020304" pitchFamily="18" charset="0"/>
-                            </a:rPr>
-                            <a:t> </a:t>
-                          </a:r>
-                        </a:p>
-                      </a:txBody>
-                      <a:tcPr marL="68580" marR="68580" marT="0" marB="0"/>
-                    </a:tc>
-                    <a:tc>
-                      <a:txBody>
-                        <a:bodyPr/>
-                        <a:lstStyle/>
-                        <a:p>
-                          <a:pPr algn="l">
-                            <a:spcAft>
-                              <a:spcPts val="0"/>
-                            </a:spcAft>
-                          </a:pPr>
-                          <a:r>
-                            <a:rPr lang="ru-RU" sz="1300">
-                              <a:effectLst/>
-                              <a:latin typeface="Times New Roman" panose="02020603050405020304" pitchFamily="18" charset="0"/>
-                              <a:ea typeface="Calibri" panose="020F0502020204030204" pitchFamily="34" charset="0"/>
-                              <a:cs typeface="Times New Roman" panose="02020603050405020304" pitchFamily="18" charset="0"/>
-                            </a:rPr>
-                            <a:t>Не удобный</a:t>
-                          </a:r>
-                        </a:p>
-                      </a:txBody>
-                      <a:tcPr marL="68580" marR="68580" marT="0" marB="0"/>
-                    </a:tc>
-                    <a:extLst>
-                      <a:ext uri="{0D108BD9-81ED-4DB2-BD59-A6C34878D82A}">
-                        <a16:rowId xmlns:a16="http://schemas.microsoft.com/office/drawing/2014/main" val="10003"/>
-                      </a:ext>
-                    </a:extLst>
-                  </a:tr>
-                  <a:tr h="733285">
-                    <a:tc>
-                      <a:txBody>
-                        <a:bodyPr/>
-                        <a:lstStyle/>
-                        <a:p>
-                          <a:pPr algn="l">
-                            <a:spcAft>
-                              <a:spcPts val="0"/>
-                            </a:spcAft>
-                          </a:pPr>
-                          <a:r>
-                            <a:rPr lang="ru-RU" sz="1300" dirty="0">
-                              <a:effectLst/>
-                              <a:latin typeface="Times New Roman" panose="02020603050405020304" pitchFamily="18" charset="0"/>
-                              <a:ea typeface="Calibri" panose="020F0502020204030204" pitchFamily="34" charset="0"/>
-                              <a:cs typeface="Times New Roman" panose="02020603050405020304" pitchFamily="18" charset="0"/>
-                            </a:rPr>
-                            <a:t>Использование языка в других проектах кампании</a:t>
+                            <a:t>Использование языка в смежных проектах кампании</a:t>
                           </a:r>
                         </a:p>
                       </a:txBody>
@@ -13844,23 +12685,7 @@
                               <a:ea typeface="Calibri" panose="020F0502020204030204" pitchFamily="34" charset="0"/>
                               <a:cs typeface="Times New Roman" panose="02020603050405020304" pitchFamily="18" charset="0"/>
                             </a:rPr>
-                            <a:t>Используется</a:t>
-                          </a:r>
-                        </a:p>
-                        <a:p>
-                          <a:pPr algn="l">
-                            <a:spcAft>
-                              <a:spcPts val="0"/>
-                            </a:spcAft>
-                          </a:pPr>
-                          <a:r>
-                            <a:rPr lang="ru-RU" sz="1300" dirty="0">
-                              <a:effectLst/>
-                              <a:latin typeface="Times New Roman" panose="02020603050405020304" pitchFamily="18" charset="0"/>
-                              <a:ea typeface="Calibri" panose="020F0502020204030204" pitchFamily="34" charset="0"/>
-                              <a:cs typeface="Times New Roman" panose="02020603050405020304" pitchFamily="18" charset="0"/>
-                            </a:rPr>
-                            <a:t> </a:t>
+                            <a:t>Не используется</a:t>
                           </a:r>
                         </a:p>
                       </a:txBody>
@@ -13931,7 +12756,7 @@
                             </a:spcAft>
                           </a:pPr>
                           <a:r>
-                            <a:rPr lang="ru-RU" sz="1300">
+                            <a:rPr lang="ru-RU" sz="1300" dirty="0">
                               <a:effectLst/>
                               <a:latin typeface="Times New Roman" panose="02020603050405020304" pitchFamily="18" charset="0"/>
                               <a:ea typeface="Calibri" panose="020F0502020204030204" pitchFamily="34" charset="0"/>
@@ -13949,7 +12774,7 @@
                       </a:ext>
                     </a:extLst>
                   </a:tr>
-                  <a:tr h="1204940">
+                  <a:tr h="990600">
                     <a:tc>
                       <a:txBody>
                         <a:bodyPr/>
@@ -14173,190 +12998,1251 @@
                       </a:ext>
                     </a:extLst>
                   </a:tr>
-                  <a:tr h="733285">
-                    <a:tc>
-                      <a:txBody>
-                        <a:bodyPr/>
-                        <a:lstStyle/>
-                        <a:p>
-                          <a:pPr algn="l">
-                            <a:spcAft>
-                              <a:spcPts val="0"/>
-                            </a:spcAft>
-                          </a:pPr>
-                          <a:r>
-                            <a:rPr lang="ru-RU" sz="1300" dirty="0">
-                              <a:effectLst/>
-                              <a:latin typeface="Times New Roman" panose="02020603050405020304" pitchFamily="18" charset="0"/>
-                              <a:ea typeface="Calibri" panose="020F0502020204030204" pitchFamily="34" charset="0"/>
-                              <a:cs typeface="Times New Roman" panose="02020603050405020304" pitchFamily="18" charset="0"/>
-                            </a:rPr>
-                            <a:t>Возможность разработки по </a:t>
-                          </a:r>
-                          <a:r>
-                            <a:rPr lang="en-US" sz="1300" dirty="0">
-                              <a:effectLst/>
-                              <a:latin typeface="Times New Roman" panose="02020603050405020304" pitchFamily="18" charset="0"/>
-                              <a:ea typeface="Calibri" panose="020F0502020204030204" pitchFamily="34" charset="0"/>
-                              <a:cs typeface="Times New Roman" panose="02020603050405020304" pitchFamily="18" charset="0"/>
-                            </a:rPr>
-                            <a:t>UNIX-</a:t>
-                          </a:r>
-                          <a:r>
-                            <a:rPr lang="ru-RU" sz="1300" dirty="0">
-                              <a:effectLst/>
-                              <a:latin typeface="Times New Roman" panose="02020603050405020304" pitchFamily="18" charset="0"/>
-                              <a:ea typeface="Calibri" panose="020F0502020204030204" pitchFamily="34" charset="0"/>
-                              <a:cs typeface="Times New Roman" panose="02020603050405020304" pitchFamily="18" charset="0"/>
-                            </a:rPr>
-                            <a:t>подобные системы</a:t>
-                          </a:r>
-                        </a:p>
-                      </a:txBody>
-                      <a:tcPr marL="68580" marR="68580" marT="0" marB="0"/>
-                    </a:tc>
-                    <a:tc>
-                      <a:txBody>
-                        <a:bodyPr/>
-                        <a:lstStyle/>
-                        <a:p>
-                          <a:pPr algn="l">
-                            <a:spcAft>
-                              <a:spcPts val="0"/>
-                            </a:spcAft>
-                          </a:pPr>
-                          <a:r>
-                            <a:rPr lang="ru-RU" sz="1300" dirty="0">
-                              <a:effectLst/>
-                              <a:latin typeface="Times New Roman" panose="02020603050405020304" pitchFamily="18" charset="0"/>
-                              <a:ea typeface="Calibri" panose="020F0502020204030204" pitchFamily="34" charset="0"/>
-                              <a:cs typeface="Times New Roman" panose="02020603050405020304" pitchFamily="18" charset="0"/>
-                            </a:rPr>
-                            <a:t>Есть</a:t>
-                          </a:r>
-                        </a:p>
-                      </a:txBody>
-                      <a:tcPr marL="68580" marR="68580" marT="0" marB="0">
-                        <a:solidFill>
-                          <a:schemeClr val="tx2">
-                            <a:lumMod val="40000"/>
-                            <a:lumOff val="60000"/>
-                          </a:schemeClr>
-                        </a:solidFill>
-                      </a:tcPr>
-                    </a:tc>
-                    <a:tc>
-                      <a:txBody>
-                        <a:bodyPr/>
-                        <a:lstStyle/>
-                        <a:p>
-                          <a:pPr algn="l">
-                            <a:spcAft>
-                              <a:spcPts val="0"/>
-                            </a:spcAft>
-                          </a:pPr>
-                          <a:r>
-                            <a:rPr lang="ru-RU" sz="1300" dirty="0">
-                              <a:effectLst/>
-                              <a:latin typeface="Times New Roman" panose="02020603050405020304" pitchFamily="18" charset="0"/>
-                              <a:ea typeface="Calibri" panose="020F0502020204030204" pitchFamily="34" charset="0"/>
-                              <a:cs typeface="Times New Roman" panose="02020603050405020304" pitchFamily="18" charset="0"/>
-                            </a:rPr>
-                            <a:t>Есть</a:t>
-                          </a:r>
-                        </a:p>
-                      </a:txBody>
-                      <a:tcPr marL="68580" marR="68580" marT="0" marB="0">
-                        <a:solidFill>
-                          <a:srgbClr val="E7E7E7"/>
-                        </a:solidFill>
-                      </a:tcPr>
-                    </a:tc>
-                    <a:tc>
-                      <a:txBody>
-                        <a:bodyPr/>
-                        <a:lstStyle/>
-                        <a:p>
-                          <a:pPr algn="l">
-                            <a:spcAft>
-                              <a:spcPts val="0"/>
-                            </a:spcAft>
-                          </a:pPr>
-                          <a:r>
-                            <a:rPr lang="ru-RU" sz="1300" dirty="0">
-                              <a:effectLst/>
-                              <a:latin typeface="Times New Roman" panose="02020603050405020304" pitchFamily="18" charset="0"/>
-                              <a:ea typeface="Calibri" panose="020F0502020204030204" pitchFamily="34" charset="0"/>
-                              <a:cs typeface="Times New Roman" panose="02020603050405020304" pitchFamily="18" charset="0"/>
-                            </a:rPr>
-                            <a:t>Есть</a:t>
-                          </a:r>
-                        </a:p>
-                      </a:txBody>
-                      <a:tcPr marL="68580" marR="68580" marT="0" marB="0">
-                        <a:solidFill>
-                          <a:srgbClr val="E7E7E7"/>
-                        </a:solidFill>
-                      </a:tcPr>
-                    </a:tc>
-                    <a:tc>
-                      <a:txBody>
-                        <a:bodyPr/>
-                        <a:lstStyle/>
-                        <a:p>
-                          <a:pPr algn="l">
-                            <a:spcAft>
-                              <a:spcPts val="0"/>
-                            </a:spcAft>
-                          </a:pPr>
-                          <a:r>
-                            <a:rPr lang="ru-RU" sz="1300" dirty="0">
-                              <a:effectLst/>
-                              <a:latin typeface="Times New Roman" panose="02020603050405020304" pitchFamily="18" charset="0"/>
-                              <a:ea typeface="Calibri" panose="020F0502020204030204" pitchFamily="34" charset="0"/>
-                              <a:cs typeface="Times New Roman" panose="02020603050405020304" pitchFamily="18" charset="0"/>
-                            </a:rPr>
-                            <a:t>Есть</a:t>
-                          </a:r>
-                        </a:p>
-                      </a:txBody>
-                      <a:tcPr marL="68580" marR="68580" marT="0" marB="0"/>
-                    </a:tc>
-                    <a:tc>
-                      <a:txBody>
-                        <a:bodyPr/>
-                        <a:lstStyle/>
-                        <a:p>
-                          <a:pPr algn="l">
-                            <a:spcAft>
-                              <a:spcPts val="0"/>
-                            </a:spcAft>
-                          </a:pPr>
-                          <a:r>
-                            <a:rPr lang="ru-RU" sz="1300" dirty="0">
-                              <a:effectLst/>
-                              <a:latin typeface="Times New Roman" panose="02020603050405020304" pitchFamily="18" charset="0"/>
-                              <a:ea typeface="Calibri" panose="020F0502020204030204" pitchFamily="34" charset="0"/>
-                              <a:cs typeface="Times New Roman" panose="02020603050405020304" pitchFamily="18" charset="0"/>
-                            </a:rPr>
-                            <a:t>Есть</a:t>
-                          </a:r>
-                        </a:p>
-                      </a:txBody>
-                      <a:tcPr marL="68580" marR="68580" marT="0" marB="0"/>
-                    </a:tc>
-                    <a:extLst>
-                      <a:ext uri="{0D108BD9-81ED-4DB2-BD59-A6C34878D82A}">
-                        <a16:rowId xmlns:a16="http://schemas.microsoft.com/office/drawing/2014/main" val="3930728994"/>
-                      </a:ext>
-                    </a:extLst>
-                  </a:tr>
                 </a:tbl>
               </a:graphicData>
             </a:graphic>
           </p:graphicFrame>
         </mc:Fallback>
       </mc:AlternateContent>
+      <p:graphicFrame>
+        <p:nvGraphicFramePr>
+          <p:cNvPr id="3" name="Таблица 2">
+            <a:extLst>
+              <a:ext uri="{FF2B5EF4-FFF2-40B4-BE49-F238E27FC236}">
+                <a16:creationId xmlns:a16="http://schemas.microsoft.com/office/drawing/2014/main" id="{57273794-3E9B-4994-91F0-E1BB2F055026}"/>
+              </a:ext>
+            </a:extLst>
+          </p:cNvPr>
+          <p:cNvGraphicFramePr>
+            <a:graphicFrameLocks noGrp="1"/>
+          </p:cNvGraphicFramePr>
+          <p:nvPr>
+            <p:extLst>
+              <p:ext uri="{D42A27DB-BD31-4B8C-83A1-F6EECF244321}">
+                <p14:modId xmlns:p14="http://schemas.microsoft.com/office/powerpoint/2010/main" val="2233070929"/>
+              </p:ext>
+            </p:extLst>
+          </p:nvPr>
+        </p:nvGraphicFramePr>
+        <p:xfrm>
+          <a:off x="330618" y="4113987"/>
+          <a:ext cx="8511337" cy="2008472"/>
+        </p:xfrm>
+        <a:graphic>
+          <a:graphicData uri="http://schemas.openxmlformats.org/drawingml/2006/table">
+            <a:tbl>
+              <a:tblPr firstRow="1" bandRow="1">
+                <a:tableStyleId>{D7AC3CCA-C797-4891-BE02-D94E43425B78}</a:tableStyleId>
+              </a:tblPr>
+              <a:tblGrid>
+                <a:gridCol w="2161129">
+                  <a:extLst>
+                    <a:ext uri="{9D8B030D-6E8A-4147-A177-3AD203B41FA5}">
+                      <a16:colId xmlns:a16="http://schemas.microsoft.com/office/drawing/2014/main" val="2887990273"/>
+                    </a:ext>
+                  </a:extLst>
+                </a:gridCol>
+                <a:gridCol w="1404431">
+                  <a:extLst>
+                    <a:ext uri="{9D8B030D-6E8A-4147-A177-3AD203B41FA5}">
+                      <a16:colId xmlns:a16="http://schemas.microsoft.com/office/drawing/2014/main" val="3819620379"/>
+                    </a:ext>
+                  </a:extLst>
+                </a:gridCol>
+                <a:gridCol w="1171194">
+                  <a:extLst>
+                    <a:ext uri="{9D8B030D-6E8A-4147-A177-3AD203B41FA5}">
+                      <a16:colId xmlns:a16="http://schemas.microsoft.com/office/drawing/2014/main" val="809230234"/>
+                    </a:ext>
+                  </a:extLst>
+                </a:gridCol>
+                <a:gridCol w="1455934">
+                  <a:extLst>
+                    <a:ext uri="{9D8B030D-6E8A-4147-A177-3AD203B41FA5}">
+                      <a16:colId xmlns:a16="http://schemas.microsoft.com/office/drawing/2014/main" val="3488123112"/>
+                    </a:ext>
+                  </a:extLst>
+                </a:gridCol>
+                <a:gridCol w="1283487">
+                  <a:extLst>
+                    <a:ext uri="{9D8B030D-6E8A-4147-A177-3AD203B41FA5}">
+                      <a16:colId xmlns:a16="http://schemas.microsoft.com/office/drawing/2014/main" val="500375413"/>
+                    </a:ext>
+                  </a:extLst>
+                </a:gridCol>
+                <a:gridCol w="1035162">
+                  <a:extLst>
+                    <a:ext uri="{9D8B030D-6E8A-4147-A177-3AD203B41FA5}">
+                      <a16:colId xmlns:a16="http://schemas.microsoft.com/office/drawing/2014/main" val="3054999894"/>
+                    </a:ext>
+                  </a:extLst>
+                </a:gridCol>
+              </a:tblGrid>
+              <a:tr h="266841">
+                <a:tc>
+                  <a:txBody>
+                    <a:bodyPr/>
+                    <a:lstStyle/>
+                    <a:p>
+                      <a:pPr marL="0" algn="l">
+                        <a:lnSpc>
+                          <a:spcPct val="100000"/>
+                        </a:lnSpc>
+                        <a:spcAft>
+                          <a:spcPts val="0"/>
+                        </a:spcAft>
+                      </a:pPr>
+                      <a:r>
+                        <a:rPr lang="ru-RU" sz="1300" dirty="0">
+                          <a:effectLst/>
+                          <a:latin typeface="Times New Roman" panose="02020603050405020304" pitchFamily="18" charset="0"/>
+                          <a:ea typeface="Calibri" panose="020F0502020204030204" pitchFamily="34" charset="0"/>
+                          <a:cs typeface="Times New Roman" panose="02020603050405020304" pitchFamily="18" charset="0"/>
+                        </a:rPr>
+                        <a:t> Критерии</a:t>
+                      </a:r>
+                    </a:p>
+                  </a:txBody>
+                  <a:tcPr marL="68580" marR="68580" marT="0" marB="0"/>
+                </a:tc>
+                <a:tc>
+                  <a:txBody>
+                    <a:bodyPr/>
+                    <a:lstStyle/>
+                    <a:p>
+                      <a:pPr marL="0" algn="l">
+                        <a:lnSpc>
+                          <a:spcPct val="100000"/>
+                        </a:lnSpc>
+                        <a:spcAft>
+                          <a:spcPts val="0"/>
+                        </a:spcAft>
+                      </a:pPr>
+                      <a:r>
+                        <a:rPr lang="en-US" sz="1300" dirty="0">
+                          <a:effectLst/>
+                          <a:latin typeface="Times New Roman" panose="02020603050405020304" pitchFamily="18" charset="0"/>
+                          <a:ea typeface="Calibri" panose="020F0502020204030204" pitchFamily="34" charset="0"/>
+                          <a:cs typeface="Times New Roman" panose="02020603050405020304" pitchFamily="18" charset="0"/>
+                        </a:rPr>
+                        <a:t>Eclipse</a:t>
+                      </a:r>
+                      <a:endParaRPr lang="ru-RU" sz="1300" dirty="0">
+                        <a:effectLst/>
+                        <a:latin typeface="Times New Roman" panose="02020603050405020304" pitchFamily="18" charset="0"/>
+                        <a:ea typeface="Calibri" panose="020F0502020204030204" pitchFamily="34" charset="0"/>
+                        <a:cs typeface="Times New Roman" panose="02020603050405020304" pitchFamily="18" charset="0"/>
+                      </a:endParaRPr>
+                    </a:p>
+                  </a:txBody>
+                  <a:tcPr marL="68580" marR="68580" marT="0" marB="0"/>
+                </a:tc>
+                <a:tc>
+                  <a:txBody>
+                    <a:bodyPr/>
+                    <a:lstStyle/>
+                    <a:p>
+                      <a:pPr marL="0" algn="l">
+                        <a:lnSpc>
+                          <a:spcPct val="100000"/>
+                        </a:lnSpc>
+                        <a:spcAft>
+                          <a:spcPts val="0"/>
+                        </a:spcAft>
+                      </a:pPr>
+                      <a:r>
+                        <a:rPr lang="en-US" sz="1300" dirty="0">
+                          <a:effectLst/>
+                          <a:latin typeface="Times New Roman" panose="02020603050405020304" pitchFamily="18" charset="0"/>
+                          <a:ea typeface="Calibri" panose="020F0502020204030204" pitchFamily="34" charset="0"/>
+                          <a:cs typeface="Times New Roman" panose="02020603050405020304" pitchFamily="18" charset="0"/>
+                        </a:rPr>
+                        <a:t>VS Code</a:t>
+                      </a:r>
+                      <a:endParaRPr lang="ru-RU" sz="1300" dirty="0">
+                        <a:effectLst/>
+                        <a:latin typeface="Times New Roman" panose="02020603050405020304" pitchFamily="18" charset="0"/>
+                        <a:ea typeface="Calibri" panose="020F0502020204030204" pitchFamily="34" charset="0"/>
+                        <a:cs typeface="Times New Roman" panose="02020603050405020304" pitchFamily="18" charset="0"/>
+                      </a:endParaRPr>
+                    </a:p>
+                  </a:txBody>
+                  <a:tcPr marL="68580" marR="68580" marT="0" marB="0">
+                    <a:solidFill>
+                      <a:schemeClr val="tx2">
+                        <a:lumMod val="40000"/>
+                        <a:lumOff val="60000"/>
+                      </a:schemeClr>
+                    </a:solidFill>
+                  </a:tcPr>
+                </a:tc>
+                <a:tc>
+                  <a:txBody>
+                    <a:bodyPr/>
+                    <a:lstStyle/>
+                    <a:p>
+                      <a:pPr marL="0" algn="l">
+                        <a:lnSpc>
+                          <a:spcPct val="100000"/>
+                        </a:lnSpc>
+                        <a:spcAft>
+                          <a:spcPts val="0"/>
+                        </a:spcAft>
+                      </a:pPr>
+                      <a:r>
+                        <a:rPr lang="en-US" sz="1300" dirty="0">
+                          <a:effectLst/>
+                          <a:latin typeface="Times New Roman" panose="02020603050405020304" pitchFamily="18" charset="0"/>
+                          <a:ea typeface="Calibri" panose="020F0502020204030204" pitchFamily="34" charset="0"/>
+                          <a:cs typeface="Times New Roman" panose="02020603050405020304" pitchFamily="18" charset="0"/>
+                        </a:rPr>
+                        <a:t>Visual Studio</a:t>
+                      </a:r>
+                      <a:endParaRPr lang="ru-RU" sz="1300" dirty="0">
+                        <a:effectLst/>
+                        <a:latin typeface="Times New Roman" panose="02020603050405020304" pitchFamily="18" charset="0"/>
+                        <a:ea typeface="Calibri" panose="020F0502020204030204" pitchFamily="34" charset="0"/>
+                        <a:cs typeface="Times New Roman" panose="02020603050405020304" pitchFamily="18" charset="0"/>
+                      </a:endParaRPr>
+                    </a:p>
+                  </a:txBody>
+                  <a:tcPr marL="68580" marR="68580" marT="0" marB="0">
+                    <a:solidFill>
+                      <a:srgbClr val="E7E7E7"/>
+                    </a:solidFill>
+                  </a:tcPr>
+                </a:tc>
+                <a:tc>
+                  <a:txBody>
+                    <a:bodyPr/>
+                    <a:lstStyle/>
+                    <a:p>
+                      <a:pPr marL="0" algn="l">
+                        <a:lnSpc>
+                          <a:spcPct val="100000"/>
+                        </a:lnSpc>
+                        <a:spcAft>
+                          <a:spcPts val="0"/>
+                        </a:spcAft>
+                      </a:pPr>
+                      <a:r>
+                        <a:rPr lang="en-US" sz="1300">
+                          <a:effectLst/>
+                          <a:latin typeface="Times New Roman" panose="02020603050405020304" pitchFamily="18" charset="0"/>
+                          <a:ea typeface="Calibri" panose="020F0502020204030204" pitchFamily="34" charset="0"/>
+                          <a:cs typeface="Times New Roman" panose="02020603050405020304" pitchFamily="18" charset="0"/>
+                        </a:rPr>
+                        <a:t>Code::Blocks</a:t>
+                      </a:r>
+                      <a:endParaRPr lang="ru-RU" sz="1300">
+                        <a:effectLst/>
+                        <a:latin typeface="Times New Roman" panose="02020603050405020304" pitchFamily="18" charset="0"/>
+                        <a:ea typeface="Calibri" panose="020F0502020204030204" pitchFamily="34" charset="0"/>
+                        <a:cs typeface="Times New Roman" panose="02020603050405020304" pitchFamily="18" charset="0"/>
+                      </a:endParaRPr>
+                    </a:p>
+                  </a:txBody>
+                  <a:tcPr marL="68580" marR="68580" marT="0" marB="0"/>
+                </a:tc>
+                <a:tc>
+                  <a:txBody>
+                    <a:bodyPr/>
+                    <a:lstStyle/>
+                    <a:p>
+                      <a:pPr marL="0" algn="l">
+                        <a:lnSpc>
+                          <a:spcPct val="100000"/>
+                        </a:lnSpc>
+                        <a:spcAft>
+                          <a:spcPts val="0"/>
+                        </a:spcAft>
+                      </a:pPr>
+                      <a:r>
+                        <a:rPr lang="en-US" sz="1300">
+                          <a:effectLst/>
+                          <a:latin typeface="Times New Roman" panose="02020603050405020304" pitchFamily="18" charset="0"/>
+                          <a:ea typeface="Calibri" panose="020F0502020204030204" pitchFamily="34" charset="0"/>
+                          <a:cs typeface="Times New Roman" panose="02020603050405020304" pitchFamily="18" charset="0"/>
+                        </a:rPr>
+                        <a:t>WinSCP</a:t>
+                      </a:r>
+                      <a:endParaRPr lang="ru-RU" sz="1300">
+                        <a:effectLst/>
+                        <a:latin typeface="Times New Roman" panose="02020603050405020304" pitchFamily="18" charset="0"/>
+                        <a:ea typeface="Calibri" panose="020F0502020204030204" pitchFamily="34" charset="0"/>
+                        <a:cs typeface="Times New Roman" panose="02020603050405020304" pitchFamily="18" charset="0"/>
+                      </a:endParaRPr>
+                    </a:p>
+                  </a:txBody>
+                  <a:tcPr marL="68580" marR="68580" marT="0" marB="0"/>
+                </a:tc>
+                <a:extLst>
+                  <a:ext uri="{0D108BD9-81ED-4DB2-BD59-A6C34878D82A}">
+                    <a16:rowId xmlns:a16="http://schemas.microsoft.com/office/drawing/2014/main" val="148337497"/>
+                  </a:ext>
+                </a:extLst>
+              </a:tr>
+              <a:tr h="185073">
+                <a:tc>
+                  <a:txBody>
+                    <a:bodyPr/>
+                    <a:lstStyle/>
+                    <a:p>
+                      <a:pPr marL="0" algn="l">
+                        <a:lnSpc>
+                          <a:spcPct val="100000"/>
+                        </a:lnSpc>
+                        <a:spcAft>
+                          <a:spcPts val="0"/>
+                        </a:spcAft>
+                      </a:pPr>
+                      <a:r>
+                        <a:rPr lang="ru-RU" sz="1300" dirty="0">
+                          <a:effectLst/>
+                          <a:latin typeface="Times New Roman" panose="02020603050405020304" pitchFamily="18" charset="0"/>
+                          <a:ea typeface="Calibri" panose="020F0502020204030204" pitchFamily="34" charset="0"/>
+                          <a:cs typeface="Times New Roman" panose="02020603050405020304" pitchFamily="18" charset="0"/>
+                        </a:rPr>
+                        <a:t>Возможность работы с </a:t>
+                      </a:r>
+                      <a:r>
+                        <a:rPr lang="en-US" sz="1300" dirty="0">
+                          <a:effectLst/>
+                          <a:latin typeface="Times New Roman" panose="02020603050405020304" pitchFamily="18" charset="0"/>
+                          <a:ea typeface="Calibri" panose="020F0502020204030204" pitchFamily="34" charset="0"/>
+                          <a:cs typeface="Times New Roman" panose="02020603050405020304" pitchFamily="18" charset="0"/>
+                        </a:rPr>
+                        <a:t>Git</a:t>
+                      </a:r>
+                      <a:endParaRPr lang="ru-RU" sz="1300" dirty="0">
+                        <a:effectLst/>
+                        <a:latin typeface="Times New Roman" panose="02020603050405020304" pitchFamily="18" charset="0"/>
+                        <a:ea typeface="Calibri" panose="020F0502020204030204" pitchFamily="34" charset="0"/>
+                        <a:cs typeface="Times New Roman" panose="02020603050405020304" pitchFamily="18" charset="0"/>
+                      </a:endParaRPr>
+                    </a:p>
+                  </a:txBody>
+                  <a:tcPr marL="68580" marR="68580" marT="0" marB="0"/>
+                </a:tc>
+                <a:tc>
+                  <a:txBody>
+                    <a:bodyPr/>
+                    <a:lstStyle/>
+                    <a:p>
+                      <a:pPr marL="0" algn="l">
+                        <a:lnSpc>
+                          <a:spcPct val="100000"/>
+                        </a:lnSpc>
+                        <a:spcAft>
+                          <a:spcPts val="0"/>
+                        </a:spcAft>
+                      </a:pPr>
+                      <a:r>
+                        <a:rPr lang="ru-RU" sz="1300" dirty="0">
+                          <a:effectLst/>
+                          <a:latin typeface="Times New Roman" panose="02020603050405020304" pitchFamily="18" charset="0"/>
+                          <a:ea typeface="Calibri" panose="020F0502020204030204" pitchFamily="34" charset="0"/>
+                          <a:cs typeface="Times New Roman" panose="02020603050405020304" pitchFamily="18" charset="0"/>
+                        </a:rPr>
+                        <a:t>Есть</a:t>
+                      </a:r>
+                    </a:p>
+                  </a:txBody>
+                  <a:tcPr marL="68580" marR="68580" marT="0" marB="0"/>
+                </a:tc>
+                <a:tc>
+                  <a:txBody>
+                    <a:bodyPr/>
+                    <a:lstStyle/>
+                    <a:p>
+                      <a:pPr marL="0" algn="l">
+                        <a:lnSpc>
+                          <a:spcPct val="100000"/>
+                        </a:lnSpc>
+                        <a:spcAft>
+                          <a:spcPts val="0"/>
+                        </a:spcAft>
+                      </a:pPr>
+                      <a:r>
+                        <a:rPr lang="ru-RU" sz="1300" dirty="0">
+                          <a:effectLst/>
+                          <a:latin typeface="Times New Roman" panose="02020603050405020304" pitchFamily="18" charset="0"/>
+                          <a:ea typeface="Calibri" panose="020F0502020204030204" pitchFamily="34" charset="0"/>
+                          <a:cs typeface="Times New Roman" panose="02020603050405020304" pitchFamily="18" charset="0"/>
+                        </a:rPr>
+                        <a:t>Есть</a:t>
+                      </a:r>
+                    </a:p>
+                  </a:txBody>
+                  <a:tcPr marL="68580" marR="68580" marT="0" marB="0">
+                    <a:solidFill>
+                      <a:schemeClr val="tx2">
+                        <a:lumMod val="40000"/>
+                        <a:lumOff val="60000"/>
+                      </a:schemeClr>
+                    </a:solidFill>
+                  </a:tcPr>
+                </a:tc>
+                <a:tc>
+                  <a:txBody>
+                    <a:bodyPr/>
+                    <a:lstStyle/>
+                    <a:p>
+                      <a:pPr marL="0" algn="l">
+                        <a:lnSpc>
+                          <a:spcPct val="100000"/>
+                        </a:lnSpc>
+                        <a:spcAft>
+                          <a:spcPts val="0"/>
+                        </a:spcAft>
+                      </a:pPr>
+                      <a:r>
+                        <a:rPr lang="ru-RU" sz="1300" dirty="0">
+                          <a:effectLst/>
+                          <a:latin typeface="Times New Roman" panose="02020603050405020304" pitchFamily="18" charset="0"/>
+                          <a:ea typeface="Calibri" panose="020F0502020204030204" pitchFamily="34" charset="0"/>
+                          <a:cs typeface="Times New Roman" panose="02020603050405020304" pitchFamily="18" charset="0"/>
+                        </a:rPr>
+                        <a:t>Есть</a:t>
+                      </a:r>
+                    </a:p>
+                  </a:txBody>
+                  <a:tcPr marL="68580" marR="68580" marT="0" marB="0">
+                    <a:solidFill>
+                      <a:srgbClr val="CBCBCB"/>
+                    </a:solidFill>
+                  </a:tcPr>
+                </a:tc>
+                <a:tc>
+                  <a:txBody>
+                    <a:bodyPr/>
+                    <a:lstStyle/>
+                    <a:p>
+                      <a:pPr marL="0" algn="l">
+                        <a:lnSpc>
+                          <a:spcPct val="100000"/>
+                        </a:lnSpc>
+                        <a:spcAft>
+                          <a:spcPts val="0"/>
+                        </a:spcAft>
+                      </a:pPr>
+                      <a:r>
+                        <a:rPr lang="ru-RU" sz="1300" dirty="0">
+                          <a:effectLst/>
+                          <a:latin typeface="Times New Roman" panose="02020603050405020304" pitchFamily="18" charset="0"/>
+                          <a:ea typeface="Calibri" panose="020F0502020204030204" pitchFamily="34" charset="0"/>
+                          <a:cs typeface="Times New Roman" panose="02020603050405020304" pitchFamily="18" charset="0"/>
+                        </a:rPr>
+                        <a:t>Есть</a:t>
+                      </a:r>
+                    </a:p>
+                  </a:txBody>
+                  <a:tcPr marL="68580" marR="68580" marT="0" marB="0"/>
+                </a:tc>
+                <a:tc>
+                  <a:txBody>
+                    <a:bodyPr/>
+                    <a:lstStyle/>
+                    <a:p>
+                      <a:pPr marL="0" algn="l">
+                        <a:lnSpc>
+                          <a:spcPct val="100000"/>
+                        </a:lnSpc>
+                        <a:spcAft>
+                          <a:spcPts val="0"/>
+                        </a:spcAft>
+                      </a:pPr>
+                      <a:r>
+                        <a:rPr lang="ru-RU" sz="1300" dirty="0">
+                          <a:effectLst/>
+                          <a:latin typeface="Times New Roman" panose="02020603050405020304" pitchFamily="18" charset="0"/>
+                          <a:ea typeface="Calibri" panose="020F0502020204030204" pitchFamily="34" charset="0"/>
+                          <a:cs typeface="Times New Roman" panose="02020603050405020304" pitchFamily="18" charset="0"/>
+                        </a:rPr>
+                        <a:t>Нет</a:t>
+                      </a:r>
+                    </a:p>
+                  </a:txBody>
+                  <a:tcPr marL="68580" marR="68580" marT="0" marB="0"/>
+                </a:tc>
+                <a:extLst>
+                  <a:ext uri="{0D108BD9-81ED-4DB2-BD59-A6C34878D82A}">
+                    <a16:rowId xmlns:a16="http://schemas.microsoft.com/office/drawing/2014/main" val="1287966426"/>
+                  </a:ext>
+                </a:extLst>
+              </a:tr>
+              <a:tr h="185073">
+                <a:tc>
+                  <a:txBody>
+                    <a:bodyPr/>
+                    <a:lstStyle/>
+                    <a:p>
+                      <a:pPr marL="0" algn="l">
+                        <a:lnSpc>
+                          <a:spcPct val="100000"/>
+                        </a:lnSpc>
+                        <a:spcAft>
+                          <a:spcPts val="0"/>
+                        </a:spcAft>
+                      </a:pPr>
+                      <a:r>
+                        <a:rPr lang="ru-RU" sz="1300" dirty="0">
+                          <a:effectLst/>
+                          <a:latin typeface="Times New Roman" panose="02020603050405020304" pitchFamily="18" charset="0"/>
+                          <a:ea typeface="Calibri" panose="020F0502020204030204" pitchFamily="34" charset="0"/>
+                          <a:cs typeface="Times New Roman" panose="02020603050405020304" pitchFamily="18" charset="0"/>
+                        </a:rPr>
+                        <a:t>Опыт использования</a:t>
+                      </a:r>
+                    </a:p>
+                  </a:txBody>
+                  <a:tcPr marL="68580" marR="68580" marT="0" marB="0"/>
+                </a:tc>
+                <a:tc>
+                  <a:txBody>
+                    <a:bodyPr/>
+                    <a:lstStyle/>
+                    <a:p>
+                      <a:pPr marL="0" algn="l">
+                        <a:lnSpc>
+                          <a:spcPct val="100000"/>
+                        </a:lnSpc>
+                        <a:spcAft>
+                          <a:spcPts val="0"/>
+                        </a:spcAft>
+                      </a:pPr>
+                      <a:r>
+                        <a:rPr lang="ru-RU" sz="1300" dirty="0">
+                          <a:effectLst/>
+                          <a:latin typeface="Times New Roman" panose="02020603050405020304" pitchFamily="18" charset="0"/>
+                          <a:ea typeface="Calibri" panose="020F0502020204030204" pitchFamily="34" charset="0"/>
+                          <a:cs typeface="Times New Roman" panose="02020603050405020304" pitchFamily="18" charset="0"/>
+                        </a:rPr>
+                        <a:t>Нет</a:t>
+                      </a:r>
+                    </a:p>
+                  </a:txBody>
+                  <a:tcPr marL="68580" marR="68580" marT="0" marB="0"/>
+                </a:tc>
+                <a:tc>
+                  <a:txBody>
+                    <a:bodyPr/>
+                    <a:lstStyle/>
+                    <a:p>
+                      <a:pPr marL="0" algn="l">
+                        <a:lnSpc>
+                          <a:spcPct val="100000"/>
+                        </a:lnSpc>
+                        <a:spcAft>
+                          <a:spcPts val="0"/>
+                        </a:spcAft>
+                      </a:pPr>
+                      <a:r>
+                        <a:rPr lang="ru-RU" sz="1300" dirty="0">
+                          <a:effectLst/>
+                          <a:latin typeface="Times New Roman" panose="02020603050405020304" pitchFamily="18" charset="0"/>
+                          <a:ea typeface="Calibri" panose="020F0502020204030204" pitchFamily="34" charset="0"/>
+                          <a:cs typeface="Times New Roman" panose="02020603050405020304" pitchFamily="18" charset="0"/>
+                        </a:rPr>
+                        <a:t>2 года</a:t>
+                      </a:r>
+                    </a:p>
+                  </a:txBody>
+                  <a:tcPr marL="68580" marR="68580" marT="0" marB="0">
+                    <a:solidFill>
+                      <a:schemeClr val="tx2">
+                        <a:lumMod val="40000"/>
+                        <a:lumOff val="60000"/>
+                      </a:schemeClr>
+                    </a:solidFill>
+                  </a:tcPr>
+                </a:tc>
+                <a:tc>
+                  <a:txBody>
+                    <a:bodyPr/>
+                    <a:lstStyle/>
+                    <a:p>
+                      <a:pPr marL="0" algn="l">
+                        <a:lnSpc>
+                          <a:spcPct val="100000"/>
+                        </a:lnSpc>
+                        <a:spcAft>
+                          <a:spcPts val="0"/>
+                        </a:spcAft>
+                      </a:pPr>
+                      <a:r>
+                        <a:rPr lang="ru-RU" sz="1300" dirty="0">
+                          <a:effectLst/>
+                          <a:latin typeface="Times New Roman" panose="02020603050405020304" pitchFamily="18" charset="0"/>
+                          <a:ea typeface="Calibri" panose="020F0502020204030204" pitchFamily="34" charset="0"/>
+                          <a:cs typeface="Times New Roman" panose="02020603050405020304" pitchFamily="18" charset="0"/>
+                        </a:rPr>
+                        <a:t>2 года</a:t>
+                      </a:r>
+                    </a:p>
+                  </a:txBody>
+                  <a:tcPr marL="68580" marR="68580" marT="0" marB="0">
+                    <a:solidFill>
+                      <a:srgbClr val="E7E7E7"/>
+                    </a:solidFill>
+                  </a:tcPr>
+                </a:tc>
+                <a:tc>
+                  <a:txBody>
+                    <a:bodyPr/>
+                    <a:lstStyle/>
+                    <a:p>
+                      <a:pPr marL="0" algn="l">
+                        <a:lnSpc>
+                          <a:spcPct val="100000"/>
+                        </a:lnSpc>
+                        <a:spcAft>
+                          <a:spcPts val="0"/>
+                        </a:spcAft>
+                      </a:pPr>
+                      <a:r>
+                        <a:rPr lang="ru-RU" sz="1300" dirty="0">
+                          <a:effectLst/>
+                          <a:latin typeface="Times New Roman" panose="02020603050405020304" pitchFamily="18" charset="0"/>
+                          <a:ea typeface="Calibri" panose="020F0502020204030204" pitchFamily="34" charset="0"/>
+                          <a:cs typeface="Times New Roman" panose="02020603050405020304" pitchFamily="18" charset="0"/>
+                        </a:rPr>
+                        <a:t> Нет </a:t>
+                      </a:r>
+                    </a:p>
+                  </a:txBody>
+                  <a:tcPr marL="68580" marR="68580" marT="0" marB="0"/>
+                </a:tc>
+                <a:tc>
+                  <a:txBody>
+                    <a:bodyPr/>
+                    <a:lstStyle/>
+                    <a:p>
+                      <a:pPr marL="0" algn="l">
+                        <a:lnSpc>
+                          <a:spcPct val="100000"/>
+                        </a:lnSpc>
+                        <a:spcAft>
+                          <a:spcPts val="0"/>
+                        </a:spcAft>
+                      </a:pPr>
+                      <a:r>
+                        <a:rPr lang="ru-RU" sz="1300" dirty="0">
+                          <a:effectLst/>
+                          <a:latin typeface="Times New Roman" panose="02020603050405020304" pitchFamily="18" charset="0"/>
+                          <a:ea typeface="Calibri" panose="020F0502020204030204" pitchFamily="34" charset="0"/>
+                          <a:cs typeface="Times New Roman" panose="02020603050405020304" pitchFamily="18" charset="0"/>
+                        </a:rPr>
+                        <a:t>Нет</a:t>
+                      </a:r>
+                    </a:p>
+                  </a:txBody>
+                  <a:tcPr marL="68580" marR="68580" marT="0" marB="0"/>
+                </a:tc>
+                <a:extLst>
+                  <a:ext uri="{0D108BD9-81ED-4DB2-BD59-A6C34878D82A}">
+                    <a16:rowId xmlns:a16="http://schemas.microsoft.com/office/drawing/2014/main" val="3356433363"/>
+                  </a:ext>
+                </a:extLst>
+              </a:tr>
+              <a:tr h="370146">
+                <a:tc>
+                  <a:txBody>
+                    <a:bodyPr/>
+                    <a:lstStyle/>
+                    <a:p>
+                      <a:pPr marL="0" algn="l">
+                        <a:lnSpc>
+                          <a:spcPct val="100000"/>
+                        </a:lnSpc>
+                        <a:spcAft>
+                          <a:spcPts val="0"/>
+                        </a:spcAft>
+                      </a:pPr>
+                      <a:r>
+                        <a:rPr lang="ru-RU" sz="1300" dirty="0">
+                          <a:effectLst/>
+                          <a:latin typeface="Times New Roman" panose="02020603050405020304" pitchFamily="18" charset="0"/>
+                          <a:ea typeface="Calibri" panose="020F0502020204030204" pitchFamily="34" charset="0"/>
+                          <a:cs typeface="Times New Roman" panose="02020603050405020304" pitchFamily="18" charset="0"/>
+                        </a:rPr>
+                        <a:t>Возможность подключения по </a:t>
+                      </a:r>
+                      <a:r>
+                        <a:rPr lang="en-US" sz="1300" dirty="0">
+                          <a:effectLst/>
+                          <a:latin typeface="Times New Roman" panose="02020603050405020304" pitchFamily="18" charset="0"/>
+                          <a:ea typeface="Calibri" panose="020F0502020204030204" pitchFamily="34" charset="0"/>
+                          <a:cs typeface="Times New Roman" panose="02020603050405020304" pitchFamily="18" charset="0"/>
+                        </a:rPr>
+                        <a:t>SSH</a:t>
+                      </a:r>
+                      <a:endParaRPr lang="ru-RU" sz="1300" dirty="0">
+                        <a:effectLst/>
+                        <a:latin typeface="Times New Roman" panose="02020603050405020304" pitchFamily="18" charset="0"/>
+                        <a:ea typeface="Calibri" panose="020F0502020204030204" pitchFamily="34" charset="0"/>
+                        <a:cs typeface="Times New Roman" panose="02020603050405020304" pitchFamily="18" charset="0"/>
+                      </a:endParaRPr>
+                    </a:p>
+                  </a:txBody>
+                  <a:tcPr marL="68580" marR="68580" marT="0" marB="0"/>
+                </a:tc>
+                <a:tc>
+                  <a:txBody>
+                    <a:bodyPr/>
+                    <a:lstStyle/>
+                    <a:p>
+                      <a:pPr marL="0" algn="l">
+                        <a:lnSpc>
+                          <a:spcPct val="100000"/>
+                        </a:lnSpc>
+                        <a:spcAft>
+                          <a:spcPts val="0"/>
+                        </a:spcAft>
+                      </a:pPr>
+                      <a:r>
+                        <a:rPr lang="ru-RU" sz="1300" dirty="0">
+                          <a:effectLst/>
+                          <a:latin typeface="Times New Roman" panose="02020603050405020304" pitchFamily="18" charset="0"/>
+                          <a:ea typeface="Calibri" panose="020F0502020204030204" pitchFamily="34" charset="0"/>
+                          <a:cs typeface="Times New Roman" panose="02020603050405020304" pitchFamily="18" charset="0"/>
+                        </a:rPr>
+                        <a:t> Нет</a:t>
+                      </a:r>
+                    </a:p>
+                  </a:txBody>
+                  <a:tcPr marL="68580" marR="68580" marT="0" marB="0"/>
+                </a:tc>
+                <a:tc>
+                  <a:txBody>
+                    <a:bodyPr/>
+                    <a:lstStyle/>
+                    <a:p>
+                      <a:pPr marL="0" algn="l">
+                        <a:lnSpc>
+                          <a:spcPct val="100000"/>
+                        </a:lnSpc>
+                        <a:spcAft>
+                          <a:spcPts val="0"/>
+                        </a:spcAft>
+                      </a:pPr>
+                      <a:r>
+                        <a:rPr lang="ru-RU" sz="1300" dirty="0">
+                          <a:effectLst/>
+                          <a:latin typeface="Times New Roman" panose="02020603050405020304" pitchFamily="18" charset="0"/>
+                          <a:ea typeface="Calibri" panose="020F0502020204030204" pitchFamily="34" charset="0"/>
+                          <a:cs typeface="Times New Roman" panose="02020603050405020304" pitchFamily="18" charset="0"/>
+                        </a:rPr>
+                        <a:t>Есть</a:t>
+                      </a:r>
+                    </a:p>
+                  </a:txBody>
+                  <a:tcPr marL="68580" marR="68580" marT="0" marB="0">
+                    <a:solidFill>
+                      <a:schemeClr val="tx2">
+                        <a:lumMod val="40000"/>
+                        <a:lumOff val="60000"/>
+                      </a:schemeClr>
+                    </a:solidFill>
+                  </a:tcPr>
+                </a:tc>
+                <a:tc>
+                  <a:txBody>
+                    <a:bodyPr/>
+                    <a:lstStyle/>
+                    <a:p>
+                      <a:pPr marL="0" algn="l">
+                        <a:lnSpc>
+                          <a:spcPct val="100000"/>
+                        </a:lnSpc>
+                        <a:spcAft>
+                          <a:spcPts val="0"/>
+                        </a:spcAft>
+                      </a:pPr>
+                      <a:r>
+                        <a:rPr lang="ru-RU" sz="1300" dirty="0">
+                          <a:effectLst/>
+                          <a:latin typeface="Times New Roman" panose="02020603050405020304" pitchFamily="18" charset="0"/>
+                          <a:ea typeface="Calibri" panose="020F0502020204030204" pitchFamily="34" charset="0"/>
+                          <a:cs typeface="Times New Roman" panose="02020603050405020304" pitchFamily="18" charset="0"/>
+                        </a:rPr>
+                        <a:t>Нет</a:t>
+                      </a:r>
+                    </a:p>
+                  </a:txBody>
+                  <a:tcPr marL="68580" marR="68580" marT="0" marB="0">
+                    <a:solidFill>
+                      <a:srgbClr val="CBCBCB"/>
+                    </a:solidFill>
+                  </a:tcPr>
+                </a:tc>
+                <a:tc>
+                  <a:txBody>
+                    <a:bodyPr/>
+                    <a:lstStyle/>
+                    <a:p>
+                      <a:pPr marL="0" algn="l">
+                        <a:lnSpc>
+                          <a:spcPct val="100000"/>
+                        </a:lnSpc>
+                        <a:spcAft>
+                          <a:spcPts val="0"/>
+                        </a:spcAft>
+                      </a:pPr>
+                      <a:r>
+                        <a:rPr lang="ru-RU" sz="1300" dirty="0">
+                          <a:effectLst/>
+                          <a:latin typeface="Times New Roman" panose="02020603050405020304" pitchFamily="18" charset="0"/>
+                          <a:ea typeface="Calibri" panose="020F0502020204030204" pitchFamily="34" charset="0"/>
+                          <a:cs typeface="Times New Roman" panose="02020603050405020304" pitchFamily="18" charset="0"/>
+                        </a:rPr>
+                        <a:t>Нет</a:t>
+                      </a:r>
+                    </a:p>
+                  </a:txBody>
+                  <a:tcPr marL="68580" marR="68580" marT="0" marB="0"/>
+                </a:tc>
+                <a:tc>
+                  <a:txBody>
+                    <a:bodyPr/>
+                    <a:lstStyle/>
+                    <a:p>
+                      <a:pPr marL="0" algn="l">
+                        <a:lnSpc>
+                          <a:spcPct val="100000"/>
+                        </a:lnSpc>
+                        <a:spcAft>
+                          <a:spcPts val="0"/>
+                        </a:spcAft>
+                      </a:pPr>
+                      <a:r>
+                        <a:rPr lang="ru-RU" sz="1300" dirty="0">
+                          <a:effectLst/>
+                          <a:latin typeface="Times New Roman" panose="02020603050405020304" pitchFamily="18" charset="0"/>
+                          <a:ea typeface="Calibri" panose="020F0502020204030204" pitchFamily="34" charset="0"/>
+                          <a:cs typeface="Times New Roman" panose="02020603050405020304" pitchFamily="18" charset="0"/>
+                        </a:rPr>
+                        <a:t>Есть</a:t>
+                      </a:r>
+                    </a:p>
+                  </a:txBody>
+                  <a:tcPr marL="68580" marR="68580" marT="0" marB="0"/>
+                </a:tc>
+                <a:extLst>
+                  <a:ext uri="{0D108BD9-81ED-4DB2-BD59-A6C34878D82A}">
+                    <a16:rowId xmlns:a16="http://schemas.microsoft.com/office/drawing/2014/main" val="4246543589"/>
+                  </a:ext>
+                </a:extLst>
+              </a:tr>
+              <a:tr h="370146">
+                <a:tc>
+                  <a:txBody>
+                    <a:bodyPr/>
+                    <a:lstStyle/>
+                    <a:p>
+                      <a:pPr marL="0" algn="l">
+                        <a:lnSpc>
+                          <a:spcPct val="100000"/>
+                        </a:lnSpc>
+                        <a:spcAft>
+                          <a:spcPts val="0"/>
+                        </a:spcAft>
+                      </a:pPr>
+                      <a:r>
+                        <a:rPr lang="ru-RU" sz="1300" dirty="0">
+                          <a:effectLst/>
+                          <a:latin typeface="Times New Roman" panose="02020603050405020304" pitchFamily="18" charset="0"/>
+                          <a:ea typeface="Calibri" panose="020F0502020204030204" pitchFamily="34" charset="0"/>
+                          <a:cs typeface="Times New Roman" panose="02020603050405020304" pitchFamily="18" charset="0"/>
+                        </a:rPr>
+                        <a:t>Поддержка фреймворков для тестирования</a:t>
+                      </a:r>
+                    </a:p>
+                  </a:txBody>
+                  <a:tcPr marL="68580" marR="68580" marT="0" marB="0"/>
+                </a:tc>
+                <a:tc>
+                  <a:txBody>
+                    <a:bodyPr/>
+                    <a:lstStyle/>
+                    <a:p>
+                      <a:pPr marL="0" algn="l">
+                        <a:lnSpc>
+                          <a:spcPct val="100000"/>
+                        </a:lnSpc>
+                        <a:spcAft>
+                          <a:spcPts val="0"/>
+                        </a:spcAft>
+                      </a:pPr>
+                      <a:r>
+                        <a:rPr lang="ru-RU" sz="1300" dirty="0">
+                          <a:effectLst/>
+                          <a:latin typeface="Times New Roman" panose="02020603050405020304" pitchFamily="18" charset="0"/>
+                          <a:ea typeface="Calibri" panose="020F0502020204030204" pitchFamily="34" charset="0"/>
+                          <a:cs typeface="Times New Roman" panose="02020603050405020304" pitchFamily="18" charset="0"/>
+                        </a:rPr>
+                        <a:t>Есть</a:t>
+                      </a:r>
+                    </a:p>
+                  </a:txBody>
+                  <a:tcPr marL="68580" marR="68580" marT="0" marB="0"/>
+                </a:tc>
+                <a:tc>
+                  <a:txBody>
+                    <a:bodyPr/>
+                    <a:lstStyle/>
+                    <a:p>
+                      <a:pPr marL="0" algn="l">
+                        <a:lnSpc>
+                          <a:spcPct val="100000"/>
+                        </a:lnSpc>
+                        <a:spcAft>
+                          <a:spcPts val="0"/>
+                        </a:spcAft>
+                      </a:pPr>
+                      <a:r>
+                        <a:rPr lang="ru-RU" sz="1300" dirty="0">
+                          <a:effectLst/>
+                          <a:latin typeface="Times New Roman" panose="02020603050405020304" pitchFamily="18" charset="0"/>
+                          <a:ea typeface="Calibri" panose="020F0502020204030204" pitchFamily="34" charset="0"/>
+                          <a:cs typeface="Times New Roman" panose="02020603050405020304" pitchFamily="18" charset="0"/>
+                        </a:rPr>
+                        <a:t>Есть</a:t>
+                      </a:r>
+                    </a:p>
+                    <a:p>
+                      <a:pPr marL="0" algn="l">
+                        <a:lnSpc>
+                          <a:spcPct val="100000"/>
+                        </a:lnSpc>
+                        <a:spcAft>
+                          <a:spcPts val="0"/>
+                        </a:spcAft>
+                      </a:pPr>
+                      <a:r>
+                        <a:rPr lang="ru-RU" sz="1300" dirty="0">
+                          <a:effectLst/>
+                          <a:latin typeface="Times New Roman" panose="02020603050405020304" pitchFamily="18" charset="0"/>
+                          <a:ea typeface="Calibri" panose="020F0502020204030204" pitchFamily="34" charset="0"/>
+                          <a:cs typeface="Times New Roman" panose="02020603050405020304" pitchFamily="18" charset="0"/>
+                        </a:rPr>
+                        <a:t> </a:t>
+                      </a:r>
+                    </a:p>
+                  </a:txBody>
+                  <a:tcPr marL="68580" marR="68580" marT="0" marB="0">
+                    <a:solidFill>
+                      <a:schemeClr val="tx2">
+                        <a:lumMod val="40000"/>
+                        <a:lumOff val="60000"/>
+                      </a:schemeClr>
+                    </a:solidFill>
+                  </a:tcPr>
+                </a:tc>
+                <a:tc>
+                  <a:txBody>
+                    <a:bodyPr/>
+                    <a:lstStyle/>
+                    <a:p>
+                      <a:pPr marL="0" algn="l">
+                        <a:lnSpc>
+                          <a:spcPct val="100000"/>
+                        </a:lnSpc>
+                        <a:spcAft>
+                          <a:spcPts val="0"/>
+                        </a:spcAft>
+                      </a:pPr>
+                      <a:r>
+                        <a:rPr lang="ru-RU" sz="1300" dirty="0">
+                          <a:effectLst/>
+                          <a:latin typeface="Times New Roman" panose="02020603050405020304" pitchFamily="18" charset="0"/>
+                          <a:ea typeface="Calibri" panose="020F0502020204030204" pitchFamily="34" charset="0"/>
+                          <a:cs typeface="Times New Roman" panose="02020603050405020304" pitchFamily="18" charset="0"/>
+                        </a:rPr>
+                        <a:t>Есть </a:t>
+                      </a:r>
+                    </a:p>
+                  </a:txBody>
+                  <a:tcPr marL="68580" marR="68580" marT="0" marB="0">
+                    <a:solidFill>
+                      <a:srgbClr val="E7E7E7"/>
+                    </a:solidFill>
+                  </a:tcPr>
+                </a:tc>
+                <a:tc>
+                  <a:txBody>
+                    <a:bodyPr/>
+                    <a:lstStyle/>
+                    <a:p>
+                      <a:pPr marL="0" algn="l">
+                        <a:lnSpc>
+                          <a:spcPct val="100000"/>
+                        </a:lnSpc>
+                        <a:spcAft>
+                          <a:spcPts val="0"/>
+                        </a:spcAft>
+                      </a:pPr>
+                      <a:r>
+                        <a:rPr lang="ru-RU" sz="1300" dirty="0">
+                          <a:effectLst/>
+                          <a:latin typeface="Times New Roman" panose="02020603050405020304" pitchFamily="18" charset="0"/>
+                          <a:ea typeface="Calibri" panose="020F0502020204030204" pitchFamily="34" charset="0"/>
+                          <a:cs typeface="Times New Roman" panose="02020603050405020304" pitchFamily="18" charset="0"/>
+                        </a:rPr>
+                        <a:t>Есть</a:t>
+                      </a:r>
+                    </a:p>
+                    <a:p>
+                      <a:pPr marL="0" algn="l">
+                        <a:lnSpc>
+                          <a:spcPct val="100000"/>
+                        </a:lnSpc>
+                        <a:spcAft>
+                          <a:spcPts val="0"/>
+                        </a:spcAft>
+                      </a:pPr>
+                      <a:r>
+                        <a:rPr lang="ru-RU" sz="1300" dirty="0">
+                          <a:effectLst/>
+                          <a:latin typeface="Times New Roman" panose="02020603050405020304" pitchFamily="18" charset="0"/>
+                          <a:ea typeface="Calibri" panose="020F0502020204030204" pitchFamily="34" charset="0"/>
+                          <a:cs typeface="Times New Roman" panose="02020603050405020304" pitchFamily="18" charset="0"/>
+                        </a:rPr>
+                        <a:t> </a:t>
+                      </a:r>
+                    </a:p>
+                  </a:txBody>
+                  <a:tcPr marL="68580" marR="68580" marT="0" marB="0"/>
+                </a:tc>
+                <a:tc>
+                  <a:txBody>
+                    <a:bodyPr/>
+                    <a:lstStyle/>
+                    <a:p>
+                      <a:pPr marL="0" algn="l">
+                        <a:lnSpc>
+                          <a:spcPct val="100000"/>
+                        </a:lnSpc>
+                        <a:spcAft>
+                          <a:spcPts val="0"/>
+                        </a:spcAft>
+                      </a:pPr>
+                      <a:r>
+                        <a:rPr lang="ru-RU" sz="1300">
+                          <a:effectLst/>
+                          <a:latin typeface="Times New Roman" panose="02020603050405020304" pitchFamily="18" charset="0"/>
+                          <a:ea typeface="Calibri" panose="020F0502020204030204" pitchFamily="34" charset="0"/>
+                          <a:cs typeface="Times New Roman" panose="02020603050405020304" pitchFamily="18" charset="0"/>
+                        </a:rPr>
+                        <a:t>Есть</a:t>
+                      </a:r>
+                    </a:p>
+                    <a:p>
+                      <a:pPr marL="0" algn="l">
+                        <a:lnSpc>
+                          <a:spcPct val="100000"/>
+                        </a:lnSpc>
+                        <a:spcAft>
+                          <a:spcPts val="0"/>
+                        </a:spcAft>
+                      </a:pPr>
+                      <a:r>
+                        <a:rPr lang="ru-RU" sz="1300">
+                          <a:effectLst/>
+                          <a:latin typeface="Times New Roman" panose="02020603050405020304" pitchFamily="18" charset="0"/>
+                          <a:ea typeface="Calibri" panose="020F0502020204030204" pitchFamily="34" charset="0"/>
+                          <a:cs typeface="Times New Roman" panose="02020603050405020304" pitchFamily="18" charset="0"/>
+                        </a:rPr>
+                        <a:t> </a:t>
+                      </a:r>
+                    </a:p>
+                  </a:txBody>
+                  <a:tcPr marL="68580" marR="68580" marT="0" marB="0"/>
+                </a:tc>
+                <a:extLst>
+                  <a:ext uri="{0D108BD9-81ED-4DB2-BD59-A6C34878D82A}">
+                    <a16:rowId xmlns:a16="http://schemas.microsoft.com/office/drawing/2014/main" val="2688522082"/>
+                  </a:ext>
+                </a:extLst>
+              </a:tr>
+              <a:tr h="552911">
+                <a:tc>
+                  <a:txBody>
+                    <a:bodyPr/>
+                    <a:lstStyle/>
+                    <a:p>
+                      <a:pPr marL="0" algn="l">
+                        <a:lnSpc>
+                          <a:spcPct val="100000"/>
+                        </a:lnSpc>
+                        <a:spcAft>
+                          <a:spcPts val="0"/>
+                        </a:spcAft>
+                      </a:pPr>
+                      <a:r>
+                        <a:rPr lang="ru-RU" sz="1300" dirty="0">
+                          <a:effectLst/>
+                          <a:latin typeface="Times New Roman" panose="02020603050405020304" pitchFamily="18" charset="0"/>
+                          <a:ea typeface="Calibri" panose="020F0502020204030204" pitchFamily="34" charset="0"/>
+                          <a:cs typeface="Times New Roman" panose="02020603050405020304" pitchFamily="18" charset="0"/>
+                        </a:rPr>
+                        <a:t>Наличие встроенного терминала</a:t>
+                      </a:r>
+                    </a:p>
+                  </a:txBody>
+                  <a:tcPr marL="68580" marR="68580" marT="0" marB="0"/>
+                </a:tc>
+                <a:tc>
+                  <a:txBody>
+                    <a:bodyPr/>
+                    <a:lstStyle/>
+                    <a:p>
+                      <a:pPr marL="0" algn="l">
+                        <a:lnSpc>
+                          <a:spcPct val="100000"/>
+                        </a:lnSpc>
+                        <a:spcAft>
+                          <a:spcPts val="0"/>
+                        </a:spcAft>
+                      </a:pPr>
+                      <a:r>
+                        <a:rPr lang="ru-RU" sz="1300" dirty="0">
+                          <a:effectLst/>
+                          <a:latin typeface="Times New Roman" panose="02020603050405020304" pitchFamily="18" charset="0"/>
+                          <a:ea typeface="Calibri" panose="020F0502020204030204" pitchFamily="34" charset="0"/>
+                          <a:cs typeface="Times New Roman" panose="02020603050405020304" pitchFamily="18" charset="0"/>
+                        </a:rPr>
+                        <a:t>Есть </a:t>
+                      </a:r>
+                    </a:p>
+                  </a:txBody>
+                  <a:tcPr marL="68580" marR="68580" marT="0" marB="0"/>
+                </a:tc>
+                <a:tc>
+                  <a:txBody>
+                    <a:bodyPr/>
+                    <a:lstStyle/>
+                    <a:p>
+                      <a:pPr marL="0" algn="l">
+                        <a:lnSpc>
+                          <a:spcPct val="100000"/>
+                        </a:lnSpc>
+                        <a:spcAft>
+                          <a:spcPts val="0"/>
+                        </a:spcAft>
+                      </a:pPr>
+                      <a:r>
+                        <a:rPr lang="ru-RU" sz="1300" dirty="0">
+                          <a:effectLst/>
+                          <a:latin typeface="Times New Roman" panose="02020603050405020304" pitchFamily="18" charset="0"/>
+                          <a:ea typeface="Calibri" panose="020F0502020204030204" pitchFamily="34" charset="0"/>
+                          <a:cs typeface="Times New Roman" panose="02020603050405020304" pitchFamily="18" charset="0"/>
+                        </a:rPr>
+                        <a:t>Есть </a:t>
+                      </a:r>
+                    </a:p>
+                  </a:txBody>
+                  <a:tcPr marL="68580" marR="68580" marT="0" marB="0">
+                    <a:solidFill>
+                      <a:schemeClr val="tx2">
+                        <a:lumMod val="40000"/>
+                        <a:lumOff val="60000"/>
+                      </a:schemeClr>
+                    </a:solidFill>
+                  </a:tcPr>
+                </a:tc>
+                <a:tc>
+                  <a:txBody>
+                    <a:bodyPr/>
+                    <a:lstStyle/>
+                    <a:p>
+                      <a:pPr marL="0" algn="l">
+                        <a:lnSpc>
+                          <a:spcPct val="100000"/>
+                        </a:lnSpc>
+                        <a:spcAft>
+                          <a:spcPts val="0"/>
+                        </a:spcAft>
+                      </a:pPr>
+                      <a:r>
+                        <a:rPr lang="ru-RU" sz="1300" dirty="0">
+                          <a:effectLst/>
+                          <a:latin typeface="Times New Roman" panose="02020603050405020304" pitchFamily="18" charset="0"/>
+                          <a:ea typeface="Calibri" panose="020F0502020204030204" pitchFamily="34" charset="0"/>
+                          <a:cs typeface="Times New Roman" panose="02020603050405020304" pitchFamily="18" charset="0"/>
+                        </a:rPr>
+                        <a:t>Есть </a:t>
+                      </a:r>
+                    </a:p>
+                  </a:txBody>
+                  <a:tcPr marL="68580" marR="68580" marT="0" marB="0">
+                    <a:solidFill>
+                      <a:srgbClr val="E7E7E7"/>
+                    </a:solidFill>
+                  </a:tcPr>
+                </a:tc>
+                <a:tc>
+                  <a:txBody>
+                    <a:bodyPr/>
+                    <a:lstStyle/>
+                    <a:p>
+                      <a:pPr marL="0" algn="l">
+                        <a:lnSpc>
+                          <a:spcPct val="100000"/>
+                        </a:lnSpc>
+                        <a:spcAft>
+                          <a:spcPts val="0"/>
+                        </a:spcAft>
+                      </a:pPr>
+                      <a:r>
+                        <a:rPr lang="ru-RU" sz="1300" dirty="0">
+                          <a:effectLst/>
+                          <a:latin typeface="Times New Roman" panose="02020603050405020304" pitchFamily="18" charset="0"/>
+                          <a:ea typeface="Calibri" panose="020F0502020204030204" pitchFamily="34" charset="0"/>
+                          <a:cs typeface="Times New Roman" panose="02020603050405020304" pitchFamily="18" charset="0"/>
+                        </a:rPr>
+                        <a:t>Нет </a:t>
+                      </a:r>
+                    </a:p>
+                  </a:txBody>
+                  <a:tcPr marL="68580" marR="68580" marT="0" marB="0"/>
+                </a:tc>
+                <a:tc>
+                  <a:txBody>
+                    <a:bodyPr/>
+                    <a:lstStyle/>
+                    <a:p>
+                      <a:pPr marL="0" algn="l">
+                        <a:lnSpc>
+                          <a:spcPct val="100000"/>
+                        </a:lnSpc>
+                        <a:spcAft>
+                          <a:spcPts val="0"/>
+                        </a:spcAft>
+                      </a:pPr>
+                      <a:r>
+                        <a:rPr lang="ru-RU" sz="1300" dirty="0">
+                          <a:effectLst/>
+                          <a:latin typeface="Times New Roman" panose="02020603050405020304" pitchFamily="18" charset="0"/>
+                          <a:ea typeface="Calibri" panose="020F0502020204030204" pitchFamily="34" charset="0"/>
+                          <a:cs typeface="Times New Roman" panose="02020603050405020304" pitchFamily="18" charset="0"/>
+                        </a:rPr>
+                        <a:t>Есть </a:t>
+                      </a:r>
+                    </a:p>
+                  </a:txBody>
+                  <a:tcPr marL="68580" marR="68580" marT="0" marB="0"/>
+                </a:tc>
+                <a:extLst>
+                  <a:ext uri="{0D108BD9-81ED-4DB2-BD59-A6C34878D82A}">
+                    <a16:rowId xmlns:a16="http://schemas.microsoft.com/office/drawing/2014/main" val="551400766"/>
+                  </a:ext>
+                </a:extLst>
+              </a:tr>
+            </a:tbl>
+          </a:graphicData>
+        </a:graphic>
+      </p:graphicFrame>
     </p:spTree>
   </p:cSld>
   <p:clrMapOvr>
@@ -14433,7 +14319,7 @@
           <p:nvPr>
             <p:extLst>
               <p:ext uri="{D42A27DB-BD31-4B8C-83A1-F6EECF244321}">
-                <p14:modId xmlns:p14="http://schemas.microsoft.com/office/powerpoint/2010/main" val="385404554"/>
+                <p14:modId xmlns:p14="http://schemas.microsoft.com/office/powerpoint/2010/main" val="4245804210"/>
               </p:ext>
             </p:extLst>
           </p:nvPr>
@@ -15001,25 +14887,7 @@
                           <a:ea typeface="Calibri" panose="020F0502020204030204" pitchFamily="34" charset="0"/>
                           <a:cs typeface="Times New Roman" panose="02020603050405020304" pitchFamily="18" charset="0"/>
                         </a:rPr>
-                        <a:t>Удобство</a:t>
-                      </a:r>
-                      <a:r>
-                        <a:rPr lang="en-US" sz="1300" dirty="0">
-                          <a:effectLst/>
-                          <a:latin typeface="Times New Roman" panose="02020603050405020304" pitchFamily="18" charset="0"/>
-                          <a:ea typeface="Calibri" panose="020F0502020204030204" pitchFamily="34" charset="0"/>
-                          <a:cs typeface="Times New Roman" panose="02020603050405020304" pitchFamily="18" charset="0"/>
-                        </a:rPr>
-                        <a:t>/</a:t>
-                      </a:r>
-                      <a:r>
-                        <a:rPr lang="ru-RU" sz="1300" dirty="0">
-                          <a:effectLst/>
-                          <a:latin typeface="Times New Roman" panose="02020603050405020304" pitchFamily="18" charset="0"/>
-                          <a:ea typeface="Calibri" panose="020F0502020204030204" pitchFamily="34" charset="0"/>
-                          <a:cs typeface="Times New Roman" panose="02020603050405020304" pitchFamily="18" charset="0"/>
-                        </a:rPr>
-                        <a:t>опыт использования</a:t>
+                        <a:t>Опыт использования</a:t>
                       </a:r>
                     </a:p>
                   </a:txBody>
@@ -15090,26 +14958,7 @@
                           <a:ea typeface="Calibri" panose="020F0502020204030204" pitchFamily="34" charset="0"/>
                           <a:cs typeface="Times New Roman" panose="02020603050405020304" pitchFamily="18" charset="0"/>
                         </a:rPr>
-                        <a:t>Есть</a:t>
-                      </a:r>
-                    </a:p>
-                    <a:p>
-                      <a:pPr marL="0" algn="l">
-                        <a:lnSpc>
-                          <a:spcPct val="100000"/>
-                        </a:lnSpc>
-                        <a:spcAft>
-                          <a:spcPts val="0"/>
-                        </a:spcAft>
-                      </a:pPr>
-                      <a:r>
-                        <a:rPr lang="ru-RU" sz="1300" dirty="0">
-                          <a:effectLst/>
-                          <a:latin typeface="Times New Roman" panose="02020603050405020304" pitchFamily="18" charset="0"/>
-                          <a:ea typeface="Calibri" panose="020F0502020204030204" pitchFamily="34" charset="0"/>
-                          <a:cs typeface="Times New Roman" panose="02020603050405020304" pitchFamily="18" charset="0"/>
-                        </a:rPr>
-                        <a:t> </a:t>
+                        <a:t>2 года</a:t>
                       </a:r>
                     </a:p>
                   </a:txBody>
@@ -15142,7 +14991,7 @@
                           <a:ea typeface="Calibri" panose="020F0502020204030204" pitchFamily="34" charset="0"/>
                           <a:cs typeface="Times New Roman" panose="02020603050405020304" pitchFamily="18" charset="0"/>
                         </a:rPr>
-                        <a:t>Есть</a:t>
+                        <a:t>2 года</a:t>
                       </a:r>
                     </a:p>
                     <a:p>
@@ -15185,13 +15034,13 @@
                         </a:spcAft>
                       </a:pPr>
                       <a:r>
-                        <a:rPr lang="ru-RU" sz="1300">
+                        <a:rPr lang="ru-RU" sz="1300" dirty="0">
                           <a:effectLst/>
                           <a:latin typeface="Times New Roman" panose="02020603050405020304" pitchFamily="18" charset="0"/>
                           <a:ea typeface="Calibri" panose="020F0502020204030204" pitchFamily="34" charset="0"/>
                           <a:cs typeface="Times New Roman" panose="02020603050405020304" pitchFamily="18" charset="0"/>
                         </a:rPr>
-                        <a:t> </a:t>
+                        <a:t> Нет </a:t>
                       </a:r>
                     </a:p>
                   </a:txBody>
@@ -15310,7 +15159,7 @@
                           <a:ea typeface="Calibri" panose="020F0502020204030204" pitchFamily="34" charset="0"/>
                           <a:cs typeface="Times New Roman" panose="02020603050405020304" pitchFamily="18" charset="0"/>
                         </a:rPr>
-                        <a:t> </a:t>
+                        <a:t> Нет</a:t>
                       </a:r>
                     </a:p>
                   </a:txBody>
@@ -21429,7 +21278,7 @@
             <a:pPr algn="ctr"/>
             <a:r>
               <a:rPr lang="ru-RU" sz="2200" b="1" dirty="0"/>
-              <a:t>Экранные формы. Консоль </a:t>
+              <a:t>Пример работы ПМ НКСС </a:t>
             </a:r>
           </a:p>
         </p:txBody>
@@ -22603,111 +22452,6 @@
           </a:ln>
         </p:spPr>
       </p:cxnSp>
-      <p:pic>
-        <p:nvPicPr>
-          <p:cNvPr id="10" name="Рисунок 9">
-            <a:extLst>
-              <a:ext uri="{FF2B5EF4-FFF2-40B4-BE49-F238E27FC236}">
-                <a16:creationId xmlns:a16="http://schemas.microsoft.com/office/drawing/2014/main" id="{88E33F24-E1AF-48AA-B778-0875512E2768}"/>
-              </a:ext>
-            </a:extLst>
-          </p:cNvPr>
-          <p:cNvPicPr/>
-          <p:nvPr/>
-        </p:nvPicPr>
-        <p:blipFill rotWithShape="1">
-          <a:blip r:embed="rId2"/>
-          <a:srcRect l="22092" t="-811" r="55273" b="59726"/>
-          <a:stretch/>
-        </p:blipFill>
-        <p:spPr bwMode="auto">
-          <a:xfrm>
-            <a:off x="827584" y="968755"/>
-            <a:ext cx="3744414" cy="3324341"/>
-          </a:xfrm>
-          <a:prstGeom prst="rect">
-            <a:avLst/>
-          </a:prstGeom>
-          <a:ln>
-            <a:noFill/>
-          </a:ln>
-          <a:extLst>
-            <a:ext uri="{53640926-AAD7-44D8-BBD7-CCE9431645EC}">
-              <a14:shadowObscured xmlns:a14="http://schemas.microsoft.com/office/drawing/2010/main"/>
-            </a:ext>
-          </a:extLst>
-        </p:spPr>
-      </p:pic>
-      <p:pic>
-        <p:nvPicPr>
-          <p:cNvPr id="11" name="Рисунок 10">
-            <a:extLst>
-              <a:ext uri="{FF2B5EF4-FFF2-40B4-BE49-F238E27FC236}">
-                <a16:creationId xmlns:a16="http://schemas.microsoft.com/office/drawing/2014/main" id="{D5536693-1466-42FE-81C5-427FD7713593}"/>
-              </a:ext>
-            </a:extLst>
-          </p:cNvPr>
-          <p:cNvPicPr/>
-          <p:nvPr/>
-        </p:nvPicPr>
-        <p:blipFill rotWithShape="1">
-          <a:blip r:embed="rId3"/>
-          <a:srcRect r="67326" b="21853"/>
-          <a:stretch/>
-        </p:blipFill>
-        <p:spPr bwMode="auto">
-          <a:xfrm>
-            <a:off x="386453" y="5103109"/>
-            <a:ext cx="4320486" cy="796253"/>
-          </a:xfrm>
-          <a:prstGeom prst="rect">
-            <a:avLst/>
-          </a:prstGeom>
-          <a:ln>
-            <a:noFill/>
-          </a:ln>
-          <a:extLst>
-            <a:ext uri="{53640926-AAD7-44D8-BBD7-CCE9431645EC}">
-              <a14:shadowObscured xmlns:a14="http://schemas.microsoft.com/office/drawing/2010/main"/>
-            </a:ext>
-          </a:extLst>
-        </p:spPr>
-      </p:pic>
-      <p:pic>
-        <p:nvPicPr>
-          <p:cNvPr id="12" name="Рисунок 11">
-            <a:extLst>
-              <a:ext uri="{FF2B5EF4-FFF2-40B4-BE49-F238E27FC236}">
-                <a16:creationId xmlns:a16="http://schemas.microsoft.com/office/drawing/2014/main" id="{3F1535A8-183C-44CF-A726-6CC6852CABE1}"/>
-              </a:ext>
-            </a:extLst>
-          </p:cNvPr>
-          <p:cNvPicPr/>
-          <p:nvPr/>
-        </p:nvPicPr>
-        <p:blipFill rotWithShape="1">
-          <a:blip r:embed="rId4"/>
-          <a:srcRect r="42059"/>
-          <a:stretch/>
-        </p:blipFill>
-        <p:spPr bwMode="auto">
-          <a:xfrm>
-            <a:off x="4679669" y="1553360"/>
-            <a:ext cx="4138797" cy="3751281"/>
-          </a:xfrm>
-          <a:prstGeom prst="rect">
-            <a:avLst/>
-          </a:prstGeom>
-          <a:ln>
-            <a:noFill/>
-          </a:ln>
-          <a:extLst>
-            <a:ext uri="{53640926-AAD7-44D8-BBD7-CCE9431645EC}">
-              <a14:shadowObscured xmlns:a14="http://schemas.microsoft.com/office/drawing/2010/main"/>
-            </a:ext>
-          </a:extLst>
-        </p:spPr>
-      </p:pic>
     </p:spTree>
     <p:extLst>
       <p:ext uri="{BB962C8B-B14F-4D97-AF65-F5344CB8AC3E}">

</xml_diff>